<commit_message>
tuto/livy: + Using the library pylivy modified to include management of certificates / ignore + And fix some missing transmission of the auth parameters
Improve design document to include
+ gateway management
+ extern authentication of users
+ isolation of external users wrt to the Spark cluster
+ validate the global architecture
</commit_message>
<xml_diff>
--- a/doc/Design.pptx
+++ b/doc/Design.pptx
@@ -104,6 +104,11 @@
       </a:defRPr>
     </a:lvl9pPr>
   </p:defaultTextStyle>
+  <p:extLst>
+    <p:ext uri="{EFAFB233-063F-42B5-8137-9DF3F51BA10A}">
+      <p15:sldGuideLst xmlns:p15="http://schemas.microsoft.com/office/powerpoint/2012/main"/>
+    </p:ext>
+  </p:extLst>
 </p:presentation>
 </file>
 
@@ -238,7 +243,7 @@
           <a:p>
             <a:fld id="{909166A1-3859-43DA-8491-C43A28F55B60}" type="datetimeFigureOut">
               <a:rPr lang="fr-FR" smtClean="0"/>
-              <a:t>30/03/2019</a:t>
+              <a:t>06/05/2019</a:t>
             </a:fld>
             <a:endParaRPr lang="fr-FR"/>
           </a:p>
@@ -408,7 +413,7 @@
           <a:p>
             <a:fld id="{909166A1-3859-43DA-8491-C43A28F55B60}" type="datetimeFigureOut">
               <a:rPr lang="fr-FR" smtClean="0"/>
-              <a:t>30/03/2019</a:t>
+              <a:t>06/05/2019</a:t>
             </a:fld>
             <a:endParaRPr lang="fr-FR"/>
           </a:p>
@@ -588,7 +593,7 @@
           <a:p>
             <a:fld id="{909166A1-3859-43DA-8491-C43A28F55B60}" type="datetimeFigureOut">
               <a:rPr lang="fr-FR" smtClean="0"/>
-              <a:t>30/03/2019</a:t>
+              <a:t>06/05/2019</a:t>
             </a:fld>
             <a:endParaRPr lang="fr-FR"/>
           </a:p>
@@ -758,7 +763,7 @@
           <a:p>
             <a:fld id="{909166A1-3859-43DA-8491-C43A28F55B60}" type="datetimeFigureOut">
               <a:rPr lang="fr-FR" smtClean="0"/>
-              <a:t>30/03/2019</a:t>
+              <a:t>06/05/2019</a:t>
             </a:fld>
             <a:endParaRPr lang="fr-FR"/>
           </a:p>
@@ -1004,7 +1009,7 @@
           <a:p>
             <a:fld id="{909166A1-3859-43DA-8491-C43A28F55B60}" type="datetimeFigureOut">
               <a:rPr lang="fr-FR" smtClean="0"/>
-              <a:t>30/03/2019</a:t>
+              <a:t>06/05/2019</a:t>
             </a:fld>
             <a:endParaRPr lang="fr-FR"/>
           </a:p>
@@ -1236,7 +1241,7 @@
           <a:p>
             <a:fld id="{909166A1-3859-43DA-8491-C43A28F55B60}" type="datetimeFigureOut">
               <a:rPr lang="fr-FR" smtClean="0"/>
-              <a:t>30/03/2019</a:t>
+              <a:t>06/05/2019</a:t>
             </a:fld>
             <a:endParaRPr lang="fr-FR"/>
           </a:p>
@@ -1603,7 +1608,7 @@
           <a:p>
             <a:fld id="{909166A1-3859-43DA-8491-C43A28F55B60}" type="datetimeFigureOut">
               <a:rPr lang="fr-FR" smtClean="0"/>
-              <a:t>30/03/2019</a:t>
+              <a:t>06/05/2019</a:t>
             </a:fld>
             <a:endParaRPr lang="fr-FR"/>
           </a:p>
@@ -1721,7 +1726,7 @@
           <a:p>
             <a:fld id="{909166A1-3859-43DA-8491-C43A28F55B60}" type="datetimeFigureOut">
               <a:rPr lang="fr-FR" smtClean="0"/>
-              <a:t>30/03/2019</a:t>
+              <a:t>06/05/2019</a:t>
             </a:fld>
             <a:endParaRPr lang="fr-FR"/>
           </a:p>
@@ -1816,7 +1821,7 @@
           <a:p>
             <a:fld id="{909166A1-3859-43DA-8491-C43A28F55B60}" type="datetimeFigureOut">
               <a:rPr lang="fr-FR" smtClean="0"/>
-              <a:t>30/03/2019</a:t>
+              <a:t>06/05/2019</a:t>
             </a:fld>
             <a:endParaRPr lang="fr-FR"/>
           </a:p>
@@ -2093,7 +2098,7 @@
           <a:p>
             <a:fld id="{909166A1-3859-43DA-8491-C43A28F55B60}" type="datetimeFigureOut">
               <a:rPr lang="fr-FR" smtClean="0"/>
-              <a:t>30/03/2019</a:t>
+              <a:t>06/05/2019</a:t>
             </a:fld>
             <a:endParaRPr lang="fr-FR"/>
           </a:p>
@@ -2346,7 +2351,7 @@
           <a:p>
             <a:fld id="{909166A1-3859-43DA-8491-C43A28F55B60}" type="datetimeFigureOut">
               <a:rPr lang="fr-FR" smtClean="0"/>
-              <a:t>30/03/2019</a:t>
+              <a:t>06/05/2019</a:t>
             </a:fld>
             <a:endParaRPr lang="fr-FR"/>
           </a:p>
@@ -2559,7 +2564,7 @@
           <a:p>
             <a:fld id="{909166A1-3859-43DA-8491-C43A28F55B60}" type="datetimeFigureOut">
               <a:rPr lang="fr-FR" smtClean="0"/>
-              <a:t>30/03/2019</a:t>
+              <a:t>06/05/2019</a:t>
             </a:fld>
             <a:endParaRPr lang="fr-FR"/>
           </a:p>
@@ -2966,18 +2971,24 @@
       </p:grpSpPr>
       <p:sp>
         <p:nvSpPr>
-          <p:cNvPr id="4" name="Rectangle 3"/>
+          <p:cNvPr id="98" name="Rectangle 97"/>
           <p:cNvSpPr/>
           <p:nvPr/>
         </p:nvSpPr>
         <p:spPr>
           <a:xfrm>
-            <a:off x="529389" y="1203158"/>
-            <a:ext cx="914400" cy="914400"/>
+            <a:off x="6893361" y="5153025"/>
+            <a:ext cx="2622114" cy="1387677"/>
           </a:xfrm>
           <a:prstGeom prst="rect">
             <a:avLst/>
           </a:prstGeom>
+          <a:solidFill>
+            <a:schemeClr val="accent2">
+              <a:lumMod val="40000"/>
+              <a:lumOff val="60000"/>
+            </a:schemeClr>
+          </a:solidFill>
         </p:spPr>
         <p:style>
           <a:lnRef idx="2">
@@ -3000,28 +3011,30 @@
           <a:lstStyle/>
           <a:p>
             <a:pPr algn="ctr"/>
-            <a:r>
-              <a:rPr lang="fr-FR" dirty="0" smtClean="0"/>
-              <a:t>Broker</a:t>
-            </a:r>
-            <a:endParaRPr lang="fr-FR" dirty="0"/>
-          </a:p>
-        </p:txBody>
-      </p:sp>
-      <p:sp>
-        <p:nvSpPr>
-          <p:cNvPr id="6" name="Rectangle 5"/>
+            <a:endParaRPr lang="fr-FR"/>
+          </a:p>
+        </p:txBody>
+      </p:sp>
+      <p:sp>
+        <p:nvSpPr>
+          <p:cNvPr id="82" name="Rectangle 81"/>
           <p:cNvSpPr/>
           <p:nvPr/>
         </p:nvSpPr>
         <p:spPr>
           <a:xfrm>
-            <a:off x="2285998" y="537411"/>
-            <a:ext cx="914400" cy="914400"/>
+            <a:off x="3156109" y="5406063"/>
+            <a:ext cx="2504516" cy="1354687"/>
           </a:xfrm>
           <a:prstGeom prst="rect">
             <a:avLst/>
           </a:prstGeom>
+          <a:solidFill>
+            <a:schemeClr val="accent2">
+              <a:lumMod val="40000"/>
+              <a:lumOff val="60000"/>
+            </a:schemeClr>
+          </a:solidFill>
         </p:spPr>
         <p:style>
           <a:lnRef idx="2">
@@ -3044,39 +3057,24 @@
           <a:lstStyle/>
           <a:p>
             <a:pPr algn="ctr"/>
-            <a:r>
-              <a:rPr lang="fr-FR" dirty="0" err="1" smtClean="0"/>
-              <a:t>ALert</a:t>
-            </a:r>
-            <a:endParaRPr lang="fr-FR" dirty="0" smtClean="0"/>
-          </a:p>
-          <a:p>
-            <a:pPr algn="ctr"/>
-            <a:r>
-              <a:rPr lang="fr-FR" dirty="0" err="1" smtClean="0"/>
-              <a:t>Database</a:t>
-            </a:r>
-            <a:endParaRPr lang="fr-FR" dirty="0"/>
-          </a:p>
-        </p:txBody>
-      </p:sp>
-      <p:sp>
-        <p:nvSpPr>
-          <p:cNvPr id="8" name="Rectangle 7"/>
+            <a:endParaRPr lang="fr-FR"/>
+          </a:p>
+        </p:txBody>
+      </p:sp>
+      <p:sp>
+        <p:nvSpPr>
+          <p:cNvPr id="51" name="Rectangle 50"/>
           <p:cNvSpPr/>
           <p:nvPr/>
         </p:nvSpPr>
         <p:spPr>
           <a:xfrm>
-            <a:off x="5758721" y="2301447"/>
-            <a:ext cx="914400" cy="914400"/>
+            <a:off x="318336" y="171450"/>
+            <a:ext cx="11321214" cy="3046277"/>
           </a:xfrm>
           <a:prstGeom prst="rect">
             <a:avLst/>
           </a:prstGeom>
-          <a:solidFill>
-            <a:srgbClr val="FF0000"/>
-          </a:solidFill>
         </p:spPr>
         <p:style>
           <a:lnRef idx="2">
@@ -3099,9 +3097,113 @@
           <a:lstStyle/>
           <a:p>
             <a:pPr algn="ctr"/>
+            <a:endParaRPr lang="fr-FR"/>
+          </a:p>
+        </p:txBody>
+      </p:sp>
+      <p:sp>
+        <p:nvSpPr>
+          <p:cNvPr id="4" name="Rectangle 3"/>
+          <p:cNvSpPr/>
+          <p:nvPr/>
+        </p:nvSpPr>
+        <p:spPr>
+          <a:xfrm>
+            <a:off x="596064" y="555458"/>
+            <a:ext cx="914400" cy="914400"/>
+          </a:xfrm>
+          <a:prstGeom prst="rect">
+            <a:avLst/>
+          </a:prstGeom>
+          <a:solidFill>
+            <a:schemeClr val="accent6">
+              <a:lumMod val="60000"/>
+              <a:lumOff val="40000"/>
+            </a:schemeClr>
+          </a:solidFill>
+          <a:ln w="57150"/>
+        </p:spPr>
+        <p:style>
+          <a:lnRef idx="2">
+            <a:schemeClr val="accent1">
+              <a:shade val="50000"/>
+            </a:schemeClr>
+          </a:lnRef>
+          <a:fillRef idx="1">
+            <a:schemeClr val="accent1"/>
+          </a:fillRef>
+          <a:effectRef idx="0">
+            <a:schemeClr val="accent1"/>
+          </a:effectRef>
+          <a:fontRef idx="minor">
+            <a:schemeClr val="lt1"/>
+          </a:fontRef>
+        </p:style>
+        <p:txBody>
+          <a:bodyPr rtlCol="0" anchor="ctr"/>
+          <a:lstStyle/>
+          <a:p>
+            <a:pPr algn="ctr"/>
+            <a:r>
+              <a:rPr lang="fr-FR" dirty="0" smtClean="0"/>
+              <a:t>Broker</a:t>
+            </a:r>
+            <a:endParaRPr lang="fr-FR" dirty="0"/>
+          </a:p>
+        </p:txBody>
+      </p:sp>
+      <p:sp>
+        <p:nvSpPr>
+          <p:cNvPr id="6" name="Rectangle 5"/>
+          <p:cNvSpPr/>
+          <p:nvPr/>
+        </p:nvSpPr>
+        <p:spPr>
+          <a:xfrm>
+            <a:off x="523872" y="1775661"/>
+            <a:ext cx="1066803" cy="914400"/>
+          </a:xfrm>
+          <a:prstGeom prst="rect">
+            <a:avLst/>
+          </a:prstGeom>
+          <a:solidFill>
+            <a:schemeClr val="bg1">
+              <a:lumMod val="65000"/>
+            </a:schemeClr>
+          </a:solidFill>
+        </p:spPr>
+        <p:style>
+          <a:lnRef idx="2">
+            <a:schemeClr val="accent1">
+              <a:shade val="50000"/>
+            </a:schemeClr>
+          </a:lnRef>
+          <a:fillRef idx="1">
+            <a:schemeClr val="accent1"/>
+          </a:fillRef>
+          <a:effectRef idx="0">
+            <a:schemeClr val="accent1"/>
+          </a:effectRef>
+          <a:fontRef idx="minor">
+            <a:schemeClr val="lt1"/>
+          </a:fontRef>
+        </p:style>
+        <p:txBody>
+          <a:bodyPr rtlCol="0" anchor="ctr"/>
+          <a:lstStyle/>
+          <a:p>
+            <a:pPr algn="ctr"/>
             <a:r>
               <a:rPr lang="fr-FR" dirty="0" err="1" smtClean="0"/>
-              <a:t>Livy</a:t>
+              <a:t>Alert</a:t>
+            </a:r>
+            <a:endParaRPr lang="fr-FR" dirty="0" smtClean="0"/>
+          </a:p>
+          <a:p>
+            <a:pPr algn="ctr"/>
+            <a:r>
+              <a:rPr lang="fr-FR" dirty="0" err="1" smtClean="0"/>
+              <a:t>Database</a:t>
             </a:r>
             <a:endParaRPr lang="fr-FR" dirty="0"/>
           </a:p>
@@ -3115,10 +3217,10 @@
         </p:nvGrpSpPr>
         <p:grpSpPr>
           <a:xfrm>
-            <a:off x="6673121" y="2758648"/>
-            <a:ext cx="5022938" cy="2559312"/>
-            <a:chOff x="3594217" y="2758648"/>
-            <a:chExt cx="5022938" cy="2559312"/>
+            <a:off x="5995343" y="3605554"/>
+            <a:ext cx="3262316" cy="2722056"/>
+            <a:chOff x="2678314" y="3681754"/>
+            <a:chExt cx="3262316" cy="2722056"/>
           </a:xfrm>
         </p:grpSpPr>
         <p:sp>
@@ -3129,7 +3231,7 @@
           </p:nvSpPr>
           <p:spPr>
             <a:xfrm>
-              <a:off x="6136107" y="2887580"/>
+              <a:off x="2678314" y="3681754"/>
               <a:ext cx="1965156" cy="914400"/>
             </a:xfrm>
             <a:prstGeom prst="rect">
@@ -3170,60 +3272,13 @@
         </p:sp>
         <p:sp>
           <p:nvSpPr>
-            <p:cNvPr id="10" name="Rectangle 9"/>
-            <p:cNvSpPr/>
-            <p:nvPr/>
-          </p:nvSpPr>
-          <p:spPr>
-            <a:xfrm>
-              <a:off x="5721554" y="4515860"/>
-              <a:ext cx="1363578" cy="802100"/>
-            </a:xfrm>
-            <a:prstGeom prst="rect">
-              <a:avLst/>
-            </a:prstGeom>
-            <a:solidFill>
-              <a:srgbClr val="00B050"/>
-            </a:solidFill>
-          </p:spPr>
-          <p:style>
-            <a:lnRef idx="2">
-              <a:schemeClr val="accent1">
-                <a:shade val="50000"/>
-              </a:schemeClr>
-            </a:lnRef>
-            <a:fillRef idx="1">
-              <a:schemeClr val="accent1"/>
-            </a:fillRef>
-            <a:effectRef idx="0">
-              <a:schemeClr val="accent1"/>
-            </a:effectRef>
-            <a:fontRef idx="minor">
-              <a:schemeClr val="lt1"/>
-            </a:fontRef>
-          </p:style>
-          <p:txBody>
-            <a:bodyPr rtlCol="0" anchor="ctr"/>
-            <a:lstStyle/>
-            <a:p>
-              <a:pPr algn="ctr"/>
-              <a:r>
-                <a:rPr lang="fr-FR" dirty="0" smtClean="0"/>
-                <a:t>Monitor Client</a:t>
-              </a:r>
-              <a:endParaRPr lang="fr-FR" dirty="0"/>
-            </a:p>
-          </p:txBody>
-        </p:sp>
-        <p:sp>
-          <p:nvSpPr>
             <p:cNvPr id="11" name="Rectangle 10"/>
             <p:cNvSpPr/>
             <p:nvPr/>
           </p:nvSpPr>
           <p:spPr>
             <a:xfrm>
-              <a:off x="7253577" y="4515860"/>
+              <a:off x="4577052" y="5601710"/>
               <a:ext cx="1363578" cy="802100"/>
             </a:xfrm>
             <a:prstGeom prst="rect">
@@ -3264,46 +3319,6 @@
         </p:sp>
         <p:cxnSp>
           <p:nvCxnSpPr>
-            <p:cNvPr id="14" name="Connecteur droit 13"/>
-            <p:cNvCxnSpPr>
-              <a:stCxn id="10" idx="0"/>
-              <a:endCxn id="9" idx="2"/>
-            </p:cNvCxnSpPr>
-            <p:nvPr/>
-          </p:nvCxnSpPr>
-          <p:spPr>
-            <a:xfrm rot="5400000" flipH="1" flipV="1">
-              <a:off x="6404074" y="3801249"/>
-              <a:ext cx="713880" cy="715342"/>
-            </a:xfrm>
-            <a:prstGeom prst="curvedConnector3">
-              <a:avLst>
-                <a:gd name="adj1" fmla="val 50000"/>
-              </a:avLst>
-            </a:prstGeom>
-            <a:ln w="57150">
-              <a:solidFill>
-                <a:srgbClr val="FF0000"/>
-              </a:solidFill>
-            </a:ln>
-          </p:spPr>
-          <p:style>
-            <a:lnRef idx="1">
-              <a:schemeClr val="accent1"/>
-            </a:lnRef>
-            <a:fillRef idx="0">
-              <a:schemeClr val="accent1"/>
-            </a:fillRef>
-            <a:effectRef idx="0">
-              <a:schemeClr val="accent1"/>
-            </a:effectRef>
-            <a:fontRef idx="minor">
-              <a:schemeClr val="tx1"/>
-            </a:fontRef>
-          </p:style>
-        </p:cxnSp>
-        <p:cxnSp>
-          <p:nvCxnSpPr>
             <p:cNvPr id="15" name="Connecteur droit 13"/>
             <p:cNvCxnSpPr>
               <a:stCxn id="11" idx="0"/>
@@ -3313,48 +3328,8 @@
           </p:nvCxnSpPr>
           <p:spPr>
             <a:xfrm rot="16200000" flipV="1">
-              <a:off x="7170086" y="3750579"/>
-              <a:ext cx="713880" cy="816681"/>
-            </a:xfrm>
-            <a:prstGeom prst="curvedConnector3">
-              <a:avLst>
-                <a:gd name="adj1" fmla="val 50000"/>
-              </a:avLst>
-            </a:prstGeom>
-            <a:ln w="57150">
-              <a:solidFill>
-                <a:srgbClr val="FF0000"/>
-              </a:solidFill>
-            </a:ln>
-          </p:spPr>
-          <p:style>
-            <a:lnRef idx="1">
-              <a:schemeClr val="accent1"/>
-            </a:lnRef>
-            <a:fillRef idx="0">
-              <a:schemeClr val="accent1"/>
-            </a:fillRef>
-            <a:effectRef idx="0">
-              <a:schemeClr val="accent1"/>
-            </a:effectRef>
-            <a:fontRef idx="minor">
-              <a:schemeClr val="tx1"/>
-            </a:fontRef>
-          </p:style>
-        </p:cxnSp>
-        <p:cxnSp>
-          <p:nvCxnSpPr>
-            <p:cNvPr id="21" name="Connecteur droit 13"/>
-            <p:cNvCxnSpPr>
-              <a:stCxn id="9" idx="1"/>
-              <a:endCxn id="8" idx="3"/>
-            </p:cNvCxnSpPr>
-            <p:nvPr/>
-          </p:nvCxnSpPr>
-          <p:spPr>
-            <a:xfrm rot="10800000">
-              <a:off x="3594217" y="2758648"/>
-              <a:ext cx="2541890" cy="586133"/>
+              <a:off x="3957089" y="4299957"/>
+              <a:ext cx="1005556" cy="1597949"/>
             </a:xfrm>
             <a:prstGeom prst="curvedConnector3">
               <a:avLst>
@@ -3388,18 +3363,19 @@
           <p:cNvPr id="24" name="Connecteur droit 13"/>
           <p:cNvCxnSpPr>
             <a:stCxn id="8" idx="1"/>
-            <a:endCxn id="54" idx="6"/>
+            <a:endCxn id="54" idx="5"/>
           </p:cNvCxnSpPr>
           <p:nvPr/>
         </p:nvCxnSpPr>
         <p:spPr>
-          <a:xfrm rot="10800000" flipV="1">
-            <a:off x="3607121" y="2758647"/>
-            <a:ext cx="2151601" cy="497560"/>
-          </a:xfrm>
-          <a:prstGeom prst="curvedConnector3">
+          <a:xfrm rot="10800000">
+            <a:off x="4008959" y="1811609"/>
+            <a:ext cx="2083136" cy="127889"/>
+          </a:xfrm>
+          <a:prstGeom prst="curvedConnector4">
             <a:avLst>
-              <a:gd name="adj1" fmla="val 50000"/>
+              <a:gd name="adj1" fmla="val 41005"/>
+              <a:gd name="adj2" fmla="val -536246"/>
             </a:avLst>
           </a:prstGeom>
           <a:ln w="57150">
@@ -3428,18 +3404,18 @@
           <p:cNvPr id="27" name="Connecteur droit 13"/>
           <p:cNvCxnSpPr>
             <a:stCxn id="6" idx="2"/>
-            <a:endCxn id="54" idx="0"/>
+            <a:endCxn id="54" idx="4"/>
           </p:cNvCxnSpPr>
           <p:nvPr/>
         </p:nvCxnSpPr>
         <p:spPr>
-          <a:xfrm rot="5400000">
-            <a:off x="1906119" y="1873356"/>
-            <a:ext cx="1258624" cy="415535"/>
+          <a:xfrm rot="5400000" flipH="1" flipV="1">
+            <a:off x="1721460" y="1307275"/>
+            <a:ext cx="718600" cy="2046972"/>
           </a:xfrm>
           <a:prstGeom prst="curvedConnector3">
             <a:avLst>
-              <a:gd name="adj1" fmla="val 50000"/>
+              <a:gd name="adj1" fmla="val -31812"/>
             </a:avLst>
           </a:prstGeom>
           <a:ln w="57150">
@@ -3467,15 +3443,15 @@
         <p:nvCxnSpPr>
           <p:cNvPr id="30" name="Connecteur droit 13"/>
           <p:cNvCxnSpPr>
-            <a:stCxn id="6" idx="1"/>
-            <a:endCxn id="4" idx="3"/>
+            <a:stCxn id="6" idx="0"/>
+            <a:endCxn id="4" idx="2"/>
           </p:cNvCxnSpPr>
           <p:nvPr/>
         </p:nvCxnSpPr>
         <p:spPr>
-          <a:xfrm rot="10800000" flipV="1">
-            <a:off x="1443790" y="994610"/>
-            <a:ext cx="842209" cy="665747"/>
+          <a:xfrm rot="16200000" flipV="1">
+            <a:off x="902368" y="1620755"/>
+            <a:ext cx="305803" cy="4010"/>
           </a:xfrm>
           <a:prstGeom prst="curvedConnector3">
             <a:avLst>
@@ -3511,7 +3487,7 @@
         </p:nvSpPr>
         <p:spPr>
           <a:xfrm>
-            <a:off x="5622757" y="994610"/>
+            <a:off x="7327732" y="413585"/>
             <a:ext cx="3992503" cy="646331"/>
           </a:xfrm>
           <a:prstGeom prst="rect">
@@ -3561,56 +3537,12 @@
         </p:nvGrpSpPr>
         <p:grpSpPr>
           <a:xfrm>
-            <a:off x="2872121" y="3215848"/>
-            <a:ext cx="4427624" cy="3184953"/>
-            <a:chOff x="4940968" y="2133007"/>
-            <a:chExt cx="4427624" cy="3184953"/>
+            <a:off x="4072271" y="4519955"/>
+            <a:ext cx="2905649" cy="2080871"/>
+            <a:chOff x="6141118" y="3437114"/>
+            <a:chExt cx="2905649" cy="2080871"/>
           </a:xfrm>
         </p:grpSpPr>
-        <p:sp>
-          <p:nvSpPr>
-            <p:cNvPr id="39" name="Rectangle 38"/>
-            <p:cNvSpPr/>
-            <p:nvPr/>
-          </p:nvSpPr>
-          <p:spPr>
-            <a:xfrm>
-              <a:off x="6136107" y="2887580"/>
-              <a:ext cx="1965156" cy="914400"/>
-            </a:xfrm>
-            <a:prstGeom prst="rect">
-              <a:avLst/>
-            </a:prstGeom>
-          </p:spPr>
-          <p:style>
-            <a:lnRef idx="2">
-              <a:schemeClr val="accent1">
-                <a:shade val="50000"/>
-              </a:schemeClr>
-            </a:lnRef>
-            <a:fillRef idx="1">
-              <a:schemeClr val="accent1"/>
-            </a:fillRef>
-            <a:effectRef idx="0">
-              <a:schemeClr val="accent1"/>
-            </a:effectRef>
-            <a:fontRef idx="minor">
-              <a:schemeClr val="lt1"/>
-            </a:fontRef>
-          </p:style>
-          <p:txBody>
-            <a:bodyPr rtlCol="0" anchor="ctr"/>
-            <a:lstStyle/>
-            <a:p>
-              <a:pPr algn="ctr"/>
-              <a:r>
-                <a:rPr lang="fr-FR" dirty="0" smtClean="0"/>
-                <a:t>Monitor Server</a:t>
-              </a:r>
-              <a:endParaRPr lang="fr-FR" dirty="0"/>
-            </a:p>
-          </p:txBody>
-        </p:sp>
         <p:sp>
           <p:nvSpPr>
             <p:cNvPr id="40" name="Rectangle 39"/>
@@ -3619,100 +3551,15 @@
           </p:nvSpPr>
           <p:spPr>
             <a:xfrm>
-              <a:off x="4940968" y="4515860"/>
+              <a:off x="6141118" y="4715885"/>
               <a:ext cx="1363578" cy="802100"/>
             </a:xfrm>
             <a:prstGeom prst="rect">
               <a:avLst/>
             </a:prstGeom>
-          </p:spPr>
-          <p:style>
-            <a:lnRef idx="2">
-              <a:schemeClr val="accent1">
-                <a:shade val="50000"/>
-              </a:schemeClr>
-            </a:lnRef>
-            <a:fillRef idx="1">
-              <a:schemeClr val="accent1"/>
-            </a:fillRef>
-            <a:effectRef idx="0">
-              <a:schemeClr val="accent1"/>
-            </a:effectRef>
-            <a:fontRef idx="minor">
-              <a:schemeClr val="lt1"/>
-            </a:fontRef>
-          </p:style>
-          <p:txBody>
-            <a:bodyPr rtlCol="0" anchor="ctr"/>
-            <a:lstStyle/>
-            <a:p>
-              <a:pPr algn="ctr"/>
-              <a:r>
-                <a:rPr lang="fr-FR" dirty="0" smtClean="0"/>
-                <a:t>Monitor Client</a:t>
-              </a:r>
-              <a:endParaRPr lang="fr-FR" dirty="0"/>
-            </a:p>
-          </p:txBody>
-        </p:sp>
-        <p:sp>
-          <p:nvSpPr>
-            <p:cNvPr id="41" name="Rectangle 40"/>
-            <p:cNvSpPr/>
-            <p:nvPr/>
-          </p:nvSpPr>
-          <p:spPr>
-            <a:xfrm>
-              <a:off x="6472991" y="4515860"/>
-              <a:ext cx="1363578" cy="802100"/>
-            </a:xfrm>
-            <a:prstGeom prst="rect">
-              <a:avLst/>
-            </a:prstGeom>
-          </p:spPr>
-          <p:style>
-            <a:lnRef idx="2">
-              <a:schemeClr val="accent1">
-                <a:shade val="50000"/>
-              </a:schemeClr>
-            </a:lnRef>
-            <a:fillRef idx="1">
-              <a:schemeClr val="accent1"/>
-            </a:fillRef>
-            <a:effectRef idx="0">
-              <a:schemeClr val="accent1"/>
-            </a:effectRef>
-            <a:fontRef idx="minor">
-              <a:schemeClr val="lt1"/>
-            </a:fontRef>
-          </p:style>
-          <p:txBody>
-            <a:bodyPr rtlCol="0" anchor="ctr"/>
-            <a:lstStyle/>
-            <a:p>
-              <a:pPr algn="ctr"/>
-              <a:r>
-                <a:rPr lang="fr-FR" dirty="0" smtClean="0"/>
-                <a:t>Monitor Client</a:t>
-              </a:r>
-              <a:endParaRPr lang="fr-FR" dirty="0"/>
-            </a:p>
-          </p:txBody>
-        </p:sp>
-        <p:sp>
-          <p:nvSpPr>
-            <p:cNvPr id="42" name="Rectangle 41"/>
-            <p:cNvSpPr/>
-            <p:nvPr/>
-          </p:nvSpPr>
-          <p:spPr>
-            <a:xfrm>
-              <a:off x="8005014" y="4515860"/>
-              <a:ext cx="1363578" cy="802100"/>
-            </a:xfrm>
-            <a:prstGeom prst="rect">
-              <a:avLst/>
-            </a:prstGeom>
+            <a:solidFill>
+              <a:srgbClr val="00B050"/>
+            </a:solidFill>
           </p:spPr>
           <p:style>
             <a:lnRef idx="2">
@@ -3748,134 +3595,14 @@
             <p:cNvPr id="43" name="Connecteur droit 13"/>
             <p:cNvCxnSpPr>
               <a:stCxn id="40" idx="0"/>
-              <a:endCxn id="39" idx="2"/>
+              <a:endCxn id="9" idx="2"/>
             </p:cNvCxnSpPr>
             <p:nvPr/>
           </p:nvCxnSpPr>
           <p:spPr>
             <a:xfrm rot="5400000" flipH="1" flipV="1">
-              <a:off x="6013781" y="3410956"/>
-              <a:ext cx="713880" cy="1495928"/>
-            </a:xfrm>
-            <a:prstGeom prst="curvedConnector3">
-              <a:avLst>
-                <a:gd name="adj1" fmla="val 50000"/>
-              </a:avLst>
-            </a:prstGeom>
-            <a:ln w="57150">
-              <a:solidFill>
-                <a:srgbClr val="FF0000"/>
-              </a:solidFill>
-            </a:ln>
-          </p:spPr>
-          <p:style>
-            <a:lnRef idx="1">
-              <a:schemeClr val="accent1"/>
-            </a:lnRef>
-            <a:fillRef idx="0">
-              <a:schemeClr val="accent1"/>
-            </a:fillRef>
-            <a:effectRef idx="0">
-              <a:schemeClr val="accent1"/>
-            </a:effectRef>
-            <a:fontRef idx="minor">
-              <a:schemeClr val="tx1"/>
-            </a:fontRef>
-          </p:style>
-        </p:cxnSp>
-        <p:cxnSp>
-          <p:nvCxnSpPr>
-            <p:cNvPr id="44" name="Connecteur droit 13"/>
-            <p:cNvCxnSpPr>
-              <a:stCxn id="41" idx="0"/>
-              <a:endCxn id="39" idx="2"/>
-            </p:cNvCxnSpPr>
-            <p:nvPr/>
-          </p:nvCxnSpPr>
-          <p:spPr>
-            <a:xfrm rot="16200000" flipV="1">
-              <a:off x="6779793" y="4140872"/>
-              <a:ext cx="713880" cy="36095"/>
-            </a:xfrm>
-            <a:prstGeom prst="curvedConnector3">
-              <a:avLst>
-                <a:gd name="adj1" fmla="val 50000"/>
-              </a:avLst>
-            </a:prstGeom>
-            <a:ln w="57150">
-              <a:solidFill>
-                <a:srgbClr val="FF0000"/>
-              </a:solidFill>
-            </a:ln>
-          </p:spPr>
-          <p:style>
-            <a:lnRef idx="1">
-              <a:schemeClr val="accent1"/>
-            </a:lnRef>
-            <a:fillRef idx="0">
-              <a:schemeClr val="accent1"/>
-            </a:fillRef>
-            <a:effectRef idx="0">
-              <a:schemeClr val="accent1"/>
-            </a:effectRef>
-            <a:fontRef idx="minor">
-              <a:schemeClr val="tx1"/>
-            </a:fontRef>
-          </p:style>
-        </p:cxnSp>
-        <p:cxnSp>
-          <p:nvCxnSpPr>
-            <p:cNvPr id="45" name="Connecteur droit 13"/>
-            <p:cNvCxnSpPr>
-              <a:stCxn id="42" idx="0"/>
-              <a:endCxn id="39" idx="2"/>
-            </p:cNvCxnSpPr>
-            <p:nvPr/>
-          </p:nvCxnSpPr>
-          <p:spPr>
-            <a:xfrm rot="16200000" flipV="1">
-              <a:off x="7545804" y="3374861"/>
-              <a:ext cx="713880" cy="1568118"/>
-            </a:xfrm>
-            <a:prstGeom prst="curvedConnector3">
-              <a:avLst>
-                <a:gd name="adj1" fmla="val 50000"/>
-              </a:avLst>
-            </a:prstGeom>
-            <a:ln w="57150">
-              <a:solidFill>
-                <a:srgbClr val="FF0000"/>
-              </a:solidFill>
-            </a:ln>
-          </p:spPr>
-          <p:style>
-            <a:lnRef idx="1">
-              <a:schemeClr val="accent1"/>
-            </a:lnRef>
-            <a:fillRef idx="0">
-              <a:schemeClr val="accent1"/>
-            </a:fillRef>
-            <a:effectRef idx="0">
-              <a:schemeClr val="accent1"/>
-            </a:effectRef>
-            <a:fontRef idx="minor">
-              <a:schemeClr val="tx1"/>
-            </a:fontRef>
-          </p:style>
-        </p:cxnSp>
-        <p:cxnSp>
-          <p:nvCxnSpPr>
-            <p:cNvPr id="46" name="Connecteur droit 13"/>
-            <p:cNvCxnSpPr>
-              <a:stCxn id="39" idx="0"/>
-              <a:endCxn id="8" idx="2"/>
-            </p:cNvCxnSpPr>
-            <p:nvPr/>
-          </p:nvCxnSpPr>
-          <p:spPr>
-            <a:xfrm rot="5400000" flipH="1" flipV="1">
-              <a:off x="7324439" y="1927252"/>
-              <a:ext cx="754574" cy="1166083"/>
+              <a:off x="7295451" y="2964569"/>
+              <a:ext cx="1278772" cy="2223861"/>
             </a:xfrm>
             <a:prstGeom prst="curvedConnector3">
               <a:avLst>
@@ -3912,7 +3639,7 @@
         </p:nvSpPr>
         <p:spPr>
           <a:xfrm>
-            <a:off x="1048206" y="2710435"/>
+            <a:off x="1824789" y="879917"/>
             <a:ext cx="2558914" cy="1091544"/>
           </a:xfrm>
           <a:prstGeom prst="ellipse">
@@ -3964,8 +3691,8 @@
         </p:nvSpPr>
         <p:spPr>
           <a:xfrm>
-            <a:off x="6754509" y="4258600"/>
-            <a:ext cx="1651221" cy="369332"/>
+            <a:off x="563259" y="5468275"/>
+            <a:ext cx="1704569" cy="646331"/>
           </a:xfrm>
           <a:prstGeom prst="rect">
             <a:avLst/>
@@ -3983,9 +3710,17 @@
           </a:bodyPr>
           <a:lstStyle/>
           <a:p>
-            <a:r>
-              <a:rPr lang="fr-FR" dirty="0" err="1" smtClean="0"/>
-              <a:t>Authentifaction</a:t>
+            <a:pPr algn="ctr"/>
+            <a:r>
+              <a:rPr lang="fr-FR" dirty="0" smtClean="0"/>
+              <a:t>Authentification</a:t>
+            </a:r>
+          </a:p>
+          <a:p>
+            <a:pPr algn="ctr"/>
+            <a:r>
+              <a:rPr lang="fr-FR" dirty="0" smtClean="0"/>
+              <a:t>id</a:t>
             </a:r>
             <a:endParaRPr lang="fr-FR" dirty="0"/>
           </a:p>
@@ -3996,13 +3731,14 @@
           <p:cNvPr id="63" name="Connecteur droit 13"/>
           <p:cNvCxnSpPr>
             <a:stCxn id="61" idx="3"/>
+            <a:endCxn id="40" idx="1"/>
           </p:cNvCxnSpPr>
           <p:nvPr/>
         </p:nvCxnSpPr>
         <p:spPr>
-          <a:xfrm flipV="1">
-            <a:off x="8405730" y="4058661"/>
-            <a:ext cx="1429646" cy="384605"/>
+          <a:xfrm>
+            <a:off x="2267828" y="5791441"/>
+            <a:ext cx="1804443" cy="408335"/>
           </a:xfrm>
           <a:prstGeom prst="curvedConnector3">
             <a:avLst>
@@ -4035,17 +3771,20 @@
         <p:nvCxnSpPr>
           <p:cNvPr id="66" name="Connecteur droit 13"/>
           <p:cNvCxnSpPr>
-            <a:stCxn id="61" idx="1"/>
+            <a:stCxn id="61" idx="0"/>
+            <a:endCxn id="36" idx="3"/>
           </p:cNvCxnSpPr>
           <p:nvPr/>
         </p:nvCxnSpPr>
         <p:spPr>
-          <a:xfrm rot="10800000" flipV="1">
-            <a:off x="6215921" y="4443266"/>
-            <a:ext cx="538588" cy="874694"/>
-          </a:xfrm>
-          <a:prstGeom prst="curvedConnector2">
-            <a:avLst/>
+          <a:xfrm rot="5400000" flipH="1" flipV="1">
+            <a:off x="1155937" y="3829540"/>
+            <a:ext cx="1898343" cy="1379129"/>
+          </a:xfrm>
+          <a:prstGeom prst="curvedConnector3">
+            <a:avLst>
+              <a:gd name="adj1" fmla="val 50000"/>
+            </a:avLst>
           </a:prstGeom>
           <a:ln w="57150">
             <a:solidFill>
@@ -4069,6 +3808,938 @@
           </a:fontRef>
         </p:style>
       </p:cxnSp>
+      <p:sp>
+        <p:nvSpPr>
+          <p:cNvPr id="36" name="Ellipse 35"/>
+          <p:cNvSpPr/>
+          <p:nvPr/>
+        </p:nvSpPr>
+        <p:spPr>
+          <a:xfrm>
+            <a:off x="2541678" y="2580321"/>
+            <a:ext cx="1727556" cy="1159401"/>
+          </a:xfrm>
+          <a:prstGeom prst="ellipse">
+            <a:avLst/>
+          </a:prstGeom>
+          <a:solidFill>
+            <a:schemeClr val="bg1">
+              <a:lumMod val="65000"/>
+            </a:schemeClr>
+          </a:solidFill>
+        </p:spPr>
+        <p:style>
+          <a:lnRef idx="2">
+            <a:schemeClr val="accent1">
+              <a:shade val="50000"/>
+            </a:schemeClr>
+          </a:lnRef>
+          <a:fillRef idx="1">
+            <a:schemeClr val="accent1"/>
+          </a:fillRef>
+          <a:effectRef idx="0">
+            <a:schemeClr val="accent1"/>
+          </a:effectRef>
+          <a:fontRef idx="minor">
+            <a:schemeClr val="lt1"/>
+          </a:fontRef>
+        </p:style>
+        <p:txBody>
+          <a:bodyPr rtlCol="0" anchor="ctr" anchorCtr="0"/>
+          <a:lstStyle/>
+          <a:p>
+            <a:pPr algn="ctr"/>
+            <a:r>
+              <a:rPr lang="fr-FR" sz="2800" dirty="0" err="1" smtClean="0"/>
+              <a:t>HBase</a:t>
+            </a:r>
+            <a:endParaRPr lang="fr-FR" sz="2800" dirty="0" smtClean="0"/>
+          </a:p>
+        </p:txBody>
+      </p:sp>
+      <p:sp>
+        <p:nvSpPr>
+          <p:cNvPr id="53" name="ZoneTexte 52"/>
+          <p:cNvSpPr txBox="1"/>
+          <p:nvPr/>
+        </p:nvSpPr>
+        <p:spPr>
+          <a:xfrm>
+            <a:off x="2620659" y="4401475"/>
+            <a:ext cx="1704569" cy="646331"/>
+          </a:xfrm>
+          <a:prstGeom prst="rect">
+            <a:avLst/>
+          </a:prstGeom>
+          <a:solidFill>
+            <a:schemeClr val="accent4">
+              <a:lumMod val="40000"/>
+              <a:lumOff val="60000"/>
+            </a:schemeClr>
+          </a:solidFill>
+        </p:spPr>
+        <p:txBody>
+          <a:bodyPr wrap="square" rtlCol="0">
+            <a:spAutoFit/>
+          </a:bodyPr>
+          <a:lstStyle/>
+          <a:p>
+            <a:pPr algn="ctr"/>
+            <a:r>
+              <a:rPr lang="fr-FR" dirty="0" smtClean="0"/>
+              <a:t>Authentification</a:t>
+            </a:r>
+          </a:p>
+          <a:p>
+            <a:pPr algn="ctr"/>
+            <a:r>
+              <a:rPr lang="fr-FR" dirty="0" smtClean="0"/>
+              <a:t>id</a:t>
+            </a:r>
+            <a:endParaRPr lang="fr-FR" dirty="0"/>
+          </a:p>
+        </p:txBody>
+      </p:sp>
+      <p:cxnSp>
+        <p:nvCxnSpPr>
+          <p:cNvPr id="55" name="Connecteur droit 13"/>
+          <p:cNvCxnSpPr>
+            <a:stCxn id="53" idx="3"/>
+            <a:endCxn id="11" idx="1"/>
+          </p:cNvCxnSpPr>
+          <p:nvPr/>
+        </p:nvCxnSpPr>
+        <p:spPr>
+          <a:xfrm>
+            <a:off x="4325228" y="4724641"/>
+            <a:ext cx="3568853" cy="1201919"/>
+          </a:xfrm>
+          <a:prstGeom prst="curvedConnector3">
+            <a:avLst>
+              <a:gd name="adj1" fmla="val 50000"/>
+            </a:avLst>
+          </a:prstGeom>
+          <a:ln w="57150">
+            <a:solidFill>
+              <a:srgbClr val="00B0F0"/>
+            </a:solidFill>
+            <a:tailEnd type="triangle"/>
+          </a:ln>
+        </p:spPr>
+        <p:style>
+          <a:lnRef idx="1">
+            <a:schemeClr val="accent1"/>
+          </a:lnRef>
+          <a:fillRef idx="0">
+            <a:schemeClr val="accent1"/>
+          </a:fillRef>
+          <a:effectRef idx="0">
+            <a:schemeClr val="accent1"/>
+          </a:effectRef>
+          <a:fontRef idx="minor">
+            <a:schemeClr val="tx1"/>
+          </a:fontRef>
+        </p:style>
+      </p:cxnSp>
+      <p:cxnSp>
+        <p:nvCxnSpPr>
+          <p:cNvPr id="56" name="Connecteur droit 13"/>
+          <p:cNvCxnSpPr>
+            <a:stCxn id="53" idx="0"/>
+            <a:endCxn id="36" idx="4"/>
+          </p:cNvCxnSpPr>
+          <p:nvPr/>
+        </p:nvCxnSpPr>
+        <p:spPr>
+          <a:xfrm rot="16200000" flipV="1">
+            <a:off x="3108324" y="4036855"/>
+            <a:ext cx="661753" cy="67488"/>
+          </a:xfrm>
+          <a:prstGeom prst="curvedConnector3">
+            <a:avLst>
+              <a:gd name="adj1" fmla="val 50000"/>
+            </a:avLst>
+          </a:prstGeom>
+          <a:ln w="57150">
+            <a:solidFill>
+              <a:srgbClr val="00B0F0"/>
+            </a:solidFill>
+            <a:tailEnd type="triangle"/>
+          </a:ln>
+        </p:spPr>
+        <p:style>
+          <a:lnRef idx="1">
+            <a:schemeClr val="accent1"/>
+          </a:lnRef>
+          <a:fillRef idx="0">
+            <a:schemeClr val="accent1"/>
+          </a:fillRef>
+          <a:effectRef idx="0">
+            <a:schemeClr val="accent1"/>
+          </a:effectRef>
+          <a:fontRef idx="minor">
+            <a:schemeClr val="tx1"/>
+          </a:fontRef>
+        </p:style>
+      </p:cxnSp>
+      <p:sp>
+        <p:nvSpPr>
+          <p:cNvPr id="52" name="ZoneTexte 51"/>
+          <p:cNvSpPr txBox="1"/>
+          <p:nvPr/>
+        </p:nvSpPr>
+        <p:spPr>
+          <a:xfrm>
+            <a:off x="7043510" y="5495095"/>
+            <a:ext cx="616579" cy="369332"/>
+          </a:xfrm>
+          <a:prstGeom prst="rect">
+            <a:avLst/>
+          </a:prstGeom>
+          <a:noFill/>
+        </p:spPr>
+        <p:txBody>
+          <a:bodyPr wrap="none" rtlCol="0">
+            <a:spAutoFit/>
+          </a:bodyPr>
+          <a:lstStyle/>
+          <a:p>
+            <a:r>
+              <a:rPr lang="fr-FR" dirty="0" smtClean="0"/>
+              <a:t>key2</a:t>
+            </a:r>
+            <a:endParaRPr lang="fr-FR" dirty="0"/>
+          </a:p>
+        </p:txBody>
+      </p:sp>
+      <p:sp>
+        <p:nvSpPr>
+          <p:cNvPr id="60" name="ZoneTexte 59"/>
+          <p:cNvSpPr txBox="1"/>
+          <p:nvPr/>
+        </p:nvSpPr>
+        <p:spPr>
+          <a:xfrm>
+            <a:off x="3366860" y="6171370"/>
+            <a:ext cx="616579" cy="369332"/>
+          </a:xfrm>
+          <a:prstGeom prst="rect">
+            <a:avLst/>
+          </a:prstGeom>
+          <a:noFill/>
+        </p:spPr>
+        <p:txBody>
+          <a:bodyPr wrap="none" rtlCol="0">
+            <a:spAutoFit/>
+          </a:bodyPr>
+          <a:lstStyle/>
+          <a:p>
+            <a:r>
+              <a:rPr lang="fr-FR" dirty="0" smtClean="0"/>
+              <a:t>key1</a:t>
+            </a:r>
+            <a:endParaRPr lang="fr-FR" dirty="0"/>
+          </a:p>
+        </p:txBody>
+      </p:sp>
+      <p:sp>
+        <p:nvSpPr>
+          <p:cNvPr id="64" name="ZoneTexte 63"/>
+          <p:cNvSpPr txBox="1"/>
+          <p:nvPr/>
+        </p:nvSpPr>
+        <p:spPr>
+          <a:xfrm>
+            <a:off x="4614635" y="523045"/>
+            <a:ext cx="1687385" cy="369332"/>
+          </a:xfrm>
+          <a:prstGeom prst="rect">
+            <a:avLst/>
+          </a:prstGeom>
+          <a:noFill/>
+        </p:spPr>
+        <p:txBody>
+          <a:bodyPr wrap="none" rtlCol="0">
+            <a:spAutoFit/>
+          </a:bodyPr>
+          <a:lstStyle/>
+          <a:p>
+            <a:r>
+              <a:rPr lang="fr-FR" dirty="0" smtClean="0"/>
+              <a:t>Session2</a:t>
+            </a:r>
+            <a:r>
+              <a:rPr lang="fr-FR" dirty="0" smtClean="0">
+                <a:sym typeface="Wingdings" panose="05000000000000000000" pitchFamily="2" charset="2"/>
+              </a:rPr>
+              <a:t>: (</a:t>
+            </a:r>
+            <a:r>
+              <a:rPr lang="fr-FR" dirty="0" smtClean="0"/>
+              <a:t>key2)</a:t>
+            </a:r>
+            <a:endParaRPr lang="fr-FR" dirty="0"/>
+          </a:p>
+        </p:txBody>
+      </p:sp>
+      <p:cxnSp>
+        <p:nvCxnSpPr>
+          <p:cNvPr id="65" name="Connecteur droit 13"/>
+          <p:cNvCxnSpPr>
+            <a:stCxn id="8" idx="1"/>
+            <a:endCxn id="54" idx="7"/>
+          </p:cNvCxnSpPr>
+          <p:nvPr/>
+        </p:nvCxnSpPr>
+        <p:spPr>
+          <a:xfrm rot="10800000">
+            <a:off x="4008959" y="1039771"/>
+            <a:ext cx="2083136" cy="899727"/>
+          </a:xfrm>
+          <a:prstGeom prst="curvedConnector4">
+            <a:avLst>
+              <a:gd name="adj1" fmla="val 41005"/>
+              <a:gd name="adj2" fmla="val 125408"/>
+            </a:avLst>
+          </a:prstGeom>
+          <a:ln w="57150">
+            <a:solidFill>
+              <a:srgbClr val="FF0000"/>
+            </a:solidFill>
+          </a:ln>
+        </p:spPr>
+        <p:style>
+          <a:lnRef idx="1">
+            <a:schemeClr val="accent1"/>
+          </a:lnRef>
+          <a:fillRef idx="0">
+            <a:schemeClr val="accent1"/>
+          </a:fillRef>
+          <a:effectRef idx="0">
+            <a:schemeClr val="accent1"/>
+          </a:effectRef>
+          <a:fontRef idx="minor">
+            <a:schemeClr val="tx1"/>
+          </a:fontRef>
+        </p:style>
+      </p:cxnSp>
+      <p:sp>
+        <p:nvSpPr>
+          <p:cNvPr id="67" name="ZoneTexte 66"/>
+          <p:cNvSpPr txBox="1"/>
+          <p:nvPr/>
+        </p:nvSpPr>
+        <p:spPr>
+          <a:xfrm>
+            <a:off x="4166960" y="2580445"/>
+            <a:ext cx="1687385" cy="369332"/>
+          </a:xfrm>
+          <a:prstGeom prst="rect">
+            <a:avLst/>
+          </a:prstGeom>
+          <a:noFill/>
+        </p:spPr>
+        <p:txBody>
+          <a:bodyPr wrap="none" rtlCol="0">
+            <a:spAutoFit/>
+          </a:bodyPr>
+          <a:lstStyle/>
+          <a:p>
+            <a:r>
+              <a:rPr lang="fr-FR" dirty="0" smtClean="0"/>
+              <a:t>Session1: (key1)</a:t>
+            </a:r>
+            <a:endParaRPr lang="fr-FR" dirty="0"/>
+          </a:p>
+        </p:txBody>
+      </p:sp>
+      <p:grpSp>
+        <p:nvGrpSpPr>
+          <p:cNvPr id="94" name="Groupe 93"/>
+          <p:cNvGrpSpPr/>
+          <p:nvPr/>
+        </p:nvGrpSpPr>
+        <p:grpSpPr>
+          <a:xfrm>
+            <a:off x="8457208" y="1768047"/>
+            <a:ext cx="2848967" cy="2340471"/>
+            <a:chOff x="8581033" y="2126759"/>
+            <a:chExt cx="2848967" cy="2452453"/>
+          </a:xfrm>
+        </p:grpSpPr>
+        <p:sp>
+          <p:nvSpPr>
+            <p:cNvPr id="83" name="Rectangle 82"/>
+            <p:cNvSpPr/>
+            <p:nvPr/>
+          </p:nvSpPr>
+          <p:spPr>
+            <a:xfrm>
+              <a:off x="8581033" y="2126759"/>
+              <a:ext cx="2848967" cy="2452453"/>
+            </a:xfrm>
+            <a:prstGeom prst="rect">
+              <a:avLst/>
+            </a:prstGeom>
+            <a:solidFill>
+              <a:schemeClr val="accent4">
+                <a:lumMod val="60000"/>
+                <a:lumOff val="40000"/>
+              </a:schemeClr>
+            </a:solidFill>
+          </p:spPr>
+          <p:style>
+            <a:lnRef idx="2">
+              <a:schemeClr val="accent1">
+                <a:shade val="50000"/>
+              </a:schemeClr>
+            </a:lnRef>
+            <a:fillRef idx="1">
+              <a:schemeClr val="accent1"/>
+            </a:fillRef>
+            <a:effectRef idx="0">
+              <a:schemeClr val="accent1"/>
+            </a:effectRef>
+            <a:fontRef idx="minor">
+              <a:schemeClr val="lt1"/>
+            </a:fontRef>
+          </p:style>
+          <p:txBody>
+            <a:bodyPr rtlCol="0" anchor="ctr"/>
+            <a:lstStyle/>
+            <a:p>
+              <a:pPr algn="ctr"/>
+              <a:endParaRPr lang="fr-FR"/>
+            </a:p>
+          </p:txBody>
+        </p:sp>
+        <p:sp>
+          <p:nvSpPr>
+            <p:cNvPr id="47" name="Ellipse 46"/>
+            <p:cNvSpPr/>
+            <p:nvPr/>
+          </p:nvSpPr>
+          <p:spPr>
+            <a:xfrm>
+              <a:off x="8978064" y="3014596"/>
+              <a:ext cx="2128086" cy="920457"/>
+            </a:xfrm>
+            <a:prstGeom prst="ellipse">
+              <a:avLst/>
+            </a:prstGeom>
+            <a:solidFill>
+              <a:schemeClr val="bg1">
+                <a:lumMod val="65000"/>
+              </a:schemeClr>
+            </a:solidFill>
+          </p:spPr>
+          <p:style>
+            <a:lnRef idx="2">
+              <a:schemeClr val="accent1">
+                <a:shade val="50000"/>
+              </a:schemeClr>
+            </a:lnRef>
+            <a:fillRef idx="1">
+              <a:schemeClr val="accent1"/>
+            </a:fillRef>
+            <a:effectRef idx="0">
+              <a:schemeClr val="accent1"/>
+            </a:effectRef>
+            <a:fontRef idx="minor">
+              <a:schemeClr val="lt1"/>
+            </a:fontRef>
+          </p:style>
+          <p:txBody>
+            <a:bodyPr rtlCol="0" anchor="ctr" anchorCtr="0"/>
+            <a:lstStyle/>
+            <a:p>
+              <a:pPr algn="ctr"/>
+              <a:r>
+                <a:rPr lang="fr-FR" sz="2800" dirty="0" smtClean="0"/>
+                <a:t>Gateway</a:t>
+              </a:r>
+            </a:p>
+            <a:p>
+              <a:pPr algn="ctr"/>
+              <a:r>
+                <a:rPr lang="fr-FR" sz="2800" dirty="0" smtClean="0"/>
+                <a:t>Knox</a:t>
+              </a:r>
+              <a:endParaRPr lang="fr-FR" sz="2800" dirty="0" smtClean="0"/>
+            </a:p>
+          </p:txBody>
+        </p:sp>
+        <p:sp>
+          <p:nvSpPr>
+            <p:cNvPr id="62" name="ZoneTexte 61"/>
+            <p:cNvSpPr txBox="1"/>
+            <p:nvPr/>
+          </p:nvSpPr>
+          <p:spPr>
+            <a:xfrm>
+              <a:off x="9967685" y="2651248"/>
+              <a:ext cx="757643" cy="369332"/>
+            </a:xfrm>
+            <a:prstGeom prst="rect">
+              <a:avLst/>
+            </a:prstGeom>
+            <a:noFill/>
+          </p:spPr>
+          <p:txBody>
+            <a:bodyPr wrap="none" rtlCol="0">
+              <a:spAutoFit/>
+            </a:bodyPr>
+            <a:lstStyle/>
+            <a:p>
+              <a:r>
+                <a:rPr lang="fr-FR" dirty="0" smtClean="0"/>
+                <a:t>(key2)</a:t>
+              </a:r>
+              <a:endParaRPr lang="fr-FR" dirty="0"/>
+            </a:p>
+          </p:txBody>
+        </p:sp>
+        <p:sp>
+          <p:nvSpPr>
+            <p:cNvPr id="80" name="ZoneTexte 79"/>
+            <p:cNvSpPr txBox="1"/>
+            <p:nvPr/>
+          </p:nvSpPr>
+          <p:spPr>
+            <a:xfrm>
+              <a:off x="9072335" y="2660774"/>
+              <a:ext cx="757643" cy="369332"/>
+            </a:xfrm>
+            <a:prstGeom prst="rect">
+              <a:avLst/>
+            </a:prstGeom>
+            <a:noFill/>
+          </p:spPr>
+          <p:txBody>
+            <a:bodyPr wrap="none" rtlCol="0">
+              <a:spAutoFit/>
+            </a:bodyPr>
+            <a:lstStyle/>
+            <a:p>
+              <a:r>
+                <a:rPr lang="fr-FR" dirty="0" smtClean="0"/>
+                <a:t>(key1)</a:t>
+              </a:r>
+              <a:endParaRPr lang="fr-FR" dirty="0"/>
+            </a:p>
+          </p:txBody>
+        </p:sp>
+      </p:grpSp>
+      <p:grpSp>
+        <p:nvGrpSpPr>
+          <p:cNvPr id="93" name="Groupe 92"/>
+          <p:cNvGrpSpPr/>
+          <p:nvPr/>
+        </p:nvGrpSpPr>
+        <p:grpSpPr>
+          <a:xfrm>
+            <a:off x="6092095" y="1482297"/>
+            <a:ext cx="1727263" cy="915030"/>
+            <a:chOff x="6092095" y="1482297"/>
+            <a:chExt cx="1727263" cy="915030"/>
+          </a:xfrm>
+        </p:grpSpPr>
+        <p:sp>
+          <p:nvSpPr>
+            <p:cNvPr id="8" name="Rectangle 7"/>
+            <p:cNvSpPr/>
+            <p:nvPr/>
+          </p:nvSpPr>
+          <p:spPr>
+            <a:xfrm>
+              <a:off x="6092095" y="1482297"/>
+              <a:ext cx="1664745" cy="914400"/>
+            </a:xfrm>
+            <a:prstGeom prst="rect">
+              <a:avLst/>
+            </a:prstGeom>
+            <a:solidFill>
+              <a:srgbClr val="FF0000"/>
+            </a:solidFill>
+          </p:spPr>
+          <p:style>
+            <a:lnRef idx="2">
+              <a:schemeClr val="accent1">
+                <a:shade val="50000"/>
+              </a:schemeClr>
+            </a:lnRef>
+            <a:fillRef idx="1">
+              <a:schemeClr val="accent1"/>
+            </a:fillRef>
+            <a:effectRef idx="0">
+              <a:schemeClr val="accent1"/>
+            </a:effectRef>
+            <a:fontRef idx="minor">
+              <a:schemeClr val="lt1"/>
+            </a:fontRef>
+          </p:style>
+          <p:txBody>
+            <a:bodyPr rtlCol="0" anchor="ctr"/>
+            <a:lstStyle/>
+            <a:p>
+              <a:pPr algn="ctr"/>
+              <a:r>
+                <a:rPr lang="fr-FR" dirty="0" err="1" smtClean="0"/>
+                <a:t>Livy</a:t>
+              </a:r>
+              <a:endParaRPr lang="fr-FR" dirty="0"/>
+            </a:p>
+          </p:txBody>
+        </p:sp>
+        <p:sp>
+          <p:nvSpPr>
+            <p:cNvPr id="81" name="ZoneTexte 80"/>
+            <p:cNvSpPr txBox="1"/>
+            <p:nvPr/>
+          </p:nvSpPr>
+          <p:spPr>
+            <a:xfrm>
+              <a:off x="6157685" y="2027995"/>
+              <a:ext cx="1661673" cy="369332"/>
+            </a:xfrm>
+            <a:prstGeom prst="rect">
+              <a:avLst/>
+            </a:prstGeom>
+            <a:noFill/>
+          </p:spPr>
+          <p:txBody>
+            <a:bodyPr wrap="none" rtlCol="0">
+              <a:spAutoFit/>
+            </a:bodyPr>
+            <a:lstStyle/>
+            <a:p>
+              <a:r>
+                <a:rPr lang="fr-FR" dirty="0" err="1" smtClean="0"/>
+                <a:t>Context</a:t>
+              </a:r>
+              <a:r>
+                <a:rPr lang="fr-FR" dirty="0" smtClean="0"/>
+                <a:t>: </a:t>
+              </a:r>
+              <a:r>
+                <a:rPr lang="fr-FR" dirty="0" err="1" smtClean="0"/>
+                <a:t>UserID</a:t>
+              </a:r>
+              <a:endParaRPr lang="fr-FR" dirty="0"/>
+            </a:p>
+          </p:txBody>
+        </p:sp>
+      </p:grpSp>
+      <p:cxnSp>
+        <p:nvCxnSpPr>
+          <p:cNvPr id="49" name="Connecteur droit 13"/>
+          <p:cNvCxnSpPr>
+            <a:stCxn id="8" idx="3"/>
+            <a:endCxn id="47" idx="0"/>
+          </p:cNvCxnSpPr>
+          <p:nvPr/>
+        </p:nvCxnSpPr>
+        <p:spPr>
+          <a:xfrm>
+            <a:off x="7756840" y="1939497"/>
+            <a:ext cx="2161442" cy="675847"/>
+          </a:xfrm>
+          <a:prstGeom prst="curvedConnector2">
+            <a:avLst/>
+          </a:prstGeom>
+          <a:ln w="57150">
+            <a:solidFill>
+              <a:srgbClr val="FF0000"/>
+            </a:solidFill>
+          </a:ln>
+        </p:spPr>
+        <p:style>
+          <a:lnRef idx="1">
+            <a:schemeClr val="accent1"/>
+          </a:lnRef>
+          <a:fillRef idx="0">
+            <a:schemeClr val="accent1"/>
+          </a:fillRef>
+          <a:effectRef idx="0">
+            <a:schemeClr val="accent1"/>
+          </a:effectRef>
+          <a:fontRef idx="minor">
+            <a:schemeClr val="tx1"/>
+          </a:fontRef>
+        </p:style>
+      </p:cxnSp>
+      <p:cxnSp>
+        <p:nvCxnSpPr>
+          <p:cNvPr id="76" name="Connecteur droit 13"/>
+          <p:cNvCxnSpPr>
+            <a:stCxn id="47" idx="4"/>
+            <a:endCxn id="9" idx="3"/>
+          </p:cNvCxnSpPr>
+          <p:nvPr/>
+        </p:nvCxnSpPr>
+        <p:spPr>
+          <a:xfrm rot="5400000">
+            <a:off x="8654900" y="2799372"/>
+            <a:ext cx="568982" cy="1957783"/>
+          </a:xfrm>
+          <a:prstGeom prst="curvedConnector2">
+            <a:avLst/>
+          </a:prstGeom>
+          <a:ln w="57150">
+            <a:solidFill>
+              <a:srgbClr val="FF0000"/>
+            </a:solidFill>
+          </a:ln>
+        </p:spPr>
+        <p:style>
+          <a:lnRef idx="1">
+            <a:schemeClr val="accent1"/>
+          </a:lnRef>
+          <a:fillRef idx="0">
+            <a:schemeClr val="accent1"/>
+          </a:fillRef>
+          <a:effectRef idx="0">
+            <a:schemeClr val="accent1"/>
+          </a:effectRef>
+          <a:fontRef idx="minor">
+            <a:schemeClr val="tx1"/>
+          </a:fontRef>
+        </p:style>
+      </p:cxnSp>
+      <p:sp>
+        <p:nvSpPr>
+          <p:cNvPr id="100" name="ZoneTexte 99"/>
+          <p:cNvSpPr txBox="1"/>
+          <p:nvPr/>
+        </p:nvSpPr>
+        <p:spPr>
+          <a:xfrm>
+            <a:off x="9260919" y="1343950"/>
+            <a:ext cx="2722410" cy="646331"/>
+          </a:xfrm>
+          <a:prstGeom prst="rect">
+            <a:avLst/>
+          </a:prstGeom>
+          <a:solidFill>
+            <a:schemeClr val="accent4">
+              <a:lumMod val="40000"/>
+              <a:lumOff val="60000"/>
+            </a:schemeClr>
+          </a:solidFill>
+        </p:spPr>
+        <p:txBody>
+          <a:bodyPr wrap="square" rtlCol="0">
+            <a:spAutoFit/>
+          </a:bodyPr>
+          <a:lstStyle/>
+          <a:p>
+            <a:pPr algn="ctr"/>
+            <a:r>
+              <a:rPr lang="fr-FR" dirty="0" smtClean="0"/>
+              <a:t>Authentification </a:t>
+            </a:r>
+            <a:r>
+              <a:rPr lang="fr-FR" dirty="0" smtClean="0"/>
+              <a:t>LDAP</a:t>
+            </a:r>
+          </a:p>
+          <a:p>
+            <a:pPr algn="ctr"/>
+            <a:r>
+              <a:rPr lang="fr-FR" dirty="0" smtClean="0"/>
+              <a:t>(</a:t>
+            </a:r>
+            <a:r>
+              <a:rPr lang="fr-FR" dirty="0" err="1" smtClean="0"/>
+              <a:t>UserID</a:t>
+            </a:r>
+            <a:r>
+              <a:rPr lang="fr-FR" dirty="0" smtClean="0"/>
+              <a:t>)</a:t>
+            </a:r>
+            <a:endParaRPr lang="fr-FR" dirty="0"/>
+          </a:p>
+        </p:txBody>
+      </p:sp>
+      <p:cxnSp>
+        <p:nvCxnSpPr>
+          <p:cNvPr id="103" name="Connecteur droit 13"/>
+          <p:cNvCxnSpPr>
+            <a:stCxn id="107" idx="1"/>
+            <a:endCxn id="36" idx="5"/>
+          </p:cNvCxnSpPr>
+          <p:nvPr/>
+        </p:nvCxnSpPr>
+        <p:spPr>
+          <a:xfrm rot="10800000">
+            <a:off x="4016240" y="3569932"/>
+            <a:ext cx="147469" cy="473284"/>
+          </a:xfrm>
+          <a:prstGeom prst="curvedConnector2">
+            <a:avLst/>
+          </a:prstGeom>
+          <a:ln w="57150">
+            <a:solidFill>
+              <a:srgbClr val="00B0F0"/>
+            </a:solidFill>
+            <a:tailEnd type="triangle"/>
+          </a:ln>
+        </p:spPr>
+        <p:style>
+          <a:lnRef idx="1">
+            <a:schemeClr val="accent1"/>
+          </a:lnRef>
+          <a:fillRef idx="0">
+            <a:schemeClr val="accent1"/>
+          </a:fillRef>
+          <a:effectRef idx="0">
+            <a:schemeClr val="accent1"/>
+          </a:effectRef>
+          <a:fontRef idx="minor">
+            <a:schemeClr val="tx1"/>
+          </a:fontRef>
+        </p:style>
+      </p:cxnSp>
+      <p:sp>
+        <p:nvSpPr>
+          <p:cNvPr id="107" name="ZoneTexte 106"/>
+          <p:cNvSpPr txBox="1"/>
+          <p:nvPr/>
+        </p:nvSpPr>
+        <p:spPr>
+          <a:xfrm>
+            <a:off x="4163708" y="3858550"/>
+            <a:ext cx="1383753" cy="369332"/>
+          </a:xfrm>
+          <a:prstGeom prst="rect">
+            <a:avLst/>
+          </a:prstGeom>
+          <a:solidFill>
+            <a:schemeClr val="accent4">
+              <a:lumMod val="40000"/>
+              <a:lumOff val="60000"/>
+            </a:schemeClr>
+          </a:solidFill>
+        </p:spPr>
+        <p:txBody>
+          <a:bodyPr wrap="square" rtlCol="0">
+            <a:spAutoFit/>
+          </a:bodyPr>
+          <a:lstStyle/>
+          <a:p>
+            <a:r>
+              <a:rPr lang="fr-FR" dirty="0" smtClean="0"/>
+              <a:t>Certification</a:t>
+            </a:r>
+            <a:endParaRPr lang="fr-FR" dirty="0"/>
+          </a:p>
+        </p:txBody>
+      </p:sp>
+      <p:cxnSp>
+        <p:nvCxnSpPr>
+          <p:cNvPr id="109" name="Connecteur droit 13"/>
+          <p:cNvCxnSpPr>
+            <a:stCxn id="107" idx="3"/>
+            <a:endCxn id="9" idx="1"/>
+          </p:cNvCxnSpPr>
+          <p:nvPr/>
+        </p:nvCxnSpPr>
+        <p:spPr>
+          <a:xfrm>
+            <a:off x="5547461" y="4043216"/>
+            <a:ext cx="447882" cy="19538"/>
+          </a:xfrm>
+          <a:prstGeom prst="curvedConnector3">
+            <a:avLst>
+              <a:gd name="adj1" fmla="val 50000"/>
+            </a:avLst>
+          </a:prstGeom>
+          <a:ln w="57150">
+            <a:solidFill>
+              <a:srgbClr val="00B0F0"/>
+            </a:solidFill>
+            <a:tailEnd type="triangle"/>
+          </a:ln>
+        </p:spPr>
+        <p:style>
+          <a:lnRef idx="1">
+            <a:schemeClr val="accent1"/>
+          </a:lnRef>
+          <a:fillRef idx="0">
+            <a:schemeClr val="accent1"/>
+          </a:fillRef>
+          <a:effectRef idx="0">
+            <a:schemeClr val="accent1"/>
+          </a:effectRef>
+          <a:fontRef idx="minor">
+            <a:schemeClr val="tx1"/>
+          </a:fontRef>
+        </p:style>
+      </p:cxnSp>
+      <p:sp>
+        <p:nvSpPr>
+          <p:cNvPr id="115" name="ZoneTexte 114"/>
+          <p:cNvSpPr txBox="1"/>
+          <p:nvPr/>
+        </p:nvSpPr>
+        <p:spPr>
+          <a:xfrm>
+            <a:off x="7176860" y="4152070"/>
+            <a:ext cx="817853" cy="369332"/>
+          </a:xfrm>
+          <a:prstGeom prst="rect">
+            <a:avLst/>
+          </a:prstGeom>
+          <a:noFill/>
+        </p:spPr>
+        <p:txBody>
+          <a:bodyPr wrap="none" rtlCol="0">
+            <a:spAutoFit/>
+          </a:bodyPr>
+          <a:lstStyle/>
+          <a:p>
+            <a:r>
+              <a:rPr lang="fr-FR" dirty="0" err="1" smtClean="0"/>
+              <a:t>UserID</a:t>
+            </a:r>
+            <a:endParaRPr lang="fr-FR" dirty="0"/>
+          </a:p>
+        </p:txBody>
+      </p:sp>
+      <p:sp>
+        <p:nvSpPr>
+          <p:cNvPr id="116" name="ZoneTexte 115"/>
+          <p:cNvSpPr txBox="1"/>
+          <p:nvPr/>
+        </p:nvSpPr>
+        <p:spPr>
+          <a:xfrm>
+            <a:off x="2481035" y="3256720"/>
+            <a:ext cx="1872768" cy="369332"/>
+          </a:xfrm>
+          <a:prstGeom prst="rect">
+            <a:avLst/>
+          </a:prstGeom>
+          <a:noFill/>
+        </p:spPr>
+        <p:txBody>
+          <a:bodyPr wrap="square" rtlCol="0">
+            <a:spAutoFit/>
+          </a:bodyPr>
+          <a:lstStyle/>
+          <a:p>
+            <a:r>
+              <a:rPr lang="fr-FR" dirty="0" smtClean="0"/>
+              <a:t>Organisations/</a:t>
+            </a:r>
+            <a:r>
+              <a:rPr lang="fr-FR" dirty="0" err="1" smtClean="0"/>
+              <a:t>ids</a:t>
+            </a:r>
+            <a:endParaRPr lang="fr-FR" dirty="0"/>
+          </a:p>
+        </p:txBody>
+      </p:sp>
     </p:spTree>
     <p:extLst>
       <p:ext uri="{BB962C8B-B14F-4D97-AF65-F5344CB8AC3E}">

</xml_diff>

<commit_message>
Adapt both Livy and HBase to get the connexion via a gateway HBase:   + create a library based on APIREST
</commit_message>
<xml_diff>
--- a/doc/Design.pptx
+++ b/doc/Design.pptx
@@ -2971,98 +2971,6 @@
       </p:grpSpPr>
       <p:sp>
         <p:nvSpPr>
-          <p:cNvPr id="98" name="Rectangle 97"/>
-          <p:cNvSpPr/>
-          <p:nvPr/>
-        </p:nvSpPr>
-        <p:spPr>
-          <a:xfrm>
-            <a:off x="6893361" y="5153025"/>
-            <a:ext cx="2622114" cy="1387677"/>
-          </a:xfrm>
-          <a:prstGeom prst="rect">
-            <a:avLst/>
-          </a:prstGeom>
-          <a:solidFill>
-            <a:schemeClr val="accent2">
-              <a:lumMod val="40000"/>
-              <a:lumOff val="60000"/>
-            </a:schemeClr>
-          </a:solidFill>
-        </p:spPr>
-        <p:style>
-          <a:lnRef idx="2">
-            <a:schemeClr val="accent1">
-              <a:shade val="50000"/>
-            </a:schemeClr>
-          </a:lnRef>
-          <a:fillRef idx="1">
-            <a:schemeClr val="accent1"/>
-          </a:fillRef>
-          <a:effectRef idx="0">
-            <a:schemeClr val="accent1"/>
-          </a:effectRef>
-          <a:fontRef idx="minor">
-            <a:schemeClr val="lt1"/>
-          </a:fontRef>
-        </p:style>
-        <p:txBody>
-          <a:bodyPr rtlCol="0" anchor="ctr"/>
-          <a:lstStyle/>
-          <a:p>
-            <a:pPr algn="ctr"/>
-            <a:endParaRPr lang="fr-FR"/>
-          </a:p>
-        </p:txBody>
-      </p:sp>
-      <p:sp>
-        <p:nvSpPr>
-          <p:cNvPr id="82" name="Rectangle 81"/>
-          <p:cNvSpPr/>
-          <p:nvPr/>
-        </p:nvSpPr>
-        <p:spPr>
-          <a:xfrm>
-            <a:off x="3156109" y="5406063"/>
-            <a:ext cx="2504516" cy="1354687"/>
-          </a:xfrm>
-          <a:prstGeom prst="rect">
-            <a:avLst/>
-          </a:prstGeom>
-          <a:solidFill>
-            <a:schemeClr val="accent2">
-              <a:lumMod val="40000"/>
-              <a:lumOff val="60000"/>
-            </a:schemeClr>
-          </a:solidFill>
-        </p:spPr>
-        <p:style>
-          <a:lnRef idx="2">
-            <a:schemeClr val="accent1">
-              <a:shade val="50000"/>
-            </a:schemeClr>
-          </a:lnRef>
-          <a:fillRef idx="1">
-            <a:schemeClr val="accent1"/>
-          </a:fillRef>
-          <a:effectRef idx="0">
-            <a:schemeClr val="accent1"/>
-          </a:effectRef>
-          <a:fontRef idx="minor">
-            <a:schemeClr val="lt1"/>
-          </a:fontRef>
-        </p:style>
-        <p:txBody>
-          <a:bodyPr rtlCol="0" anchor="ctr"/>
-          <a:lstStyle/>
-          <a:p>
-            <a:pPr algn="ctr"/>
-            <a:endParaRPr lang="fr-FR"/>
-          </a:p>
-        </p:txBody>
-      </p:sp>
-      <p:sp>
-        <p:nvSpPr>
           <p:cNvPr id="51" name="Rectangle 50"/>
           <p:cNvSpPr/>
           <p:nvPr/>
@@ -3209,36 +3117,86 @@
           </a:p>
         </p:txBody>
       </p:sp>
+      <p:sp>
+        <p:nvSpPr>
+          <p:cNvPr id="9" name="Rectangle 8"/>
+          <p:cNvSpPr/>
+          <p:nvPr/>
+        </p:nvSpPr>
+        <p:spPr>
+          <a:xfrm>
+            <a:off x="6492576" y="3605554"/>
+            <a:ext cx="1610798" cy="914400"/>
+          </a:xfrm>
+          <a:prstGeom prst="rect">
+            <a:avLst/>
+          </a:prstGeom>
+          <a:solidFill>
+            <a:srgbClr val="00B050"/>
+          </a:solidFill>
+        </p:spPr>
+        <p:style>
+          <a:lnRef idx="2">
+            <a:schemeClr val="accent1">
+              <a:shade val="50000"/>
+            </a:schemeClr>
+          </a:lnRef>
+          <a:fillRef idx="1">
+            <a:schemeClr val="accent1"/>
+          </a:fillRef>
+          <a:effectRef idx="0">
+            <a:schemeClr val="accent1"/>
+          </a:effectRef>
+          <a:fontRef idx="minor">
+            <a:schemeClr val="lt1"/>
+          </a:fontRef>
+        </p:style>
+        <p:txBody>
+          <a:bodyPr rtlCol="0" anchor="ctr"/>
+          <a:lstStyle/>
+          <a:p>
+            <a:pPr algn="ctr"/>
+            <a:r>
+              <a:rPr lang="fr-FR" dirty="0" smtClean="0"/>
+              <a:t>Monitor Server</a:t>
+            </a:r>
+            <a:endParaRPr lang="fr-FR" dirty="0"/>
+          </a:p>
+        </p:txBody>
+      </p:sp>
       <p:grpSp>
         <p:nvGrpSpPr>
-          <p:cNvPr id="34" name="Groupe 33"/>
+          <p:cNvPr id="131" name="Groupe 130"/>
           <p:cNvGrpSpPr/>
           <p:nvPr/>
         </p:nvGrpSpPr>
         <p:grpSpPr>
           <a:xfrm>
-            <a:off x="5995343" y="3605554"/>
-            <a:ext cx="3262316" cy="2722056"/>
-            <a:chOff x="2678314" y="3681754"/>
-            <a:chExt cx="3262316" cy="2722056"/>
+            <a:off x="7491187" y="5115940"/>
+            <a:ext cx="2271940" cy="1072611"/>
+            <a:chOff x="7929335" y="5363590"/>
+            <a:chExt cx="2217957" cy="1072611"/>
           </a:xfrm>
         </p:grpSpPr>
         <p:sp>
           <p:nvSpPr>
-            <p:cNvPr id="9" name="Rectangle 8"/>
+            <p:cNvPr id="98" name="Rectangle 97"/>
             <p:cNvSpPr/>
             <p:nvPr/>
           </p:nvSpPr>
           <p:spPr>
             <a:xfrm>
-              <a:off x="2678314" y="3681754"/>
-              <a:ext cx="1965156" cy="914400"/>
+              <a:off x="7929335" y="5363590"/>
+              <a:ext cx="2217957" cy="1072611"/>
             </a:xfrm>
             <a:prstGeom prst="rect">
               <a:avLst/>
             </a:prstGeom>
             <a:solidFill>
-              <a:srgbClr val="00B050"/>
+              <a:schemeClr val="accent2">
+                <a:lumMod val="40000"/>
+                <a:lumOff val="60000"/>
+              </a:schemeClr>
             </a:solidFill>
           </p:spPr>
           <p:style>
@@ -3262,9 +3220,35 @@
             <a:lstStyle/>
             <a:p>
               <a:pPr algn="ctr"/>
+              <a:endParaRPr lang="fr-FR"/>
+            </a:p>
+          </p:txBody>
+        </p:sp>
+        <p:sp>
+          <p:nvSpPr>
+            <p:cNvPr id="52" name="ZoneTexte 51"/>
+            <p:cNvSpPr txBox="1"/>
+            <p:nvPr/>
+          </p:nvSpPr>
+          <p:spPr>
+            <a:xfrm>
+              <a:off x="7929335" y="5495095"/>
+              <a:ext cx="616579" cy="369332"/>
+            </a:xfrm>
+            <a:prstGeom prst="rect">
+              <a:avLst/>
+            </a:prstGeom>
+            <a:noFill/>
+          </p:spPr>
+          <p:txBody>
+            <a:bodyPr wrap="none" rtlCol="0">
+              <a:spAutoFit/>
+            </a:bodyPr>
+            <a:lstStyle/>
+            <a:p>
               <a:r>
                 <a:rPr lang="fr-FR" dirty="0" smtClean="0"/>
-                <a:t>Monitor Server</a:t>
+                <a:t>key2</a:t>
               </a:r>
               <a:endParaRPr lang="fr-FR" dirty="0"/>
             </a:p>
@@ -3278,7 +3262,7 @@
           </p:nvSpPr>
           <p:spPr>
             <a:xfrm>
-              <a:off x="4577052" y="5601710"/>
+              <a:off x="8637031" y="5525510"/>
               <a:ext cx="1363578" cy="802100"/>
             </a:xfrm>
             <a:prstGeom prst="rect">
@@ -3317,47 +3301,47 @@
             </a:p>
           </p:txBody>
         </p:sp>
-        <p:cxnSp>
-          <p:nvCxnSpPr>
-            <p:cNvPr id="15" name="Connecteur droit 13"/>
-            <p:cNvCxnSpPr>
-              <a:stCxn id="11" idx="0"/>
-              <a:endCxn id="9" idx="2"/>
-            </p:cNvCxnSpPr>
-            <p:nvPr/>
-          </p:nvCxnSpPr>
-          <p:spPr>
-            <a:xfrm rot="16200000" flipV="1">
-              <a:off x="3957089" y="4299957"/>
-              <a:ext cx="1005556" cy="1597949"/>
-            </a:xfrm>
-            <a:prstGeom prst="curvedConnector3">
-              <a:avLst>
-                <a:gd name="adj1" fmla="val 50000"/>
-              </a:avLst>
-            </a:prstGeom>
-            <a:ln w="57150">
-              <a:solidFill>
-                <a:srgbClr val="FF0000"/>
-              </a:solidFill>
-            </a:ln>
-          </p:spPr>
-          <p:style>
-            <a:lnRef idx="1">
-              <a:schemeClr val="accent1"/>
-            </a:lnRef>
-            <a:fillRef idx="0">
-              <a:schemeClr val="accent1"/>
-            </a:fillRef>
-            <a:effectRef idx="0">
-              <a:schemeClr val="accent1"/>
-            </a:effectRef>
-            <a:fontRef idx="minor">
-              <a:schemeClr val="tx1"/>
-            </a:fontRef>
-          </p:style>
-        </p:cxnSp>
       </p:grpSp>
+      <p:cxnSp>
+        <p:nvCxnSpPr>
+          <p:cNvPr id="15" name="Connecteur droit 13"/>
+          <p:cNvCxnSpPr>
+            <a:stCxn id="11" idx="0"/>
+            <a:endCxn id="9" idx="2"/>
+          </p:cNvCxnSpPr>
+          <p:nvPr/>
+        </p:nvCxnSpPr>
+        <p:spPr>
+          <a:xfrm rot="16200000" flipV="1">
+            <a:off x="7727280" y="4090649"/>
+            <a:ext cx="757906" cy="1616516"/>
+          </a:xfrm>
+          <a:prstGeom prst="curvedConnector3">
+            <a:avLst>
+              <a:gd name="adj1" fmla="val 50000"/>
+            </a:avLst>
+          </a:prstGeom>
+          <a:ln w="57150">
+            <a:solidFill>
+              <a:srgbClr val="FF0000"/>
+            </a:solidFill>
+          </a:ln>
+        </p:spPr>
+        <p:style>
+          <a:lnRef idx="1">
+            <a:schemeClr val="accent1"/>
+          </a:lnRef>
+          <a:fillRef idx="0">
+            <a:schemeClr val="accent1"/>
+          </a:fillRef>
+          <a:effectRef idx="0">
+            <a:schemeClr val="accent1"/>
+          </a:effectRef>
+          <a:fontRef idx="minor">
+            <a:schemeClr val="tx1"/>
+          </a:fontRef>
+        </p:style>
+      </p:cxnSp>
       <p:cxnSp>
         <p:nvCxnSpPr>
           <p:cNvPr id="24" name="Connecteur droit 13"/>
@@ -3529,20 +3513,327 @@
           </a:p>
         </p:txBody>
       </p:sp>
+      <p:sp>
+        <p:nvSpPr>
+          <p:cNvPr id="54" name="Ellipse 53"/>
+          <p:cNvSpPr/>
+          <p:nvPr/>
+        </p:nvSpPr>
+        <p:spPr>
+          <a:xfrm>
+            <a:off x="1824789" y="879917"/>
+            <a:ext cx="2558914" cy="1091544"/>
+          </a:xfrm>
+          <a:prstGeom prst="ellipse">
+            <a:avLst/>
+          </a:prstGeom>
+          <a:solidFill>
+            <a:schemeClr val="bg1">
+              <a:lumMod val="65000"/>
+            </a:schemeClr>
+          </a:solidFill>
+        </p:spPr>
+        <p:style>
+          <a:lnRef idx="2">
+            <a:schemeClr val="accent1">
+              <a:shade val="50000"/>
+            </a:schemeClr>
+          </a:lnRef>
+          <a:fillRef idx="1">
+            <a:schemeClr val="accent1"/>
+          </a:fillRef>
+          <a:effectRef idx="0">
+            <a:schemeClr val="accent1"/>
+          </a:effectRef>
+          <a:fontRef idx="minor">
+            <a:schemeClr val="lt1"/>
+          </a:fontRef>
+        </p:style>
+        <p:txBody>
+          <a:bodyPr rtlCol="0" anchor="ctr" anchorCtr="0"/>
+          <a:lstStyle/>
+          <a:p>
+            <a:pPr algn="ctr"/>
+            <a:r>
+              <a:rPr lang="fr-FR" sz="2800" dirty="0" err="1" smtClean="0"/>
+              <a:t>Spark</a:t>
+            </a:r>
+            <a:r>
+              <a:rPr lang="fr-FR" sz="2800" dirty="0" smtClean="0"/>
+              <a:t> cluster</a:t>
+            </a:r>
+          </a:p>
+        </p:txBody>
+      </p:sp>
+      <p:sp>
+        <p:nvSpPr>
+          <p:cNvPr id="61" name="ZoneTexte 60"/>
+          <p:cNvSpPr txBox="1"/>
+          <p:nvPr/>
+        </p:nvSpPr>
+        <p:spPr>
+          <a:xfrm>
+            <a:off x="1934859" y="5687350"/>
+            <a:ext cx="1704569" cy="646331"/>
+          </a:xfrm>
+          <a:prstGeom prst="rect">
+            <a:avLst/>
+          </a:prstGeom>
+          <a:solidFill>
+            <a:schemeClr val="accent4">
+              <a:lumMod val="40000"/>
+              <a:lumOff val="60000"/>
+            </a:schemeClr>
+          </a:solidFill>
+        </p:spPr>
+        <p:txBody>
+          <a:bodyPr wrap="none" rtlCol="0">
+            <a:spAutoFit/>
+          </a:bodyPr>
+          <a:lstStyle/>
+          <a:p>
+            <a:pPr algn="ctr"/>
+            <a:r>
+              <a:rPr lang="fr-FR" dirty="0" smtClean="0"/>
+              <a:t>Authentification</a:t>
+            </a:r>
+          </a:p>
+          <a:p>
+            <a:pPr algn="ctr"/>
+            <a:r>
+              <a:rPr lang="fr-FR" dirty="0" smtClean="0"/>
+              <a:t>id</a:t>
+            </a:r>
+            <a:endParaRPr lang="fr-FR" dirty="0"/>
+          </a:p>
+        </p:txBody>
+      </p:sp>
+      <p:cxnSp>
+        <p:nvCxnSpPr>
+          <p:cNvPr id="66" name="Connecteur droit 13"/>
+          <p:cNvCxnSpPr>
+            <a:stCxn id="61" idx="0"/>
+            <a:endCxn id="36" idx="3"/>
+          </p:cNvCxnSpPr>
+          <p:nvPr/>
+        </p:nvCxnSpPr>
+        <p:spPr>
+          <a:xfrm rot="5400000" flipH="1" flipV="1">
+            <a:off x="1888919" y="4637085"/>
+            <a:ext cx="1948490" cy="152041"/>
+          </a:xfrm>
+          <a:prstGeom prst="curvedConnector3">
+            <a:avLst>
+              <a:gd name="adj1" fmla="val 50000"/>
+            </a:avLst>
+          </a:prstGeom>
+          <a:ln w="57150">
+            <a:solidFill>
+              <a:srgbClr val="00B0F0"/>
+            </a:solidFill>
+            <a:tailEnd type="triangle"/>
+          </a:ln>
+        </p:spPr>
+        <p:style>
+          <a:lnRef idx="1">
+            <a:schemeClr val="accent1"/>
+          </a:lnRef>
+          <a:fillRef idx="0">
+            <a:schemeClr val="accent1"/>
+          </a:fillRef>
+          <a:effectRef idx="0">
+            <a:schemeClr val="accent1"/>
+          </a:effectRef>
+          <a:fontRef idx="minor">
+            <a:schemeClr val="tx1"/>
+          </a:fontRef>
+        </p:style>
+      </p:cxnSp>
+      <p:sp>
+        <p:nvSpPr>
+          <p:cNvPr id="53" name="ZoneTexte 52"/>
+          <p:cNvSpPr txBox="1"/>
+          <p:nvPr/>
+        </p:nvSpPr>
+        <p:spPr>
+          <a:xfrm>
+            <a:off x="3658884" y="4572925"/>
+            <a:ext cx="1704569" cy="646331"/>
+          </a:xfrm>
+          <a:prstGeom prst="rect">
+            <a:avLst/>
+          </a:prstGeom>
+          <a:solidFill>
+            <a:schemeClr val="accent4">
+              <a:lumMod val="40000"/>
+              <a:lumOff val="60000"/>
+            </a:schemeClr>
+          </a:solidFill>
+        </p:spPr>
+        <p:txBody>
+          <a:bodyPr wrap="square" rtlCol="0">
+            <a:spAutoFit/>
+          </a:bodyPr>
+          <a:lstStyle/>
+          <a:p>
+            <a:pPr algn="ctr"/>
+            <a:r>
+              <a:rPr lang="fr-FR" dirty="0" smtClean="0"/>
+              <a:t>Authentification</a:t>
+            </a:r>
+          </a:p>
+          <a:p>
+            <a:pPr algn="ctr"/>
+            <a:r>
+              <a:rPr lang="fr-FR" dirty="0" smtClean="0"/>
+              <a:t>id</a:t>
+            </a:r>
+            <a:endParaRPr lang="fr-FR" dirty="0"/>
+          </a:p>
+        </p:txBody>
+      </p:sp>
+      <p:cxnSp>
+        <p:nvCxnSpPr>
+          <p:cNvPr id="55" name="Connecteur droit 13"/>
+          <p:cNvCxnSpPr>
+            <a:stCxn id="53" idx="3"/>
+            <a:endCxn id="11" idx="1"/>
+          </p:cNvCxnSpPr>
+          <p:nvPr/>
+        </p:nvCxnSpPr>
+        <p:spPr>
+          <a:xfrm>
+            <a:off x="5363453" y="4896091"/>
+            <a:ext cx="2852655" cy="782819"/>
+          </a:xfrm>
+          <a:prstGeom prst="curvedConnector3">
+            <a:avLst>
+              <a:gd name="adj1" fmla="val 50000"/>
+            </a:avLst>
+          </a:prstGeom>
+          <a:ln w="57150">
+            <a:solidFill>
+              <a:srgbClr val="00B0F0"/>
+            </a:solidFill>
+            <a:tailEnd type="triangle"/>
+          </a:ln>
+        </p:spPr>
+        <p:style>
+          <a:lnRef idx="1">
+            <a:schemeClr val="accent1"/>
+          </a:lnRef>
+          <a:fillRef idx="0">
+            <a:schemeClr val="accent1"/>
+          </a:fillRef>
+          <a:effectRef idx="0">
+            <a:schemeClr val="accent1"/>
+          </a:effectRef>
+          <a:fontRef idx="minor">
+            <a:schemeClr val="tx1"/>
+          </a:fontRef>
+        </p:style>
+      </p:cxnSp>
+      <p:cxnSp>
+        <p:nvCxnSpPr>
+          <p:cNvPr id="56" name="Connecteur droit 13"/>
+          <p:cNvCxnSpPr>
+            <a:stCxn id="53" idx="0"/>
+            <a:endCxn id="36" idx="4"/>
+          </p:cNvCxnSpPr>
+          <p:nvPr/>
+        </p:nvCxnSpPr>
+        <p:spPr>
+          <a:xfrm rot="16200000" flipV="1">
+            <a:off x="3720677" y="3782433"/>
+            <a:ext cx="646731" cy="934254"/>
+          </a:xfrm>
+          <a:prstGeom prst="curvedConnector3">
+            <a:avLst>
+              <a:gd name="adj1" fmla="val 50000"/>
+            </a:avLst>
+          </a:prstGeom>
+          <a:ln w="57150">
+            <a:solidFill>
+              <a:srgbClr val="00B0F0"/>
+            </a:solidFill>
+            <a:tailEnd type="triangle"/>
+          </a:ln>
+        </p:spPr>
+        <p:style>
+          <a:lnRef idx="1">
+            <a:schemeClr val="accent1"/>
+          </a:lnRef>
+          <a:fillRef idx="0">
+            <a:schemeClr val="accent1"/>
+          </a:fillRef>
+          <a:effectRef idx="0">
+            <a:schemeClr val="accent1"/>
+          </a:effectRef>
+          <a:fontRef idx="minor">
+            <a:schemeClr val="tx1"/>
+          </a:fontRef>
+        </p:style>
+      </p:cxnSp>
       <p:grpSp>
         <p:nvGrpSpPr>
-          <p:cNvPr id="38" name="Groupe 37"/>
+          <p:cNvPr id="130" name="Groupe 129"/>
           <p:cNvGrpSpPr/>
           <p:nvPr/>
         </p:nvGrpSpPr>
         <p:grpSpPr>
           <a:xfrm>
-            <a:off x="4072271" y="4519955"/>
-            <a:ext cx="2905649" cy="2080871"/>
-            <a:chOff x="6141118" y="3437114"/>
-            <a:chExt cx="2905649" cy="2080871"/>
+            <a:off x="4362921" y="5542423"/>
+            <a:ext cx="2183527" cy="1037353"/>
+            <a:chOff x="3310160" y="5605261"/>
+            <a:chExt cx="2350465" cy="1155489"/>
           </a:xfrm>
         </p:grpSpPr>
+        <p:sp>
+          <p:nvSpPr>
+            <p:cNvPr id="82" name="Rectangle 81"/>
+            <p:cNvSpPr/>
+            <p:nvPr/>
+          </p:nvSpPr>
+          <p:spPr>
+            <a:xfrm>
+              <a:off x="3310160" y="5605261"/>
+              <a:ext cx="2350465" cy="1155489"/>
+            </a:xfrm>
+            <a:prstGeom prst="rect">
+              <a:avLst/>
+            </a:prstGeom>
+            <a:solidFill>
+              <a:schemeClr val="accent2">
+                <a:lumMod val="40000"/>
+                <a:lumOff val="60000"/>
+              </a:schemeClr>
+            </a:solidFill>
+          </p:spPr>
+          <p:style>
+            <a:lnRef idx="2">
+              <a:schemeClr val="accent1">
+                <a:shade val="50000"/>
+              </a:schemeClr>
+            </a:lnRef>
+            <a:fillRef idx="1">
+              <a:schemeClr val="accent1"/>
+            </a:fillRef>
+            <a:effectRef idx="0">
+              <a:schemeClr val="accent1"/>
+            </a:effectRef>
+            <a:fontRef idx="minor">
+              <a:schemeClr val="lt1"/>
+            </a:fontRef>
+          </p:style>
+          <p:txBody>
+            <a:bodyPr rtlCol="0" anchor="ctr"/>
+            <a:lstStyle/>
+            <a:p>
+              <a:pPr algn="ctr"/>
+              <a:endParaRPr lang="fr-FR"/>
+            </a:p>
+          </p:txBody>
+        </p:sp>
         <p:sp>
           <p:nvSpPr>
             <p:cNvPr id="40" name="Rectangle 39"/>
@@ -3551,7 +3842,7 @@
           </p:nvSpPr>
           <p:spPr>
             <a:xfrm>
-              <a:off x="6141118" y="4715885"/>
+              <a:off x="4072271" y="5798726"/>
               <a:ext cx="1363578" cy="802100"/>
             </a:xfrm>
             <a:prstGeom prst="rect">
@@ -3590,458 +3881,37 @@
             </a:p>
           </p:txBody>
         </p:sp>
-        <p:cxnSp>
-          <p:nvCxnSpPr>
-            <p:cNvPr id="43" name="Connecteur droit 13"/>
-            <p:cNvCxnSpPr>
-              <a:stCxn id="40" idx="0"/>
-              <a:endCxn id="9" idx="2"/>
-            </p:cNvCxnSpPr>
+        <p:sp>
+          <p:nvSpPr>
+            <p:cNvPr id="60" name="ZoneTexte 59"/>
+            <p:cNvSpPr txBox="1"/>
             <p:nvPr/>
-          </p:nvCxnSpPr>
+          </p:nvSpPr>
           <p:spPr>
-            <a:xfrm rot="5400000" flipH="1" flipV="1">
-              <a:off x="7295451" y="2964569"/>
-              <a:ext cx="1278772" cy="2223861"/>
+            <a:xfrm>
+              <a:off x="3366860" y="6171370"/>
+              <a:ext cx="616579" cy="369332"/>
             </a:xfrm>
-            <a:prstGeom prst="curvedConnector3">
-              <a:avLst>
-                <a:gd name="adj1" fmla="val 50000"/>
-              </a:avLst>
+            <a:prstGeom prst="rect">
+              <a:avLst/>
             </a:prstGeom>
-            <a:ln w="57150">
-              <a:solidFill>
-                <a:srgbClr val="FF0000"/>
-              </a:solidFill>
-            </a:ln>
+            <a:noFill/>
           </p:spPr>
-          <p:style>
-            <a:lnRef idx="1">
-              <a:schemeClr val="accent1"/>
-            </a:lnRef>
-            <a:fillRef idx="0">
-              <a:schemeClr val="accent1"/>
-            </a:fillRef>
-            <a:effectRef idx="0">
-              <a:schemeClr val="accent1"/>
-            </a:effectRef>
-            <a:fontRef idx="minor">
-              <a:schemeClr val="tx1"/>
-            </a:fontRef>
-          </p:style>
-        </p:cxnSp>
+          <p:txBody>
+            <a:bodyPr wrap="none" rtlCol="0">
+              <a:spAutoFit/>
+            </a:bodyPr>
+            <a:lstStyle/>
+            <a:p>
+              <a:r>
+                <a:rPr lang="fr-FR" dirty="0" smtClean="0"/>
+                <a:t>key1</a:t>
+              </a:r>
+              <a:endParaRPr lang="fr-FR" dirty="0"/>
+            </a:p>
+          </p:txBody>
+        </p:sp>
       </p:grpSp>
-      <p:sp>
-        <p:nvSpPr>
-          <p:cNvPr id="54" name="Ellipse 53"/>
-          <p:cNvSpPr/>
-          <p:nvPr/>
-        </p:nvSpPr>
-        <p:spPr>
-          <a:xfrm>
-            <a:off x="1824789" y="879917"/>
-            <a:ext cx="2558914" cy="1091544"/>
-          </a:xfrm>
-          <a:prstGeom prst="ellipse">
-            <a:avLst/>
-          </a:prstGeom>
-          <a:solidFill>
-            <a:schemeClr val="bg1">
-              <a:lumMod val="65000"/>
-            </a:schemeClr>
-          </a:solidFill>
-        </p:spPr>
-        <p:style>
-          <a:lnRef idx="2">
-            <a:schemeClr val="accent1">
-              <a:shade val="50000"/>
-            </a:schemeClr>
-          </a:lnRef>
-          <a:fillRef idx="1">
-            <a:schemeClr val="accent1"/>
-          </a:fillRef>
-          <a:effectRef idx="0">
-            <a:schemeClr val="accent1"/>
-          </a:effectRef>
-          <a:fontRef idx="minor">
-            <a:schemeClr val="lt1"/>
-          </a:fontRef>
-        </p:style>
-        <p:txBody>
-          <a:bodyPr rtlCol="0" anchor="ctr" anchorCtr="0"/>
-          <a:lstStyle/>
-          <a:p>
-            <a:pPr algn="ctr"/>
-            <a:r>
-              <a:rPr lang="fr-FR" sz="2800" dirty="0" err="1" smtClean="0"/>
-              <a:t>Spark</a:t>
-            </a:r>
-            <a:r>
-              <a:rPr lang="fr-FR" sz="2800" dirty="0" smtClean="0"/>
-              <a:t> cluster</a:t>
-            </a:r>
-          </a:p>
-        </p:txBody>
-      </p:sp>
-      <p:sp>
-        <p:nvSpPr>
-          <p:cNvPr id="61" name="ZoneTexte 60"/>
-          <p:cNvSpPr txBox="1"/>
-          <p:nvPr/>
-        </p:nvSpPr>
-        <p:spPr>
-          <a:xfrm>
-            <a:off x="563259" y="5468275"/>
-            <a:ext cx="1704569" cy="646331"/>
-          </a:xfrm>
-          <a:prstGeom prst="rect">
-            <a:avLst/>
-          </a:prstGeom>
-          <a:solidFill>
-            <a:schemeClr val="accent4">
-              <a:lumMod val="40000"/>
-              <a:lumOff val="60000"/>
-            </a:schemeClr>
-          </a:solidFill>
-        </p:spPr>
-        <p:txBody>
-          <a:bodyPr wrap="none" rtlCol="0">
-            <a:spAutoFit/>
-          </a:bodyPr>
-          <a:lstStyle/>
-          <a:p>
-            <a:pPr algn="ctr"/>
-            <a:r>
-              <a:rPr lang="fr-FR" dirty="0" smtClean="0"/>
-              <a:t>Authentification</a:t>
-            </a:r>
-          </a:p>
-          <a:p>
-            <a:pPr algn="ctr"/>
-            <a:r>
-              <a:rPr lang="fr-FR" dirty="0" smtClean="0"/>
-              <a:t>id</a:t>
-            </a:r>
-            <a:endParaRPr lang="fr-FR" dirty="0"/>
-          </a:p>
-        </p:txBody>
-      </p:sp>
-      <p:cxnSp>
-        <p:nvCxnSpPr>
-          <p:cNvPr id="63" name="Connecteur droit 13"/>
-          <p:cNvCxnSpPr>
-            <a:stCxn id="61" idx="3"/>
-            <a:endCxn id="40" idx="1"/>
-          </p:cNvCxnSpPr>
-          <p:nvPr/>
-        </p:nvCxnSpPr>
-        <p:spPr>
-          <a:xfrm>
-            <a:off x="2267828" y="5791441"/>
-            <a:ext cx="1804443" cy="408335"/>
-          </a:xfrm>
-          <a:prstGeom prst="curvedConnector3">
-            <a:avLst>
-              <a:gd name="adj1" fmla="val 50000"/>
-            </a:avLst>
-          </a:prstGeom>
-          <a:ln w="57150">
-            <a:solidFill>
-              <a:srgbClr val="00B0F0"/>
-            </a:solidFill>
-            <a:tailEnd type="triangle"/>
-          </a:ln>
-        </p:spPr>
-        <p:style>
-          <a:lnRef idx="1">
-            <a:schemeClr val="accent1"/>
-          </a:lnRef>
-          <a:fillRef idx="0">
-            <a:schemeClr val="accent1"/>
-          </a:fillRef>
-          <a:effectRef idx="0">
-            <a:schemeClr val="accent1"/>
-          </a:effectRef>
-          <a:fontRef idx="minor">
-            <a:schemeClr val="tx1"/>
-          </a:fontRef>
-        </p:style>
-      </p:cxnSp>
-      <p:cxnSp>
-        <p:nvCxnSpPr>
-          <p:cNvPr id="66" name="Connecteur droit 13"/>
-          <p:cNvCxnSpPr>
-            <a:stCxn id="61" idx="0"/>
-            <a:endCxn id="36" idx="3"/>
-          </p:cNvCxnSpPr>
-          <p:nvPr/>
-        </p:nvCxnSpPr>
-        <p:spPr>
-          <a:xfrm rot="5400000" flipH="1" flipV="1">
-            <a:off x="1155937" y="3829540"/>
-            <a:ext cx="1898343" cy="1379129"/>
-          </a:xfrm>
-          <a:prstGeom prst="curvedConnector3">
-            <a:avLst>
-              <a:gd name="adj1" fmla="val 50000"/>
-            </a:avLst>
-          </a:prstGeom>
-          <a:ln w="57150">
-            <a:solidFill>
-              <a:srgbClr val="00B0F0"/>
-            </a:solidFill>
-            <a:tailEnd type="triangle"/>
-          </a:ln>
-        </p:spPr>
-        <p:style>
-          <a:lnRef idx="1">
-            <a:schemeClr val="accent1"/>
-          </a:lnRef>
-          <a:fillRef idx="0">
-            <a:schemeClr val="accent1"/>
-          </a:fillRef>
-          <a:effectRef idx="0">
-            <a:schemeClr val="accent1"/>
-          </a:effectRef>
-          <a:fontRef idx="minor">
-            <a:schemeClr val="tx1"/>
-          </a:fontRef>
-        </p:style>
-      </p:cxnSp>
-      <p:sp>
-        <p:nvSpPr>
-          <p:cNvPr id="36" name="Ellipse 35"/>
-          <p:cNvSpPr/>
-          <p:nvPr/>
-        </p:nvSpPr>
-        <p:spPr>
-          <a:xfrm>
-            <a:off x="2541678" y="2580321"/>
-            <a:ext cx="1727556" cy="1159401"/>
-          </a:xfrm>
-          <a:prstGeom prst="ellipse">
-            <a:avLst/>
-          </a:prstGeom>
-          <a:solidFill>
-            <a:schemeClr val="bg1">
-              <a:lumMod val="65000"/>
-            </a:schemeClr>
-          </a:solidFill>
-        </p:spPr>
-        <p:style>
-          <a:lnRef idx="2">
-            <a:schemeClr val="accent1">
-              <a:shade val="50000"/>
-            </a:schemeClr>
-          </a:lnRef>
-          <a:fillRef idx="1">
-            <a:schemeClr val="accent1"/>
-          </a:fillRef>
-          <a:effectRef idx="0">
-            <a:schemeClr val="accent1"/>
-          </a:effectRef>
-          <a:fontRef idx="minor">
-            <a:schemeClr val="lt1"/>
-          </a:fontRef>
-        </p:style>
-        <p:txBody>
-          <a:bodyPr rtlCol="0" anchor="ctr" anchorCtr="0"/>
-          <a:lstStyle/>
-          <a:p>
-            <a:pPr algn="ctr"/>
-            <a:r>
-              <a:rPr lang="fr-FR" sz="2800" dirty="0" err="1" smtClean="0"/>
-              <a:t>HBase</a:t>
-            </a:r>
-            <a:endParaRPr lang="fr-FR" sz="2800" dirty="0" smtClean="0"/>
-          </a:p>
-        </p:txBody>
-      </p:sp>
-      <p:sp>
-        <p:nvSpPr>
-          <p:cNvPr id="53" name="ZoneTexte 52"/>
-          <p:cNvSpPr txBox="1"/>
-          <p:nvPr/>
-        </p:nvSpPr>
-        <p:spPr>
-          <a:xfrm>
-            <a:off x="2620659" y="4401475"/>
-            <a:ext cx="1704569" cy="646331"/>
-          </a:xfrm>
-          <a:prstGeom prst="rect">
-            <a:avLst/>
-          </a:prstGeom>
-          <a:solidFill>
-            <a:schemeClr val="accent4">
-              <a:lumMod val="40000"/>
-              <a:lumOff val="60000"/>
-            </a:schemeClr>
-          </a:solidFill>
-        </p:spPr>
-        <p:txBody>
-          <a:bodyPr wrap="square" rtlCol="0">
-            <a:spAutoFit/>
-          </a:bodyPr>
-          <a:lstStyle/>
-          <a:p>
-            <a:pPr algn="ctr"/>
-            <a:r>
-              <a:rPr lang="fr-FR" dirty="0" smtClean="0"/>
-              <a:t>Authentification</a:t>
-            </a:r>
-          </a:p>
-          <a:p>
-            <a:pPr algn="ctr"/>
-            <a:r>
-              <a:rPr lang="fr-FR" dirty="0" smtClean="0"/>
-              <a:t>id</a:t>
-            </a:r>
-            <a:endParaRPr lang="fr-FR" dirty="0"/>
-          </a:p>
-        </p:txBody>
-      </p:sp>
-      <p:cxnSp>
-        <p:nvCxnSpPr>
-          <p:cNvPr id="55" name="Connecteur droit 13"/>
-          <p:cNvCxnSpPr>
-            <a:stCxn id="53" idx="3"/>
-            <a:endCxn id="11" idx="1"/>
-          </p:cNvCxnSpPr>
-          <p:nvPr/>
-        </p:nvCxnSpPr>
-        <p:spPr>
-          <a:xfrm>
-            <a:off x="4325228" y="4724641"/>
-            <a:ext cx="3568853" cy="1201919"/>
-          </a:xfrm>
-          <a:prstGeom prst="curvedConnector3">
-            <a:avLst>
-              <a:gd name="adj1" fmla="val 50000"/>
-            </a:avLst>
-          </a:prstGeom>
-          <a:ln w="57150">
-            <a:solidFill>
-              <a:srgbClr val="00B0F0"/>
-            </a:solidFill>
-            <a:tailEnd type="triangle"/>
-          </a:ln>
-        </p:spPr>
-        <p:style>
-          <a:lnRef idx="1">
-            <a:schemeClr val="accent1"/>
-          </a:lnRef>
-          <a:fillRef idx="0">
-            <a:schemeClr val="accent1"/>
-          </a:fillRef>
-          <a:effectRef idx="0">
-            <a:schemeClr val="accent1"/>
-          </a:effectRef>
-          <a:fontRef idx="minor">
-            <a:schemeClr val="tx1"/>
-          </a:fontRef>
-        </p:style>
-      </p:cxnSp>
-      <p:cxnSp>
-        <p:nvCxnSpPr>
-          <p:cNvPr id="56" name="Connecteur droit 13"/>
-          <p:cNvCxnSpPr>
-            <a:stCxn id="53" idx="0"/>
-            <a:endCxn id="36" idx="4"/>
-          </p:cNvCxnSpPr>
-          <p:nvPr/>
-        </p:nvCxnSpPr>
-        <p:spPr>
-          <a:xfrm rot="16200000" flipV="1">
-            <a:off x="3108324" y="4036855"/>
-            <a:ext cx="661753" cy="67488"/>
-          </a:xfrm>
-          <a:prstGeom prst="curvedConnector3">
-            <a:avLst>
-              <a:gd name="adj1" fmla="val 50000"/>
-            </a:avLst>
-          </a:prstGeom>
-          <a:ln w="57150">
-            <a:solidFill>
-              <a:srgbClr val="00B0F0"/>
-            </a:solidFill>
-            <a:tailEnd type="triangle"/>
-          </a:ln>
-        </p:spPr>
-        <p:style>
-          <a:lnRef idx="1">
-            <a:schemeClr val="accent1"/>
-          </a:lnRef>
-          <a:fillRef idx="0">
-            <a:schemeClr val="accent1"/>
-          </a:fillRef>
-          <a:effectRef idx="0">
-            <a:schemeClr val="accent1"/>
-          </a:effectRef>
-          <a:fontRef idx="minor">
-            <a:schemeClr val="tx1"/>
-          </a:fontRef>
-        </p:style>
-      </p:cxnSp>
-      <p:sp>
-        <p:nvSpPr>
-          <p:cNvPr id="52" name="ZoneTexte 51"/>
-          <p:cNvSpPr txBox="1"/>
-          <p:nvPr/>
-        </p:nvSpPr>
-        <p:spPr>
-          <a:xfrm>
-            <a:off x="7043510" y="5495095"/>
-            <a:ext cx="616579" cy="369332"/>
-          </a:xfrm>
-          <a:prstGeom prst="rect">
-            <a:avLst/>
-          </a:prstGeom>
-          <a:noFill/>
-        </p:spPr>
-        <p:txBody>
-          <a:bodyPr wrap="none" rtlCol="0">
-            <a:spAutoFit/>
-          </a:bodyPr>
-          <a:lstStyle/>
-          <a:p>
-            <a:r>
-              <a:rPr lang="fr-FR" dirty="0" smtClean="0"/>
-              <a:t>key2</a:t>
-            </a:r>
-            <a:endParaRPr lang="fr-FR" dirty="0"/>
-          </a:p>
-        </p:txBody>
-      </p:sp>
-      <p:sp>
-        <p:nvSpPr>
-          <p:cNvPr id="60" name="ZoneTexte 59"/>
-          <p:cNvSpPr txBox="1"/>
-          <p:nvPr/>
-        </p:nvSpPr>
-        <p:spPr>
-          <a:xfrm>
-            <a:off x="3366860" y="6171370"/>
-            <a:ext cx="616579" cy="369332"/>
-          </a:xfrm>
-          <a:prstGeom prst="rect">
-            <a:avLst/>
-          </a:prstGeom>
-          <a:noFill/>
-        </p:spPr>
-        <p:txBody>
-          <a:bodyPr wrap="none" rtlCol="0">
-            <a:spAutoFit/>
-          </a:bodyPr>
-          <a:lstStyle/>
-          <a:p>
-            <a:r>
-              <a:rPr lang="fr-FR" dirty="0" smtClean="0"/>
-              <a:t>key1</a:t>
-            </a:r>
-            <a:endParaRPr lang="fr-FR" dirty="0"/>
-          </a:p>
-        </p:txBody>
-      </p:sp>
       <p:sp>
         <p:nvSpPr>
           <p:cNvPr id="64" name="ZoneTexte 63"/>
@@ -4131,7 +4001,7 @@
         </p:nvSpPr>
         <p:spPr>
           <a:xfrm>
-            <a:off x="4166960" y="2580445"/>
+            <a:off x="4262210" y="2580445"/>
             <a:ext cx="1687385" cy="369332"/>
           </a:xfrm>
           <a:prstGeom prst="rect">
@@ -4479,8 +4349,8 @@
         </p:nvCxnSpPr>
         <p:spPr>
           <a:xfrm rot="5400000">
-            <a:off x="8654900" y="2799372"/>
-            <a:ext cx="568982" cy="1957783"/>
+            <a:off x="8726337" y="2870809"/>
+            <a:ext cx="568982" cy="1814908"/>
           </a:xfrm>
           <a:prstGeom prst="curvedConnector2">
             <a:avLst/>
@@ -4572,8 +4442,8 @@
         </p:nvCxnSpPr>
         <p:spPr>
           <a:xfrm rot="10800000">
-            <a:off x="4016240" y="3569932"/>
-            <a:ext cx="147469" cy="473284"/>
+            <a:off x="4214646" y="3738860"/>
+            <a:ext cx="406263" cy="266256"/>
           </a:xfrm>
           <a:prstGeom prst="curvedConnector2">
             <a:avLst/>
@@ -4608,7 +4478,7 @@
         </p:nvSpPr>
         <p:spPr>
           <a:xfrm>
-            <a:off x="4163708" y="3858550"/>
+            <a:off x="4620908" y="3820450"/>
             <a:ext cx="1383753" cy="369332"/>
           </a:xfrm>
           <a:prstGeom prst="rect">
@@ -4646,8 +4516,8 @@
         </p:nvCxnSpPr>
         <p:spPr>
           <a:xfrm>
-            <a:off x="5547461" y="4043216"/>
-            <a:ext cx="447882" cy="19538"/>
+            <a:off x="6004661" y="4005116"/>
+            <a:ext cx="487915" cy="57638"/>
           </a:xfrm>
           <a:prstGeom prst="curvedConnector3">
             <a:avLst>
@@ -4706,40 +4576,344 @@
           </a:p>
         </p:txBody>
       </p:sp>
-      <p:sp>
-        <p:nvSpPr>
-          <p:cNvPr id="116" name="ZoneTexte 115"/>
-          <p:cNvSpPr txBox="1"/>
+      <p:grpSp>
+        <p:nvGrpSpPr>
+          <p:cNvPr id="137" name="Groupe 136"/>
+          <p:cNvGrpSpPr/>
           <p:nvPr/>
-        </p:nvSpPr>
+        </p:nvGrpSpPr>
+        <p:grpSpPr>
+          <a:xfrm>
+            <a:off x="2633435" y="2646996"/>
+            <a:ext cx="1872768" cy="1279198"/>
+            <a:chOff x="2633435" y="2646996"/>
+            <a:chExt cx="1872768" cy="1279198"/>
+          </a:xfrm>
+        </p:grpSpPr>
+        <p:sp>
+          <p:nvSpPr>
+            <p:cNvPr id="36" name="Ellipse 35"/>
+            <p:cNvSpPr/>
+            <p:nvPr/>
+          </p:nvSpPr>
+          <p:spPr>
+            <a:xfrm>
+              <a:off x="2675028" y="2646996"/>
+              <a:ext cx="1803774" cy="1279198"/>
+            </a:xfrm>
+            <a:prstGeom prst="ellipse">
+              <a:avLst/>
+            </a:prstGeom>
+            <a:solidFill>
+              <a:schemeClr val="bg1">
+                <a:lumMod val="65000"/>
+              </a:schemeClr>
+            </a:solidFill>
+          </p:spPr>
+          <p:style>
+            <a:lnRef idx="2">
+              <a:schemeClr val="accent1">
+                <a:shade val="50000"/>
+              </a:schemeClr>
+            </a:lnRef>
+            <a:fillRef idx="1">
+              <a:schemeClr val="accent1"/>
+            </a:fillRef>
+            <a:effectRef idx="0">
+              <a:schemeClr val="accent1"/>
+            </a:effectRef>
+            <a:fontRef idx="minor">
+              <a:schemeClr val="lt1"/>
+            </a:fontRef>
+          </p:style>
+          <p:txBody>
+            <a:bodyPr rtlCol="0" anchor="t" anchorCtr="0"/>
+            <a:lstStyle/>
+            <a:p>
+              <a:pPr algn="ctr"/>
+              <a:r>
+                <a:rPr lang="fr-FR" sz="2800" dirty="0" err="1" smtClean="0"/>
+                <a:t>HBase</a:t>
+              </a:r>
+              <a:endParaRPr lang="fr-FR" sz="2800" dirty="0" smtClean="0"/>
+            </a:p>
+          </p:txBody>
+        </p:sp>
+        <p:sp>
+          <p:nvSpPr>
+            <p:cNvPr id="116" name="ZoneTexte 115"/>
+            <p:cNvSpPr txBox="1"/>
+            <p:nvPr/>
+          </p:nvSpPr>
+          <p:spPr>
+            <a:xfrm>
+              <a:off x="2633435" y="3256720"/>
+              <a:ext cx="1872768" cy="646331"/>
+            </a:xfrm>
+            <a:prstGeom prst="rect">
+              <a:avLst/>
+            </a:prstGeom>
+            <a:noFill/>
+          </p:spPr>
+          <p:txBody>
+            <a:bodyPr wrap="square" rtlCol="0">
+              <a:spAutoFit/>
+            </a:bodyPr>
+            <a:lstStyle/>
+            <a:p>
+              <a:pPr algn="ctr"/>
+              <a:r>
+                <a:rPr lang="fr-FR" dirty="0" smtClean="0"/>
+                <a:t>Organisations/</a:t>
+              </a:r>
+              <a:r>
+                <a:rPr lang="fr-FR" dirty="0" err="1" smtClean="0"/>
+                <a:t>ids</a:t>
+              </a:r>
+              <a:endParaRPr lang="fr-FR" dirty="0" smtClean="0"/>
+            </a:p>
+            <a:p>
+              <a:pPr algn="ctr"/>
+              <a:r>
+                <a:rPr lang="fr-FR" dirty="0" smtClean="0"/>
+                <a:t>sessions</a:t>
+              </a:r>
+              <a:endParaRPr lang="fr-FR" dirty="0"/>
+            </a:p>
+          </p:txBody>
+        </p:sp>
+      </p:grpSp>
+      <p:grpSp>
+        <p:nvGrpSpPr>
+          <p:cNvPr id="136" name="Groupe 135"/>
+          <p:cNvGrpSpPr/>
+          <p:nvPr/>
+        </p:nvGrpSpPr>
+        <p:grpSpPr>
+          <a:xfrm>
+            <a:off x="631984" y="3882063"/>
+            <a:ext cx="1339205" cy="1130375"/>
+            <a:chOff x="270034" y="3367713"/>
+            <a:chExt cx="1339205" cy="1130375"/>
+          </a:xfrm>
+        </p:grpSpPr>
+        <p:sp>
+          <p:nvSpPr>
+            <p:cNvPr id="120" name="Rectangle 119"/>
+            <p:cNvSpPr/>
+            <p:nvPr/>
+          </p:nvSpPr>
+          <p:spPr>
+            <a:xfrm>
+              <a:off x="270034" y="3367713"/>
+              <a:ext cx="1339205" cy="1130375"/>
+            </a:xfrm>
+            <a:prstGeom prst="rect">
+              <a:avLst/>
+            </a:prstGeom>
+            <a:solidFill>
+              <a:schemeClr val="accent2">
+                <a:lumMod val="40000"/>
+                <a:lumOff val="60000"/>
+              </a:schemeClr>
+            </a:solidFill>
+          </p:spPr>
+          <p:style>
+            <a:lnRef idx="2">
+              <a:schemeClr val="accent1">
+                <a:shade val="50000"/>
+              </a:schemeClr>
+            </a:lnRef>
+            <a:fillRef idx="1">
+              <a:schemeClr val="accent1"/>
+            </a:fillRef>
+            <a:effectRef idx="0">
+              <a:schemeClr val="accent1"/>
+            </a:effectRef>
+            <a:fontRef idx="minor">
+              <a:schemeClr val="lt1"/>
+            </a:fontRef>
+          </p:style>
+          <p:txBody>
+            <a:bodyPr rtlCol="0" anchor="ctr"/>
+            <a:lstStyle/>
+            <a:p>
+              <a:pPr algn="ctr"/>
+              <a:endParaRPr lang="fr-FR"/>
+            </a:p>
+          </p:txBody>
+        </p:sp>
+        <p:sp>
+          <p:nvSpPr>
+            <p:cNvPr id="122" name="Rectangle 121"/>
+            <p:cNvSpPr/>
+            <p:nvPr/>
+          </p:nvSpPr>
+          <p:spPr>
+            <a:xfrm>
+              <a:off x="414671" y="3636551"/>
+              <a:ext cx="977263" cy="640415"/>
+            </a:xfrm>
+            <a:prstGeom prst="rect">
+              <a:avLst/>
+            </a:prstGeom>
+            <a:solidFill>
+              <a:srgbClr val="00B050"/>
+            </a:solidFill>
+          </p:spPr>
+          <p:style>
+            <a:lnRef idx="2">
+              <a:schemeClr val="accent1">
+                <a:shade val="50000"/>
+              </a:schemeClr>
+            </a:lnRef>
+            <a:fillRef idx="1">
+              <a:schemeClr val="accent1"/>
+            </a:fillRef>
+            <a:effectRef idx="0">
+              <a:schemeClr val="accent1"/>
+            </a:effectRef>
+            <a:fontRef idx="minor">
+              <a:schemeClr val="lt1"/>
+            </a:fontRef>
+          </p:style>
+          <p:txBody>
+            <a:bodyPr rtlCol="0" anchor="ctr"/>
+            <a:lstStyle/>
+            <a:p>
+              <a:pPr algn="ctr"/>
+              <a:r>
+                <a:rPr lang="fr-FR" dirty="0" err="1" smtClean="0"/>
+                <a:t>Livy</a:t>
+              </a:r>
+              <a:r>
+                <a:rPr lang="fr-FR" dirty="0" smtClean="0"/>
+                <a:t> Monitor</a:t>
+              </a:r>
+              <a:endParaRPr lang="fr-FR" dirty="0"/>
+            </a:p>
+          </p:txBody>
+        </p:sp>
+      </p:grpSp>
+      <p:cxnSp>
+        <p:nvCxnSpPr>
+          <p:cNvPr id="123" name="Connecteur droit 13"/>
+          <p:cNvCxnSpPr>
+            <a:stCxn id="122" idx="0"/>
+            <a:endCxn id="36" idx="2"/>
+          </p:cNvCxnSpPr>
+          <p:nvPr/>
+        </p:nvCxnSpPr>
+        <p:spPr>
+          <a:xfrm rot="5400000" flipH="1" flipV="1">
+            <a:off x="1537987" y="3013861"/>
+            <a:ext cx="864306" cy="1409775"/>
+          </a:xfrm>
+          <a:prstGeom prst="curvedConnector2">
+            <a:avLst/>
+          </a:prstGeom>
+          <a:ln w="57150">
+            <a:solidFill>
+              <a:srgbClr val="FF0000"/>
+            </a:solidFill>
+          </a:ln>
+        </p:spPr>
+        <p:style>
+          <a:lnRef idx="1">
+            <a:schemeClr val="accent1"/>
+          </a:lnRef>
+          <a:fillRef idx="0">
+            <a:schemeClr val="accent1"/>
+          </a:fillRef>
+          <a:effectRef idx="0">
+            <a:schemeClr val="accent1"/>
+          </a:effectRef>
+          <a:fontRef idx="minor">
+            <a:schemeClr val="tx1"/>
+          </a:fontRef>
+        </p:style>
+      </p:cxnSp>
+      <p:cxnSp>
+        <p:nvCxnSpPr>
+          <p:cNvPr id="43" name="Connecteur droit 13"/>
+          <p:cNvCxnSpPr>
+            <a:stCxn id="40" idx="0"/>
+            <a:endCxn id="9" idx="2"/>
+          </p:cNvCxnSpPr>
+          <p:nvPr/>
+        </p:nvCxnSpPr>
+        <p:spPr>
+          <a:xfrm rot="5400000" flipH="1" flipV="1">
+            <a:off x="5903045" y="4321179"/>
+            <a:ext cx="1196154" cy="1593705"/>
+          </a:xfrm>
+          <a:prstGeom prst="curvedConnector3">
+            <a:avLst>
+              <a:gd name="adj1" fmla="val 50000"/>
+            </a:avLst>
+          </a:prstGeom>
+          <a:ln w="57150">
+            <a:solidFill>
+              <a:srgbClr val="FF0000"/>
+            </a:solidFill>
+          </a:ln>
+        </p:spPr>
+        <p:style>
+          <a:lnRef idx="1">
+            <a:schemeClr val="accent1"/>
+          </a:lnRef>
+          <a:fillRef idx="0">
+            <a:schemeClr val="accent1"/>
+          </a:fillRef>
+          <a:effectRef idx="0">
+            <a:schemeClr val="accent1"/>
+          </a:effectRef>
+          <a:fontRef idx="minor">
+            <a:schemeClr val="tx1"/>
+          </a:fontRef>
+        </p:style>
+      </p:cxnSp>
+      <p:cxnSp>
+        <p:nvCxnSpPr>
+          <p:cNvPr id="63" name="Connecteur droit 13"/>
+          <p:cNvCxnSpPr>
+            <a:stCxn id="61" idx="3"/>
+            <a:endCxn id="40" idx="1"/>
+          </p:cNvCxnSpPr>
+          <p:nvPr/>
+        </p:nvCxnSpPr>
         <p:spPr>
           <a:xfrm>
-            <a:off x="2481035" y="3256720"/>
-            <a:ext cx="1872768" cy="369332"/>
-          </a:xfrm>
-          <a:prstGeom prst="rect">
-            <a:avLst/>
+            <a:off x="3639428" y="6010516"/>
+            <a:ext cx="1431476" cy="65639"/>
+          </a:xfrm>
+          <a:prstGeom prst="curvedConnector3">
+            <a:avLst>
+              <a:gd name="adj1" fmla="val 50000"/>
+            </a:avLst>
           </a:prstGeom>
-          <a:noFill/>
+          <a:ln w="57150">
+            <a:solidFill>
+              <a:srgbClr val="00B0F0"/>
+            </a:solidFill>
+            <a:tailEnd type="triangle"/>
+          </a:ln>
         </p:spPr>
-        <p:txBody>
-          <a:bodyPr wrap="square" rtlCol="0">
-            <a:spAutoFit/>
-          </a:bodyPr>
-          <a:lstStyle/>
-          <a:p>
-            <a:r>
-              <a:rPr lang="fr-FR" dirty="0" smtClean="0"/>
-              <a:t>Organisations/</a:t>
-            </a:r>
-            <a:r>
-              <a:rPr lang="fr-FR" dirty="0" err="1" smtClean="0"/>
-              <a:t>ids</a:t>
-            </a:r>
-            <a:endParaRPr lang="fr-FR" dirty="0"/>
-          </a:p>
-        </p:txBody>
-      </p:sp>
+        <p:style>
+          <a:lnRef idx="1">
+            <a:schemeClr val="accent1"/>
+          </a:lnRef>
+          <a:fillRef idx="0">
+            <a:schemeClr val="accent1"/>
+          </a:fillRef>
+          <a:effectRef idx="0">
+            <a:schemeClr val="accent1"/>
+          </a:effectRef>
+          <a:fontRef idx="minor">
+            <a:schemeClr val="tx1"/>
+          </a:fontRef>
+        </p:style>
+      </p:cxnSp>
     </p:spTree>
     <p:extLst>
       <p:ext uri="{BB962C8B-B14F-4D97-AF65-F5344CB8AC3E}">

</xml_diff>

<commit_message>
livy_using_library>  + maintain the connexion between "users" and "livy_sessions"  + emulate multi client application  + when the multi-client crashes connexion is preserved  + when client restarts, each client reconnect to its livy session
Added command line utilities:
 + kill_livy_session.py
 + delete_table.py
 + show_table.py
</commit_message>
<xml_diff>
--- a/doc/Design.pptx
+++ b/doc/Design.pptx
@@ -3172,7 +3172,7 @@
         </p:nvGrpSpPr>
         <p:grpSpPr>
           <a:xfrm>
-            <a:off x="7491187" y="5115940"/>
+            <a:off x="8100787" y="5115940"/>
             <a:ext cx="2271940" cy="1072611"/>
             <a:chOff x="7929335" y="5363590"/>
             <a:chExt cx="2217957" cy="1072611"/>
@@ -3313,8 +3313,8 @@
         </p:nvCxnSpPr>
         <p:spPr>
           <a:xfrm rot="16200000" flipV="1">
-            <a:off x="7727280" y="4090649"/>
-            <a:ext cx="757906" cy="1616516"/>
+            <a:off x="8032080" y="3785849"/>
+            <a:ext cx="757906" cy="2226116"/>
           </a:xfrm>
           <a:prstGeom prst="curvedConnector3">
             <a:avLst>
@@ -3704,7 +3704,7 @@
         <p:spPr>
           <a:xfrm>
             <a:off x="5363453" y="4896091"/>
-            <a:ext cx="2852655" cy="782819"/>
+            <a:ext cx="3462255" cy="782819"/>
           </a:xfrm>
           <a:prstGeom prst="curvedConnector3">
             <a:avLst>
@@ -4001,7 +4001,7 @@
         </p:nvSpPr>
         <p:spPr>
           <a:xfrm>
-            <a:off x="4262210" y="2580445"/>
+            <a:off x="3766910" y="2085145"/>
             <a:ext cx="1687385" cy="369332"/>
           </a:xfrm>
           <a:prstGeom prst="rect">
@@ -4897,6 +4897,271 @@
               <a:srgbClr val="00B0F0"/>
             </a:solidFill>
             <a:tailEnd type="triangle"/>
+          </a:ln>
+        </p:spPr>
+        <p:style>
+          <a:lnRef idx="1">
+            <a:schemeClr val="accent1"/>
+          </a:lnRef>
+          <a:fillRef idx="0">
+            <a:schemeClr val="accent1"/>
+          </a:fillRef>
+          <a:effectRef idx="0">
+            <a:schemeClr val="accent1"/>
+          </a:effectRef>
+          <a:fontRef idx="minor">
+            <a:schemeClr val="tx1"/>
+          </a:fontRef>
+        </p:style>
+      </p:cxnSp>
+      <p:cxnSp>
+        <p:nvCxnSpPr>
+          <p:cNvPr id="142" name="Connecteur droit 13"/>
+          <p:cNvCxnSpPr>
+            <a:stCxn id="36" idx="6"/>
+            <a:endCxn id="9" idx="0"/>
+          </p:cNvCxnSpPr>
+          <p:nvPr/>
+        </p:nvCxnSpPr>
+        <p:spPr>
+          <a:xfrm>
+            <a:off x="4478802" y="3286595"/>
+            <a:ext cx="2819173" cy="318959"/>
+          </a:xfrm>
+          <a:prstGeom prst="curvedConnector2">
+            <a:avLst/>
+          </a:prstGeom>
+          <a:ln w="57150">
+            <a:solidFill>
+              <a:srgbClr val="FF0000"/>
+            </a:solidFill>
+          </a:ln>
+        </p:spPr>
+        <p:style>
+          <a:lnRef idx="1">
+            <a:schemeClr val="accent1"/>
+          </a:lnRef>
+          <a:fillRef idx="0">
+            <a:schemeClr val="accent1"/>
+          </a:fillRef>
+          <a:effectRef idx="0">
+            <a:schemeClr val="accent1"/>
+          </a:effectRef>
+          <a:fontRef idx="minor">
+            <a:schemeClr val="tx1"/>
+          </a:fontRef>
+        </p:style>
+      </p:cxnSp>
+      <p:cxnSp>
+        <p:nvCxnSpPr>
+          <p:cNvPr id="145" name="Connecteur droit 13"/>
+          <p:cNvCxnSpPr>
+            <a:stCxn id="36" idx="7"/>
+          </p:cNvCxnSpPr>
+          <p:nvPr/>
+        </p:nvCxnSpPr>
+        <p:spPr>
+          <a:xfrm rot="16200000" flipH="1">
+            <a:off x="6415580" y="633395"/>
+            <a:ext cx="237724" cy="4639594"/>
+          </a:xfrm>
+          <a:prstGeom prst="curvedConnector4">
+            <a:avLst>
+              <a:gd name="adj1" fmla="val -96162"/>
+              <a:gd name="adj2" fmla="val 52847"/>
+            </a:avLst>
+          </a:prstGeom>
+          <a:ln w="76200">
+            <a:solidFill>
+              <a:schemeClr val="accent6">
+                <a:lumMod val="60000"/>
+                <a:lumOff val="40000"/>
+              </a:schemeClr>
+            </a:solidFill>
+          </a:ln>
+        </p:spPr>
+        <p:style>
+          <a:lnRef idx="1">
+            <a:schemeClr val="accent1"/>
+          </a:lnRef>
+          <a:fillRef idx="0">
+            <a:schemeClr val="accent1"/>
+          </a:fillRef>
+          <a:effectRef idx="0">
+            <a:schemeClr val="accent1"/>
+          </a:effectRef>
+          <a:fontRef idx="minor">
+            <a:schemeClr val="tx1"/>
+          </a:fontRef>
+        </p:style>
+      </p:cxnSp>
+      <p:sp>
+        <p:nvSpPr>
+          <p:cNvPr id="150" name="Cadre 149"/>
+          <p:cNvSpPr/>
+          <p:nvPr/>
+        </p:nvSpPr>
+        <p:spPr>
+          <a:xfrm>
+            <a:off x="6653839" y="5800725"/>
+            <a:ext cx="1032169" cy="750476"/>
+          </a:xfrm>
+          <a:prstGeom prst="frame">
+            <a:avLst/>
+          </a:prstGeom>
+        </p:spPr>
+        <p:style>
+          <a:lnRef idx="2">
+            <a:schemeClr val="accent1">
+              <a:shade val="50000"/>
+            </a:schemeClr>
+          </a:lnRef>
+          <a:fillRef idx="1">
+            <a:schemeClr val="accent1"/>
+          </a:fillRef>
+          <a:effectRef idx="0">
+            <a:schemeClr val="accent1"/>
+          </a:effectRef>
+          <a:fontRef idx="minor">
+            <a:schemeClr val="lt1"/>
+          </a:fontRef>
+        </p:style>
+        <p:txBody>
+          <a:bodyPr rtlCol="0" anchor="ctr"/>
+          <a:lstStyle/>
+          <a:p>
+            <a:pPr algn="ctr"/>
+            <a:r>
+              <a:rPr lang="fr-FR" dirty="0" err="1" smtClean="0">
+                <a:solidFill>
+                  <a:schemeClr val="tx1"/>
+                </a:solidFill>
+              </a:rPr>
+              <a:t>Flask</a:t>
+            </a:r>
+            <a:endParaRPr lang="fr-FR" dirty="0">
+              <a:solidFill>
+                <a:schemeClr val="tx1"/>
+              </a:solidFill>
+            </a:endParaRPr>
+          </a:p>
+        </p:txBody>
+      </p:sp>
+      <p:sp>
+        <p:nvSpPr>
+          <p:cNvPr id="151" name="Cadre 150"/>
+          <p:cNvSpPr/>
+          <p:nvPr/>
+        </p:nvSpPr>
+        <p:spPr>
+          <a:xfrm>
+            <a:off x="10511464" y="5314950"/>
+            <a:ext cx="1032169" cy="750476"/>
+          </a:xfrm>
+          <a:prstGeom prst="frame">
+            <a:avLst/>
+          </a:prstGeom>
+        </p:spPr>
+        <p:style>
+          <a:lnRef idx="2">
+            <a:schemeClr val="accent1">
+              <a:shade val="50000"/>
+            </a:schemeClr>
+          </a:lnRef>
+          <a:fillRef idx="1">
+            <a:schemeClr val="accent1"/>
+          </a:fillRef>
+          <a:effectRef idx="0">
+            <a:schemeClr val="accent1"/>
+          </a:effectRef>
+          <a:fontRef idx="minor">
+            <a:schemeClr val="lt1"/>
+          </a:fontRef>
+        </p:style>
+        <p:txBody>
+          <a:bodyPr rtlCol="0" anchor="ctr"/>
+          <a:lstStyle/>
+          <a:p>
+            <a:pPr algn="ctr"/>
+            <a:r>
+              <a:rPr lang="fr-FR" dirty="0" err="1" smtClean="0">
+                <a:solidFill>
+                  <a:schemeClr val="tx1"/>
+                </a:solidFill>
+              </a:rPr>
+              <a:t>Flask</a:t>
+            </a:r>
+            <a:endParaRPr lang="fr-FR" dirty="0">
+              <a:solidFill>
+                <a:schemeClr val="tx1"/>
+              </a:solidFill>
+            </a:endParaRPr>
+          </a:p>
+        </p:txBody>
+      </p:sp>
+      <p:cxnSp>
+        <p:nvCxnSpPr>
+          <p:cNvPr id="152" name="Connecteur droit 13"/>
+          <p:cNvCxnSpPr>
+            <a:stCxn id="40" idx="3"/>
+            <a:endCxn id="150" idx="1"/>
+          </p:cNvCxnSpPr>
+          <p:nvPr/>
+        </p:nvCxnSpPr>
+        <p:spPr>
+          <a:xfrm>
+            <a:off x="6337636" y="6076155"/>
+            <a:ext cx="316203" cy="99808"/>
+          </a:xfrm>
+          <a:prstGeom prst="curvedConnector3">
+            <a:avLst>
+              <a:gd name="adj1" fmla="val 50000"/>
+            </a:avLst>
+          </a:prstGeom>
+          <a:ln w="57150">
+            <a:solidFill>
+              <a:srgbClr val="FF0000"/>
+            </a:solidFill>
+          </a:ln>
+        </p:spPr>
+        <p:style>
+          <a:lnRef idx="1">
+            <a:schemeClr val="accent1"/>
+          </a:lnRef>
+          <a:fillRef idx="0">
+            <a:schemeClr val="accent1"/>
+          </a:fillRef>
+          <a:effectRef idx="0">
+            <a:schemeClr val="accent1"/>
+          </a:effectRef>
+          <a:fontRef idx="minor">
+            <a:schemeClr val="tx1"/>
+          </a:fontRef>
+        </p:style>
+      </p:cxnSp>
+      <p:cxnSp>
+        <p:nvCxnSpPr>
+          <p:cNvPr id="155" name="Connecteur droit 13"/>
+          <p:cNvCxnSpPr>
+            <a:stCxn id="11" idx="3"/>
+            <a:endCxn id="151" idx="1"/>
+          </p:cNvCxnSpPr>
+          <p:nvPr/>
+        </p:nvCxnSpPr>
+        <p:spPr>
+          <a:xfrm>
+            <a:off x="10222474" y="5678910"/>
+            <a:ext cx="288990" cy="11278"/>
+          </a:xfrm>
+          <a:prstGeom prst="curvedConnector3">
+            <a:avLst>
+              <a:gd name="adj1" fmla="val 50000"/>
+            </a:avLst>
+          </a:prstGeom>
+          <a:ln w="57150">
+            <a:solidFill>
+              <a:srgbClr val="FF0000"/>
+            </a:solidFill>
           </a:ln>
         </p:spPr>
         <p:style>

</xml_diff>

<commit_message>
New version of the slides (design)
</commit_message>
<xml_diff>
--- a/doc/Design.pptx
+++ b/doc/Design.pptx
@@ -6,6 +6,8 @@
   </p:sldMasterIdLst>
   <p:sldIdLst>
     <p:sldId id="256" r:id="rId2"/>
+    <p:sldId id="257" r:id="rId3"/>
+    <p:sldId id="258" r:id="rId4"/>
   </p:sldIdLst>
   <p:sldSz cx="12192000" cy="6858000"/>
   <p:notesSz cx="6858000" cy="9144000"/>
@@ -5192,6 +5194,416 @@
 </p:sld>
 </file>
 
+<file path=ppt/slides/slide2.xml><?xml version="1.0" encoding="utf-8"?>
+<p:sld xmlns:a="http://schemas.openxmlformats.org/drawingml/2006/main" xmlns:r="http://schemas.openxmlformats.org/officeDocument/2006/relationships" xmlns:p="http://schemas.openxmlformats.org/presentationml/2006/main">
+  <p:cSld>
+    <p:spTree>
+      <p:nvGrpSpPr>
+        <p:cNvPr id="1" name=""/>
+        <p:cNvGrpSpPr/>
+        <p:nvPr/>
+      </p:nvGrpSpPr>
+      <p:grpSpPr>
+        <a:xfrm>
+          <a:off x="0" y="0"/>
+          <a:ext cx="0" cy="0"/>
+          <a:chOff x="0" y="0"/>
+          <a:chExt cx="0" cy="0"/>
+        </a:xfrm>
+      </p:grpSpPr>
+      <p:sp>
+        <p:nvSpPr>
+          <p:cNvPr id="2" name="Titre 1"/>
+          <p:cNvSpPr>
+            <a:spLocks noGrp="1"/>
+          </p:cNvSpPr>
+          <p:nvPr>
+            <p:ph type="title"/>
+          </p:nvPr>
+        </p:nvSpPr>
+        <p:spPr/>
+        <p:txBody>
+          <a:bodyPr/>
+          <a:lstStyle/>
+          <a:p>
+            <a:r>
+              <a:rPr lang="fr-FR" dirty="0" smtClean="0"/>
+              <a:t>Fink-</a:t>
+            </a:r>
+            <a:r>
+              <a:rPr lang="fr-FR" dirty="0" err="1" smtClean="0"/>
+              <a:t>dataset</a:t>
+            </a:r>
+            <a:r>
+              <a:rPr lang="fr-FR" dirty="0" smtClean="0"/>
+              <a:t>-monitor</a:t>
+            </a:r>
+            <a:endParaRPr lang="fr-FR" dirty="0"/>
+          </a:p>
+        </p:txBody>
+      </p:sp>
+      <p:sp>
+        <p:nvSpPr>
+          <p:cNvPr id="3" name="Espace réservé du contenu 2"/>
+          <p:cNvSpPr>
+            <a:spLocks noGrp="1"/>
+          </p:cNvSpPr>
+          <p:nvPr>
+            <p:ph idx="1"/>
+          </p:nvPr>
+        </p:nvSpPr>
+        <p:spPr/>
+        <p:txBody>
+          <a:bodyPr>
+            <a:normAutofit fontScale="85000" lnSpcReduction="20000"/>
+          </a:bodyPr>
+          <a:lstStyle/>
+          <a:p>
+            <a:r>
+              <a:rPr lang="fr-FR" dirty="0" smtClean="0"/>
+              <a:t>Plusieurs enjeux</a:t>
+            </a:r>
+          </a:p>
+          <a:p>
+            <a:pPr lvl="1"/>
+            <a:r>
+              <a:rPr lang="fr-FR" dirty="0" smtClean="0"/>
+              <a:t>Définir une architecture client-serveur pour donner accès aux données du broker pour les utilisateurs non-locaux</a:t>
+            </a:r>
+          </a:p>
+          <a:p>
+            <a:pPr lvl="1"/>
+            <a:r>
+              <a:rPr lang="fr-FR" dirty="0" smtClean="0"/>
+              <a:t>Ne pas obliger les utilisateurs à posséder un compte sur le (futur) cluster qui accueil le broker</a:t>
+            </a:r>
+          </a:p>
+          <a:p>
+            <a:pPr lvl="1"/>
+            <a:r>
+              <a:rPr lang="fr-FR" dirty="0" smtClean="0"/>
+              <a:t>Structure ouverte (web </a:t>
+            </a:r>
+            <a:r>
+              <a:rPr lang="fr-FR" dirty="0" err="1" smtClean="0"/>
+              <a:t>based</a:t>
+            </a:r>
+            <a:r>
+              <a:rPr lang="fr-FR" dirty="0" smtClean="0"/>
+              <a:t>) pour augmenter les outils de présentation des données</a:t>
+            </a:r>
+          </a:p>
+          <a:p>
+            <a:r>
+              <a:rPr lang="fr-FR" dirty="0" smtClean="0"/>
+              <a:t>Outils:</a:t>
+            </a:r>
+          </a:p>
+          <a:p>
+            <a:pPr lvl="1"/>
+            <a:r>
+              <a:rPr lang="fr-FR" dirty="0" err="1" smtClean="0"/>
+              <a:t>Livy</a:t>
+            </a:r>
+            <a:endParaRPr lang="fr-FR" dirty="0" smtClean="0"/>
+          </a:p>
+          <a:p>
+            <a:pPr lvl="1"/>
+            <a:r>
+              <a:rPr lang="fr-FR" dirty="0" err="1" smtClean="0"/>
+              <a:t>Hbase</a:t>
+            </a:r>
+            <a:endParaRPr lang="fr-FR" dirty="0" smtClean="0"/>
+          </a:p>
+          <a:p>
+            <a:r>
+              <a:rPr lang="fr-FR" dirty="0" smtClean="0"/>
+              <a:t>Authentification</a:t>
+            </a:r>
+          </a:p>
+          <a:p>
+            <a:pPr lvl="1"/>
+            <a:r>
+              <a:rPr lang="fr-FR" dirty="0" smtClean="0"/>
+              <a:t>Séparer le monde du cluster du monde des utilisateurs</a:t>
+            </a:r>
+          </a:p>
+          <a:p>
+            <a:pPr lvl="2"/>
+            <a:r>
+              <a:rPr lang="fr-FR" dirty="0" smtClean="0"/>
+              <a:t>Accès au cluster à travers une Gateway</a:t>
+            </a:r>
+          </a:p>
+          <a:p>
+            <a:pPr lvl="2"/>
+            <a:r>
+              <a:rPr lang="fr-FR" dirty="0" smtClean="0"/>
+              <a:t>Construire une organisation autonome (gestion via </a:t>
+            </a:r>
+            <a:r>
+              <a:rPr lang="fr-FR" dirty="0" err="1" smtClean="0"/>
+              <a:t>Hbase</a:t>
+            </a:r>
+            <a:r>
+              <a:rPr lang="fr-FR" dirty="0" smtClean="0"/>
+              <a:t>)</a:t>
+            </a:r>
+          </a:p>
+          <a:p>
+            <a:pPr lvl="2"/>
+            <a:r>
+              <a:rPr lang="fr-FR" dirty="0" smtClean="0"/>
+              <a:t>Transmission des identifiants des utilisateurs via un protocole ad-hoc</a:t>
+            </a:r>
+          </a:p>
+          <a:p>
+            <a:pPr lvl="3"/>
+            <a:r>
+              <a:rPr lang="fr-FR" dirty="0" smtClean="0"/>
+              <a:t>Traçabilité</a:t>
+            </a:r>
+          </a:p>
+          <a:p>
+            <a:pPr lvl="3"/>
+            <a:r>
+              <a:rPr lang="fr-FR" dirty="0" err="1" smtClean="0"/>
+              <a:t>Accounting</a:t>
+            </a:r>
+            <a:r>
+              <a:rPr lang="fr-FR" dirty="0" smtClean="0"/>
+              <a:t> (ressources)</a:t>
+            </a:r>
+          </a:p>
+          <a:p>
+            <a:pPr lvl="2"/>
+            <a:endParaRPr lang="fr-FR" dirty="0"/>
+          </a:p>
+        </p:txBody>
+      </p:sp>
+    </p:spTree>
+    <p:extLst>
+      <p:ext uri="{BB962C8B-B14F-4D97-AF65-F5344CB8AC3E}">
+        <p14:creationId xmlns:p14="http://schemas.microsoft.com/office/powerpoint/2010/main" val="957855218"/>
+      </p:ext>
+    </p:extLst>
+  </p:cSld>
+  <p:clrMapOvr>
+    <a:masterClrMapping/>
+  </p:clrMapOvr>
+</p:sld>
+</file>
+
+<file path=ppt/slides/slide3.xml><?xml version="1.0" encoding="utf-8"?>
+<p:sld xmlns:a="http://schemas.openxmlformats.org/drawingml/2006/main" xmlns:r="http://schemas.openxmlformats.org/officeDocument/2006/relationships" xmlns:p="http://schemas.openxmlformats.org/presentationml/2006/main">
+  <p:cSld>
+    <p:spTree>
+      <p:nvGrpSpPr>
+        <p:cNvPr id="1" name=""/>
+        <p:cNvGrpSpPr/>
+        <p:nvPr/>
+      </p:nvGrpSpPr>
+      <p:grpSpPr>
+        <a:xfrm>
+          <a:off x="0" y="0"/>
+          <a:ext cx="0" cy="0"/>
+          <a:chOff x="0" y="0"/>
+          <a:chExt cx="0" cy="0"/>
+        </a:xfrm>
+      </p:grpSpPr>
+      <p:sp>
+        <p:nvSpPr>
+          <p:cNvPr id="2" name="Titre 1"/>
+          <p:cNvSpPr>
+            <a:spLocks noGrp="1"/>
+          </p:cNvSpPr>
+          <p:nvPr>
+            <p:ph type="title"/>
+          </p:nvPr>
+        </p:nvSpPr>
+        <p:spPr/>
+        <p:txBody>
+          <a:bodyPr/>
+          <a:lstStyle/>
+          <a:p>
+            <a:r>
+              <a:rPr lang="fr-FR" dirty="0"/>
+              <a:t>Fink-</a:t>
+            </a:r>
+            <a:r>
+              <a:rPr lang="fr-FR" dirty="0" err="1"/>
+              <a:t>dataset</a:t>
+            </a:r>
+            <a:r>
+              <a:rPr lang="fr-FR" dirty="0"/>
+              <a:t>-monitor</a:t>
+            </a:r>
+          </a:p>
+        </p:txBody>
+      </p:sp>
+      <p:sp>
+        <p:nvSpPr>
+          <p:cNvPr id="3" name="Espace réservé du contenu 2"/>
+          <p:cNvSpPr>
+            <a:spLocks noGrp="1"/>
+          </p:cNvSpPr>
+          <p:nvPr>
+            <p:ph idx="1"/>
+          </p:nvPr>
+        </p:nvSpPr>
+        <p:spPr/>
+        <p:txBody>
+          <a:bodyPr>
+            <a:normAutofit lnSpcReduction="10000"/>
+          </a:bodyPr>
+          <a:lstStyle/>
+          <a:p>
+            <a:r>
+              <a:rPr lang="fr-FR" dirty="0" smtClean="0"/>
+              <a:t>Principe</a:t>
+            </a:r>
+          </a:p>
+          <a:p>
+            <a:pPr lvl="1"/>
+            <a:r>
+              <a:rPr lang="fr-FR" dirty="0" smtClean="0"/>
+              <a:t>Gestion d’une organisation d’autorisations d’identification (</a:t>
+            </a:r>
+            <a:r>
+              <a:rPr lang="fr-FR" dirty="0" err="1" smtClean="0"/>
+              <a:t>Hbase</a:t>
+            </a:r>
+            <a:r>
+              <a:rPr lang="fr-FR" dirty="0" smtClean="0"/>
+              <a:t>)</a:t>
+            </a:r>
+          </a:p>
+          <a:p>
+            <a:pPr lvl="1"/>
+            <a:r>
+              <a:rPr lang="fr-FR" dirty="0" smtClean="0"/>
+              <a:t>Accès aux données via </a:t>
+            </a:r>
+            <a:r>
+              <a:rPr lang="fr-FR" dirty="0" err="1" smtClean="0"/>
+              <a:t>Livy</a:t>
+            </a:r>
+            <a:r>
+              <a:rPr lang="fr-FR" dirty="0" smtClean="0"/>
+              <a:t>/</a:t>
+            </a:r>
+            <a:r>
+              <a:rPr lang="fr-FR" dirty="0" err="1" smtClean="0"/>
+              <a:t>Hbase</a:t>
+            </a:r>
+            <a:r>
+              <a:rPr lang="fr-FR" dirty="0" smtClean="0"/>
+              <a:t>(</a:t>
+            </a:r>
+            <a:r>
+              <a:rPr lang="fr-FR" dirty="0" err="1" smtClean="0"/>
+              <a:t>dataframes</a:t>
+            </a:r>
+            <a:r>
+              <a:rPr lang="fr-FR" dirty="0" smtClean="0"/>
+              <a:t>)</a:t>
+            </a:r>
+          </a:p>
+          <a:p>
+            <a:pPr lvl="1"/>
+            <a:r>
+              <a:rPr lang="fr-FR" dirty="0" smtClean="0"/>
+              <a:t>Gestion des sessions </a:t>
+            </a:r>
+            <a:r>
+              <a:rPr lang="fr-FR" dirty="0" err="1" smtClean="0"/>
+              <a:t>Livy</a:t>
+            </a:r>
+            <a:r>
+              <a:rPr lang="fr-FR" dirty="0" smtClean="0"/>
+              <a:t>/</a:t>
+            </a:r>
+            <a:r>
+              <a:rPr lang="fr-FR" dirty="0" err="1" smtClean="0"/>
+              <a:t>Yarn</a:t>
+            </a:r>
+            <a:r>
+              <a:rPr lang="fr-FR" dirty="0" smtClean="0"/>
+              <a:t> maintenues </a:t>
+            </a:r>
+          </a:p>
+          <a:p>
+            <a:pPr lvl="2"/>
+            <a:r>
+              <a:rPr lang="fr-FR" dirty="0" smtClean="0"/>
+              <a:t>Un utilisateur peut relancer son client et se reconnecter à sa session ouverte</a:t>
+            </a:r>
+          </a:p>
+          <a:p>
+            <a:pPr lvl="2"/>
+            <a:r>
+              <a:rPr lang="fr-FR" dirty="0" smtClean="0"/>
+              <a:t>Les administrateurs peuvent associer les utilisateurs aux sessions </a:t>
+            </a:r>
+            <a:r>
+              <a:rPr lang="fr-FR" dirty="0" err="1" smtClean="0"/>
+              <a:t>Livy</a:t>
+            </a:r>
+            <a:r>
+              <a:rPr lang="fr-FR" dirty="0" smtClean="0"/>
+              <a:t> pour la gestion des ressources allouées</a:t>
+            </a:r>
+          </a:p>
+          <a:p>
+            <a:r>
+              <a:rPr lang="fr-FR" dirty="0" smtClean="0"/>
+              <a:t>Un prototype opérationnel existe qui implémente le modèle </a:t>
+            </a:r>
+          </a:p>
+          <a:p>
+            <a:r>
+              <a:rPr lang="fr-FR" dirty="0" smtClean="0"/>
+              <a:t>Suite:</a:t>
+            </a:r>
+          </a:p>
+          <a:p>
+            <a:pPr lvl="1"/>
+            <a:r>
+              <a:rPr lang="fr-FR" dirty="0" smtClean="0"/>
+              <a:t>Besoin d’expertise pour définir les outils d’authentification (LDAP? Xxx?)</a:t>
+            </a:r>
+          </a:p>
+          <a:p>
+            <a:pPr lvl="1"/>
+            <a:r>
+              <a:rPr lang="fr-FR" dirty="0" smtClean="0"/>
+              <a:t>Développements sur la structure «</a:t>
+            </a:r>
+            <a:r>
+              <a:rPr lang="fr-FR" dirty="0" err="1" smtClean="0"/>
+              <a:t>pluggin</a:t>
+            </a:r>
+            <a:r>
+              <a:rPr lang="fr-FR" dirty="0" smtClean="0"/>
+              <a:t>» du client web</a:t>
+            </a:r>
+            <a:endParaRPr lang="fr-FR" dirty="0"/>
+          </a:p>
+        </p:txBody>
+      </p:sp>
+    </p:spTree>
+    <p:extLst>
+      <p:ext uri="{BB962C8B-B14F-4D97-AF65-F5344CB8AC3E}">
+        <p14:creationId xmlns:p14="http://schemas.microsoft.com/office/powerpoint/2010/main" val="554859916"/>
+      </p:ext>
+    </p:extLst>
+  </p:cSld>
+  <p:clrMapOvr>
+    <a:masterClrMapping/>
+  </p:clrMapOvr>
+</p:sld>
+</file>
+
 <file path=ppt/theme/theme1.xml><?xml version="1.0" encoding="utf-8"?>
 <a:theme xmlns:a="http://schemas.openxmlformats.org/drawingml/2006/main" name="Thème Office">
   <a:themeElements>

</xml_diff>

<commit_message>
fdm.py> + Cleanup code against PEP8 + include HBase + start the IHM for users
design.pptx>
+ describe the IHM design
</commit_message>
<xml_diff>
--- a/doc/Design.pptx
+++ b/doc/Design.pptx
@@ -8,6 +8,7 @@
     <p:sldId id="256" r:id="rId2"/>
     <p:sldId id="257" r:id="rId3"/>
     <p:sldId id="258" r:id="rId4"/>
+    <p:sldId id="259" r:id="rId5"/>
   </p:sldIdLst>
   <p:sldSz cx="12192000" cy="6858000"/>
   <p:notesSz cx="6858000" cy="9144000"/>
@@ -5255,7 +5256,7 @@
         <p:spPr/>
         <p:txBody>
           <a:bodyPr>
-            <a:normAutofit fontScale="85000" lnSpcReduction="20000"/>
+            <a:normAutofit fontScale="77500" lnSpcReduction="20000"/>
           </a:bodyPr>
           <a:lstStyle/>
           <a:p>
@@ -5275,17 +5276,29 @@
             <a:pPr lvl="1"/>
             <a:r>
               <a:rPr lang="fr-FR" dirty="0" smtClean="0"/>
-              <a:t>Ne pas obliger les utilisateurs à posséder un compte sur le (futur) cluster qui accueil le broker</a:t>
+              <a:t>Ne pas obliger les utilisateurs à posséder un compte sur le (</a:t>
+            </a:r>
+            <a:r>
+              <a:rPr lang="fr-FR" i="1" dirty="0" smtClean="0"/>
+              <a:t>futur</a:t>
+            </a:r>
+            <a:r>
+              <a:rPr lang="fr-FR" dirty="0" smtClean="0"/>
+              <a:t>) cluster qui accueille le broker</a:t>
             </a:r>
           </a:p>
           <a:p>
             <a:pPr lvl="1"/>
             <a:r>
               <a:rPr lang="fr-FR" dirty="0" smtClean="0"/>
-              <a:t>Structure ouverte (web </a:t>
-            </a:r>
-            <a:r>
-              <a:rPr lang="fr-FR" dirty="0" err="1" smtClean="0"/>
+              <a:t>Structure ouverte (</a:t>
+            </a:r>
+            <a:r>
+              <a:rPr lang="fr-FR" i="1" dirty="0" smtClean="0"/>
+              <a:t>web </a:t>
+            </a:r>
+            <a:r>
+              <a:rPr lang="fr-FR" i="1" dirty="0" err="1" smtClean="0"/>
               <a:t>based</a:t>
             </a:r>
             <a:r>
@@ -5305,15 +5318,29 @@
               <a:rPr lang="fr-FR" dirty="0" err="1" smtClean="0"/>
               <a:t>Livy</a:t>
             </a:r>
-            <a:endParaRPr lang="fr-FR" dirty="0" smtClean="0"/>
-          </a:p>
-          <a:p>
-            <a:pPr lvl="1"/>
+            <a:r>
+              <a:rPr lang="fr-FR" dirty="0" smtClean="0"/>
+              <a:t> (+</a:t>
+            </a:r>
             <a:r>
               <a:rPr lang="fr-FR" dirty="0" err="1" smtClean="0"/>
               <a:t>Hbase</a:t>
             </a:r>
-            <a:endParaRPr lang="fr-FR" dirty="0" smtClean="0"/>
+            <a:r>
+              <a:rPr lang="fr-FR" dirty="0" smtClean="0"/>
+              <a:t>)</a:t>
+            </a:r>
+          </a:p>
+          <a:p>
+            <a:pPr lvl="1"/>
+            <a:r>
+              <a:rPr lang="fr-FR" dirty="0" err="1" smtClean="0"/>
+              <a:t>Hbase</a:t>
+            </a:r>
+            <a:r>
+              <a:rPr lang="fr-FR" dirty="0" smtClean="0"/>
+              <a:t> (pour l’authentification)</a:t>
+            </a:r>
           </a:p>
           <a:p>
             <a:r>
@@ -5325,7 +5352,7 @@
             <a:pPr lvl="1"/>
             <a:r>
               <a:rPr lang="fr-FR" dirty="0" smtClean="0"/>
-              <a:t>Séparer le monde du cluster du monde des utilisateurs</a:t>
+              <a:t>Séparer le monde du cluster, du monde des utilisateurs</a:t>
             </a:r>
           </a:p>
           <a:p>
@@ -5595,6 +5622,3566 @@
     <p:extLst>
       <p:ext uri="{BB962C8B-B14F-4D97-AF65-F5344CB8AC3E}">
         <p14:creationId xmlns:p14="http://schemas.microsoft.com/office/powerpoint/2010/main" val="554859916"/>
+      </p:ext>
+    </p:extLst>
+  </p:cSld>
+  <p:clrMapOvr>
+    <a:masterClrMapping/>
+  </p:clrMapOvr>
+</p:sld>
+</file>
+
+<file path=ppt/slides/slide4.xml><?xml version="1.0" encoding="utf-8"?>
+<p:sld xmlns:a="http://schemas.openxmlformats.org/drawingml/2006/main" xmlns:r="http://schemas.openxmlformats.org/officeDocument/2006/relationships" xmlns:p="http://schemas.openxmlformats.org/presentationml/2006/main">
+  <p:cSld>
+    <p:spTree>
+      <p:nvGrpSpPr>
+        <p:cNvPr id="1" name=""/>
+        <p:cNvGrpSpPr/>
+        <p:nvPr/>
+      </p:nvGrpSpPr>
+      <p:grpSpPr>
+        <a:xfrm>
+          <a:off x="0" y="0"/>
+          <a:ext cx="0" cy="0"/>
+          <a:chOff x="0" y="0"/>
+          <a:chExt cx="0" cy="0"/>
+        </a:xfrm>
+      </p:grpSpPr>
+      <p:sp>
+        <p:nvSpPr>
+          <p:cNvPr id="2" name="ZoneTexte 1"/>
+          <p:cNvSpPr txBox="1"/>
+          <p:nvPr/>
+        </p:nvSpPr>
+        <p:spPr>
+          <a:xfrm>
+            <a:off x="2514600" y="171450"/>
+            <a:ext cx="255384" cy="369332"/>
+          </a:xfrm>
+          <a:prstGeom prst="rect">
+            <a:avLst/>
+          </a:prstGeom>
+          <a:noFill/>
+          <a:ln>
+            <a:solidFill>
+              <a:srgbClr val="FF0000"/>
+            </a:solidFill>
+          </a:ln>
+        </p:spPr>
+        <p:txBody>
+          <a:bodyPr wrap="square" rtlCol="0">
+            <a:spAutoFit/>
+          </a:bodyPr>
+          <a:lstStyle/>
+          <a:p>
+            <a:r>
+              <a:rPr lang="fr-FR" dirty="0" smtClean="0"/>
+              <a:t>/</a:t>
+            </a:r>
+            <a:endParaRPr lang="fr-FR" dirty="0"/>
+          </a:p>
+        </p:txBody>
+      </p:sp>
+      <p:sp>
+        <p:nvSpPr>
+          <p:cNvPr id="5" name="Rectangle 2"/>
+          <p:cNvSpPr>
+            <a:spLocks noChangeArrowheads="1"/>
+          </p:cNvSpPr>
+          <p:nvPr/>
+        </p:nvSpPr>
+        <p:spPr bwMode="auto">
+          <a:xfrm>
+            <a:off x="3743326" y="400764"/>
+            <a:ext cx="1895474" cy="246221"/>
+          </a:xfrm>
+          <a:prstGeom prst="rect">
+            <a:avLst/>
+          </a:prstGeom>
+          <a:solidFill>
+            <a:schemeClr val="bg1">
+              <a:lumMod val="85000"/>
+            </a:schemeClr>
+          </a:solidFill>
+          <a:ln w="9525">
+            <a:solidFill>
+              <a:schemeClr val="tx1"/>
+            </a:solidFill>
+            <a:miter lim="800000"/>
+            <a:headEnd/>
+            <a:tailEnd/>
+          </a:ln>
+          <a:effectLst/>
+        </p:spPr>
+        <p:txBody>
+          <a:bodyPr vert="horz" wrap="square" lIns="91440" tIns="45720" rIns="91440" bIns="45720" numCol="1" anchor="ctr" anchorCtr="0" compatLnSpc="1">
+            <a:prstTxWarp prst="textNoShape">
+              <a:avLst/>
+            </a:prstTxWarp>
+            <a:spAutoFit/>
+          </a:bodyPr>
+          <a:lstStyle/>
+          <a:p>
+            <a:pPr marL="0" marR="0" lvl="0" indent="0" algn="ctr" defTabSz="914400" rtl="0" eaLnBrk="0" fontAlgn="base" latinLnBrk="0" hangingPunct="0">
+              <a:lnSpc>
+                <a:spcPct val="100000"/>
+              </a:lnSpc>
+              <a:spcBef>
+                <a:spcPct val="0"/>
+              </a:spcBef>
+              <a:spcAft>
+                <a:spcPct val="0"/>
+              </a:spcAft>
+              <a:buClrTx/>
+              <a:buSzTx/>
+              <a:buFontTx/>
+              <a:buNone/>
+              <a:tabLst/>
+            </a:pPr>
+            <a:r>
+              <a:rPr kumimoji="0" lang="fr-FR" altLang="fr-FR" sz="1000" b="0" i="0" u="none" strike="noStrike" cap="none" normalizeH="0" baseline="0" dirty="0" err="1" smtClean="0">
+                <a:ln>
+                  <a:noFill/>
+                </a:ln>
+                <a:solidFill>
+                  <a:srgbClr val="000000"/>
+                </a:solidFill>
+                <a:effectLst/>
+                <a:latin typeface="Courier New" panose="02070309020205020404" pitchFamily="49" charset="0"/>
+                <a:cs typeface="Courier New" panose="02070309020205020404" pitchFamily="49" charset="0"/>
+              </a:rPr>
+              <a:t>fink_dataset_monitor</a:t>
+            </a:r>
+            <a:r>
+              <a:rPr kumimoji="0" lang="fr-FR" altLang="fr-FR" sz="1000" b="0" i="0" u="none" strike="noStrike" cap="none" normalizeH="0" baseline="0" dirty="0" smtClean="0">
+                <a:ln>
+                  <a:noFill/>
+                </a:ln>
+                <a:solidFill>
+                  <a:srgbClr val="000000"/>
+                </a:solidFill>
+                <a:effectLst/>
+                <a:latin typeface="Courier New" panose="02070309020205020404" pitchFamily="49" charset="0"/>
+                <a:cs typeface="Courier New" panose="02070309020205020404" pitchFamily="49" charset="0"/>
+              </a:rPr>
+              <a:t>()</a:t>
+            </a:r>
+            <a:endParaRPr kumimoji="0" lang="fr-FR" altLang="fr-FR" sz="1800" b="0" i="0" u="none" strike="noStrike" cap="none" normalizeH="0" baseline="0" dirty="0" smtClean="0">
+              <a:ln>
+                <a:noFill/>
+              </a:ln>
+              <a:solidFill>
+                <a:schemeClr val="tx1"/>
+              </a:solidFill>
+              <a:effectLst/>
+              <a:latin typeface="Arial" panose="020B0604020202020204" pitchFamily="34" charset="0"/>
+            </a:endParaRPr>
+          </a:p>
+        </p:txBody>
+      </p:sp>
+      <p:cxnSp>
+        <p:nvCxnSpPr>
+          <p:cNvPr id="7" name="Connecteur en arc 6"/>
+          <p:cNvCxnSpPr>
+            <a:stCxn id="2" idx="3"/>
+            <a:endCxn id="5" idx="1"/>
+          </p:cNvCxnSpPr>
+          <p:nvPr/>
+        </p:nvCxnSpPr>
+        <p:spPr>
+          <a:xfrm>
+            <a:off x="2769984" y="356116"/>
+            <a:ext cx="973342" cy="167759"/>
+          </a:xfrm>
+          <a:prstGeom prst="curvedConnector3">
+            <a:avLst/>
+          </a:prstGeom>
+          <a:ln>
+            <a:tailEnd type="triangle"/>
+          </a:ln>
+        </p:spPr>
+        <p:style>
+          <a:lnRef idx="1">
+            <a:schemeClr val="accent1"/>
+          </a:lnRef>
+          <a:fillRef idx="0">
+            <a:schemeClr val="accent1"/>
+          </a:fillRef>
+          <a:effectRef idx="0">
+            <a:schemeClr val="accent1"/>
+          </a:effectRef>
+          <a:fontRef idx="minor">
+            <a:schemeClr val="tx1"/>
+          </a:fontRef>
+        </p:style>
+      </p:cxnSp>
+      <p:sp>
+        <p:nvSpPr>
+          <p:cNvPr id="9" name="Rectangle avec coins arrondis en diagonale 8"/>
+          <p:cNvSpPr/>
+          <p:nvPr/>
+        </p:nvSpPr>
+        <p:spPr>
+          <a:xfrm>
+            <a:off x="5029200" y="1148833"/>
+            <a:ext cx="1076326" cy="241817"/>
+          </a:xfrm>
+          <a:prstGeom prst="round2DiagRect">
+            <a:avLst/>
+          </a:prstGeom>
+        </p:spPr>
+        <p:style>
+          <a:lnRef idx="2">
+            <a:schemeClr val="accent1">
+              <a:shade val="50000"/>
+            </a:schemeClr>
+          </a:lnRef>
+          <a:fillRef idx="1">
+            <a:schemeClr val="accent1"/>
+          </a:fillRef>
+          <a:effectRef idx="0">
+            <a:schemeClr val="accent1"/>
+          </a:effectRef>
+          <a:fontRef idx="minor">
+            <a:schemeClr val="lt1"/>
+          </a:fontRef>
+        </p:style>
+        <p:txBody>
+          <a:bodyPr rtlCol="0" anchor="ctr"/>
+          <a:lstStyle/>
+          <a:p>
+            <a:pPr algn="ctr"/>
+            <a:r>
+              <a:rPr lang="fr-FR" sz="1400" dirty="0"/>
+              <a:t>o</a:t>
+            </a:r>
+            <a:r>
+              <a:rPr lang="fr-FR" sz="1400" dirty="0" smtClean="0"/>
+              <a:t>pen.html</a:t>
+            </a:r>
+            <a:endParaRPr lang="fr-FR" sz="1400" dirty="0"/>
+          </a:p>
+        </p:txBody>
+      </p:sp>
+      <p:cxnSp>
+        <p:nvCxnSpPr>
+          <p:cNvPr id="10" name="Connecteur en arc 9"/>
+          <p:cNvCxnSpPr>
+            <a:stCxn id="5" idx="2"/>
+            <a:endCxn id="9" idx="3"/>
+          </p:cNvCxnSpPr>
+          <p:nvPr/>
+        </p:nvCxnSpPr>
+        <p:spPr>
+          <a:xfrm rot="16200000" flipH="1">
+            <a:off x="4878289" y="459759"/>
+            <a:ext cx="501848" cy="876300"/>
+          </a:xfrm>
+          <a:prstGeom prst="curvedConnector3">
+            <a:avLst>
+              <a:gd name="adj1" fmla="val 50000"/>
+            </a:avLst>
+          </a:prstGeom>
+          <a:ln>
+            <a:tailEnd type="triangle"/>
+          </a:ln>
+        </p:spPr>
+        <p:style>
+          <a:lnRef idx="1">
+            <a:schemeClr val="accent1"/>
+          </a:lnRef>
+          <a:fillRef idx="0">
+            <a:schemeClr val="accent1"/>
+          </a:fillRef>
+          <a:effectRef idx="0">
+            <a:schemeClr val="accent1"/>
+          </a:effectRef>
+          <a:fontRef idx="minor">
+            <a:schemeClr val="tx1"/>
+          </a:fontRef>
+        </p:style>
+      </p:cxnSp>
+      <p:sp>
+        <p:nvSpPr>
+          <p:cNvPr id="13" name="Rectangle 2"/>
+          <p:cNvSpPr>
+            <a:spLocks noChangeArrowheads="1"/>
+          </p:cNvSpPr>
+          <p:nvPr/>
+        </p:nvSpPr>
+        <p:spPr bwMode="auto">
+          <a:xfrm>
+            <a:off x="7391400" y="648414"/>
+            <a:ext cx="1295399" cy="246221"/>
+          </a:xfrm>
+          <a:prstGeom prst="rect">
+            <a:avLst/>
+          </a:prstGeom>
+          <a:solidFill>
+            <a:schemeClr val="bg1">
+              <a:lumMod val="85000"/>
+            </a:schemeClr>
+          </a:solidFill>
+          <a:ln w="9525">
+            <a:solidFill>
+              <a:schemeClr val="tx1"/>
+            </a:solidFill>
+            <a:miter lim="800000"/>
+            <a:headEnd/>
+            <a:tailEnd/>
+          </a:ln>
+          <a:effectLst/>
+        </p:spPr>
+        <p:txBody>
+          <a:bodyPr vert="horz" wrap="square" lIns="91440" tIns="45720" rIns="91440" bIns="45720" numCol="1" anchor="ctr" anchorCtr="0" compatLnSpc="1">
+            <a:prstTxWarp prst="textNoShape">
+              <a:avLst/>
+            </a:prstTxWarp>
+            <a:spAutoFit/>
+          </a:bodyPr>
+          <a:lstStyle/>
+          <a:p>
+            <a:pPr marL="0" marR="0" lvl="0" indent="0" algn="ctr" defTabSz="914400" rtl="0" eaLnBrk="0" fontAlgn="base" latinLnBrk="0" hangingPunct="0">
+              <a:lnSpc>
+                <a:spcPct val="100000"/>
+              </a:lnSpc>
+              <a:spcBef>
+                <a:spcPct val="0"/>
+              </a:spcBef>
+              <a:spcAft>
+                <a:spcPct val="0"/>
+              </a:spcAft>
+              <a:buClrTx/>
+              <a:buSzTx/>
+              <a:buFontTx/>
+              <a:buNone/>
+              <a:tabLst/>
+            </a:pPr>
+            <a:r>
+              <a:rPr lang="fr-FR" altLang="fr-FR" sz="1000" dirty="0" err="1">
+                <a:solidFill>
+                  <a:srgbClr val="000000"/>
+                </a:solidFill>
+                <a:latin typeface="Courier New" panose="02070309020205020404" pitchFamily="49" charset="0"/>
+                <a:cs typeface="Courier New" panose="02070309020205020404" pitchFamily="49" charset="0"/>
+              </a:rPr>
+              <a:t>o</a:t>
+            </a:r>
+            <a:r>
+              <a:rPr kumimoji="0" lang="fr-FR" altLang="fr-FR" sz="1000" b="0" i="0" u="none" strike="noStrike" cap="none" normalizeH="0" baseline="0" dirty="0" err="1" smtClean="0">
+                <a:ln>
+                  <a:noFill/>
+                </a:ln>
+                <a:solidFill>
+                  <a:srgbClr val="000000"/>
+                </a:solidFill>
+                <a:effectLst/>
+                <a:latin typeface="Courier New" panose="02070309020205020404" pitchFamily="49" charset="0"/>
+                <a:cs typeface="Courier New" panose="02070309020205020404" pitchFamily="49" charset="0"/>
+              </a:rPr>
+              <a:t>pen_session</a:t>
+            </a:r>
+            <a:r>
+              <a:rPr kumimoji="0" lang="fr-FR" altLang="fr-FR" sz="1000" b="0" i="0" u="none" strike="noStrike" cap="none" normalizeH="0" baseline="0" dirty="0" smtClean="0">
+                <a:ln>
+                  <a:noFill/>
+                </a:ln>
+                <a:solidFill>
+                  <a:srgbClr val="000000"/>
+                </a:solidFill>
+                <a:effectLst/>
+                <a:latin typeface="Courier New" panose="02070309020205020404" pitchFamily="49" charset="0"/>
+                <a:cs typeface="Courier New" panose="02070309020205020404" pitchFamily="49" charset="0"/>
+              </a:rPr>
+              <a:t>()</a:t>
+            </a:r>
+            <a:endParaRPr kumimoji="0" lang="fr-FR" altLang="fr-FR" sz="1800" b="0" i="0" u="none" strike="noStrike" cap="none" normalizeH="0" baseline="0" dirty="0" smtClean="0">
+              <a:ln>
+                <a:noFill/>
+              </a:ln>
+              <a:solidFill>
+                <a:schemeClr val="tx1"/>
+              </a:solidFill>
+              <a:effectLst/>
+              <a:latin typeface="Arial" panose="020B0604020202020204" pitchFamily="34" charset="0"/>
+            </a:endParaRPr>
+          </a:p>
+        </p:txBody>
+      </p:sp>
+      <p:cxnSp>
+        <p:nvCxnSpPr>
+          <p:cNvPr id="14" name="Connecteur en arc 13"/>
+          <p:cNvCxnSpPr>
+            <a:stCxn id="9" idx="0"/>
+            <a:endCxn id="13" idx="1"/>
+          </p:cNvCxnSpPr>
+          <p:nvPr/>
+        </p:nvCxnSpPr>
+        <p:spPr>
+          <a:xfrm flipV="1">
+            <a:off x="6105526" y="771525"/>
+            <a:ext cx="1285874" cy="498217"/>
+          </a:xfrm>
+          <a:prstGeom prst="curvedConnector3">
+            <a:avLst>
+              <a:gd name="adj1" fmla="val 50000"/>
+            </a:avLst>
+          </a:prstGeom>
+          <a:ln>
+            <a:tailEnd type="triangle"/>
+          </a:ln>
+        </p:spPr>
+        <p:style>
+          <a:lnRef idx="1">
+            <a:schemeClr val="accent1"/>
+          </a:lnRef>
+          <a:fillRef idx="0">
+            <a:schemeClr val="accent1"/>
+          </a:fillRef>
+          <a:effectRef idx="0">
+            <a:schemeClr val="accent1"/>
+          </a:effectRef>
+          <a:fontRef idx="minor">
+            <a:schemeClr val="tx1"/>
+          </a:fontRef>
+        </p:style>
+      </p:cxnSp>
+      <p:sp>
+        <p:nvSpPr>
+          <p:cNvPr id="20" name="Rectangle 2"/>
+          <p:cNvSpPr>
+            <a:spLocks noChangeArrowheads="1"/>
+          </p:cNvSpPr>
+          <p:nvPr/>
+        </p:nvSpPr>
+        <p:spPr bwMode="auto">
+          <a:xfrm>
+            <a:off x="7410450" y="1000839"/>
+            <a:ext cx="1295399" cy="246221"/>
+          </a:xfrm>
+          <a:prstGeom prst="rect">
+            <a:avLst/>
+          </a:prstGeom>
+          <a:solidFill>
+            <a:schemeClr val="bg1">
+              <a:lumMod val="85000"/>
+            </a:schemeClr>
+          </a:solidFill>
+          <a:ln w="9525">
+            <a:solidFill>
+              <a:schemeClr val="tx1"/>
+            </a:solidFill>
+            <a:miter lim="800000"/>
+            <a:headEnd/>
+            <a:tailEnd/>
+          </a:ln>
+          <a:effectLst/>
+        </p:spPr>
+        <p:txBody>
+          <a:bodyPr vert="horz" wrap="square" lIns="91440" tIns="45720" rIns="91440" bIns="45720" numCol="1" anchor="ctr" anchorCtr="0" compatLnSpc="1">
+            <a:prstTxWarp prst="textNoShape">
+              <a:avLst/>
+            </a:prstTxWarp>
+            <a:spAutoFit/>
+          </a:bodyPr>
+          <a:lstStyle/>
+          <a:p>
+            <a:pPr marL="0" marR="0" lvl="0" indent="0" algn="ctr" defTabSz="914400" rtl="0" eaLnBrk="0" fontAlgn="base" latinLnBrk="0" hangingPunct="0">
+              <a:lnSpc>
+                <a:spcPct val="100000"/>
+              </a:lnSpc>
+              <a:spcBef>
+                <a:spcPct val="0"/>
+              </a:spcBef>
+              <a:spcAft>
+                <a:spcPct val="0"/>
+              </a:spcAft>
+              <a:buClrTx/>
+              <a:buSzTx/>
+              <a:buFontTx/>
+              <a:buNone/>
+              <a:tabLst/>
+            </a:pPr>
+            <a:r>
+              <a:rPr kumimoji="0" lang="fr-FR" altLang="fr-FR" sz="1000" b="0" i="0" u="none" strike="noStrike" cap="none" normalizeH="0" baseline="0" dirty="0" smtClean="0">
+                <a:ln>
+                  <a:noFill/>
+                </a:ln>
+                <a:solidFill>
+                  <a:srgbClr val="000000"/>
+                </a:solidFill>
+                <a:effectLst/>
+                <a:latin typeface="Courier New" panose="02070309020205020404" pitchFamily="49" charset="0"/>
+                <a:cs typeface="Courier New" panose="02070309020205020404" pitchFamily="49" charset="0"/>
+              </a:rPr>
+              <a:t>Start thread</a:t>
+            </a:r>
+            <a:endParaRPr kumimoji="0" lang="fr-FR" altLang="fr-FR" sz="1800" b="0" i="0" u="none" strike="noStrike" cap="none" normalizeH="0" baseline="0" dirty="0" smtClean="0">
+              <a:ln>
+                <a:noFill/>
+              </a:ln>
+              <a:solidFill>
+                <a:schemeClr val="tx1"/>
+              </a:solidFill>
+              <a:effectLst/>
+              <a:latin typeface="Arial" panose="020B0604020202020204" pitchFamily="34" charset="0"/>
+            </a:endParaRPr>
+          </a:p>
+        </p:txBody>
+      </p:sp>
+      <p:sp>
+        <p:nvSpPr>
+          <p:cNvPr id="21" name="Rectangle avec coins arrondis en diagonale 20"/>
+          <p:cNvSpPr/>
+          <p:nvPr/>
+        </p:nvSpPr>
+        <p:spPr>
+          <a:xfrm>
+            <a:off x="7486650" y="1710808"/>
+            <a:ext cx="1076326" cy="241817"/>
+          </a:xfrm>
+          <a:prstGeom prst="round2DiagRect">
+            <a:avLst/>
+          </a:prstGeom>
+        </p:spPr>
+        <p:style>
+          <a:lnRef idx="2">
+            <a:schemeClr val="accent1">
+              <a:shade val="50000"/>
+            </a:schemeClr>
+          </a:lnRef>
+          <a:fillRef idx="1">
+            <a:schemeClr val="accent1"/>
+          </a:fillRef>
+          <a:effectRef idx="0">
+            <a:schemeClr val="accent1"/>
+          </a:effectRef>
+          <a:fontRef idx="minor">
+            <a:schemeClr val="lt1"/>
+          </a:fontRef>
+        </p:style>
+        <p:txBody>
+          <a:bodyPr rtlCol="0" anchor="ctr"/>
+          <a:lstStyle/>
+          <a:p>
+            <a:pPr algn="ctr"/>
+            <a:r>
+              <a:rPr lang="fr-FR" sz="1400" dirty="0" smtClean="0"/>
+              <a:t>wait.html</a:t>
+            </a:r>
+            <a:endParaRPr lang="fr-FR" sz="1400" dirty="0"/>
+          </a:p>
+        </p:txBody>
+      </p:sp>
+      <p:cxnSp>
+        <p:nvCxnSpPr>
+          <p:cNvPr id="22" name="Connecteur en arc 21"/>
+          <p:cNvCxnSpPr>
+            <a:stCxn id="13" idx="2"/>
+            <a:endCxn id="20" idx="0"/>
+          </p:cNvCxnSpPr>
+          <p:nvPr/>
+        </p:nvCxnSpPr>
+        <p:spPr>
+          <a:xfrm rot="16200000" flipH="1">
+            <a:off x="7995523" y="938212"/>
+            <a:ext cx="106204" cy="19050"/>
+          </a:xfrm>
+          <a:prstGeom prst="curvedConnector3">
+            <a:avLst>
+              <a:gd name="adj1" fmla="val 50000"/>
+            </a:avLst>
+          </a:prstGeom>
+          <a:ln>
+            <a:tailEnd type="triangle"/>
+          </a:ln>
+        </p:spPr>
+        <p:style>
+          <a:lnRef idx="1">
+            <a:schemeClr val="accent1"/>
+          </a:lnRef>
+          <a:fillRef idx="0">
+            <a:schemeClr val="accent1"/>
+          </a:fillRef>
+          <a:effectRef idx="0">
+            <a:schemeClr val="accent1"/>
+          </a:effectRef>
+          <a:fontRef idx="minor">
+            <a:schemeClr val="tx1"/>
+          </a:fontRef>
+        </p:style>
+      </p:cxnSp>
+      <p:cxnSp>
+        <p:nvCxnSpPr>
+          <p:cNvPr id="25" name="Connecteur en arc 24"/>
+          <p:cNvCxnSpPr>
+            <a:stCxn id="20" idx="2"/>
+            <a:endCxn id="21" idx="3"/>
+          </p:cNvCxnSpPr>
+          <p:nvPr/>
+        </p:nvCxnSpPr>
+        <p:spPr>
+          <a:xfrm rot="5400000">
+            <a:off x="7809608" y="1462266"/>
+            <a:ext cx="463748" cy="33337"/>
+          </a:xfrm>
+          <a:prstGeom prst="curvedConnector3">
+            <a:avLst>
+              <a:gd name="adj1" fmla="val 50000"/>
+            </a:avLst>
+          </a:prstGeom>
+          <a:ln>
+            <a:tailEnd type="triangle"/>
+          </a:ln>
+        </p:spPr>
+        <p:style>
+          <a:lnRef idx="1">
+            <a:schemeClr val="accent1"/>
+          </a:lnRef>
+          <a:fillRef idx="0">
+            <a:schemeClr val="accent1"/>
+          </a:fillRef>
+          <a:effectRef idx="0">
+            <a:schemeClr val="accent1"/>
+          </a:effectRef>
+          <a:fontRef idx="minor">
+            <a:schemeClr val="tx1"/>
+          </a:fontRef>
+        </p:style>
+      </p:cxnSp>
+      <p:sp>
+        <p:nvSpPr>
+          <p:cNvPr id="28" name="ZoneTexte 27"/>
+          <p:cNvSpPr txBox="1"/>
+          <p:nvPr/>
+        </p:nvSpPr>
+        <p:spPr>
+          <a:xfrm>
+            <a:off x="7019925" y="2800350"/>
+            <a:ext cx="695326" cy="369332"/>
+          </a:xfrm>
+          <a:prstGeom prst="rect">
+            <a:avLst/>
+          </a:prstGeom>
+          <a:noFill/>
+          <a:ln>
+            <a:solidFill>
+              <a:srgbClr val="FF0000"/>
+            </a:solidFill>
+          </a:ln>
+        </p:spPr>
+        <p:txBody>
+          <a:bodyPr wrap="square" rtlCol="0">
+            <a:spAutoFit/>
+          </a:bodyPr>
+          <a:lstStyle/>
+          <a:p>
+            <a:r>
+              <a:rPr lang="fr-FR" dirty="0" smtClean="0"/>
+              <a:t>/</a:t>
+            </a:r>
+            <a:r>
+              <a:rPr lang="fr-FR" dirty="0" err="1" smtClean="0"/>
+              <a:t>wait</a:t>
+            </a:r>
+            <a:endParaRPr lang="fr-FR" dirty="0"/>
+          </a:p>
+        </p:txBody>
+      </p:sp>
+      <p:sp>
+        <p:nvSpPr>
+          <p:cNvPr id="29" name="ZoneTexte 28"/>
+          <p:cNvSpPr txBox="1"/>
+          <p:nvPr/>
+        </p:nvSpPr>
+        <p:spPr>
+          <a:xfrm>
+            <a:off x="4076699" y="2181225"/>
+            <a:ext cx="823913" cy="369332"/>
+          </a:xfrm>
+          <a:prstGeom prst="rect">
+            <a:avLst/>
+          </a:prstGeom>
+          <a:noFill/>
+          <a:ln>
+            <a:solidFill>
+              <a:srgbClr val="FF0000"/>
+            </a:solidFill>
+          </a:ln>
+        </p:spPr>
+        <p:txBody>
+          <a:bodyPr wrap="square" rtlCol="0">
+            <a:spAutoFit/>
+          </a:bodyPr>
+          <a:lstStyle/>
+          <a:p>
+            <a:r>
+              <a:rPr lang="fr-FR" dirty="0" smtClean="0"/>
+              <a:t>/close</a:t>
+            </a:r>
+            <a:endParaRPr lang="fr-FR" dirty="0"/>
+          </a:p>
+        </p:txBody>
+      </p:sp>
+      <p:cxnSp>
+        <p:nvCxnSpPr>
+          <p:cNvPr id="30" name="Connecteur en arc 29"/>
+          <p:cNvCxnSpPr>
+            <a:stCxn id="21" idx="1"/>
+            <a:endCxn id="50" idx="0"/>
+          </p:cNvCxnSpPr>
+          <p:nvPr/>
+        </p:nvCxnSpPr>
+        <p:spPr>
+          <a:xfrm rot="5400000">
+            <a:off x="6976513" y="1229275"/>
+            <a:ext cx="324950" cy="1771651"/>
+          </a:xfrm>
+          <a:prstGeom prst="curvedConnector3">
+            <a:avLst>
+              <a:gd name="adj1" fmla="val 50000"/>
+            </a:avLst>
+          </a:prstGeom>
+          <a:ln>
+            <a:tailEnd type="triangle"/>
+          </a:ln>
+        </p:spPr>
+        <p:style>
+          <a:lnRef idx="1">
+            <a:schemeClr val="accent1"/>
+          </a:lnRef>
+          <a:fillRef idx="0">
+            <a:schemeClr val="accent1"/>
+          </a:fillRef>
+          <a:effectRef idx="0">
+            <a:schemeClr val="accent1"/>
+          </a:effectRef>
+          <a:fontRef idx="minor">
+            <a:schemeClr val="tx1"/>
+          </a:fontRef>
+        </p:style>
+      </p:cxnSp>
+      <p:cxnSp>
+        <p:nvCxnSpPr>
+          <p:cNvPr id="33" name="Connecteur en arc 32"/>
+          <p:cNvCxnSpPr>
+            <a:stCxn id="21" idx="1"/>
+            <a:endCxn id="41" idx="0"/>
+          </p:cNvCxnSpPr>
+          <p:nvPr/>
+        </p:nvCxnSpPr>
+        <p:spPr>
+          <a:xfrm rot="16200000" flipH="1">
+            <a:off x="8063092" y="1914346"/>
+            <a:ext cx="309205" cy="385762"/>
+          </a:xfrm>
+          <a:prstGeom prst="curvedConnector3">
+            <a:avLst>
+              <a:gd name="adj1" fmla="val 50000"/>
+            </a:avLst>
+          </a:prstGeom>
+          <a:ln>
+            <a:tailEnd type="triangle"/>
+          </a:ln>
+        </p:spPr>
+        <p:style>
+          <a:lnRef idx="1">
+            <a:schemeClr val="accent1"/>
+          </a:lnRef>
+          <a:fillRef idx="0">
+            <a:schemeClr val="accent1"/>
+          </a:fillRef>
+          <a:effectRef idx="0">
+            <a:schemeClr val="accent1"/>
+          </a:effectRef>
+          <a:fontRef idx="minor">
+            <a:schemeClr val="tx1"/>
+          </a:fontRef>
+        </p:style>
+      </p:cxnSp>
+      <p:sp>
+        <p:nvSpPr>
+          <p:cNvPr id="41" name="Rectangle 3"/>
+          <p:cNvSpPr>
+            <a:spLocks noChangeArrowheads="1"/>
+          </p:cNvSpPr>
+          <p:nvPr/>
+        </p:nvSpPr>
+        <p:spPr bwMode="auto">
+          <a:xfrm>
+            <a:off x="7115175" y="2261830"/>
+            <a:ext cx="2590800" cy="246221"/>
+          </a:xfrm>
+          <a:prstGeom prst="rect">
+            <a:avLst/>
+          </a:prstGeom>
+          <a:solidFill>
+            <a:srgbClr val="FF0000"/>
+          </a:solidFill>
+          <a:ln/>
+        </p:spPr>
+        <p:style>
+          <a:lnRef idx="2">
+            <a:schemeClr val="dk1"/>
+          </a:lnRef>
+          <a:fillRef idx="1">
+            <a:schemeClr val="lt1"/>
+          </a:fillRef>
+          <a:effectRef idx="0">
+            <a:schemeClr val="dk1"/>
+          </a:effectRef>
+          <a:fontRef idx="minor">
+            <a:schemeClr val="dk1"/>
+          </a:fontRef>
+        </p:style>
+        <p:txBody>
+          <a:bodyPr vert="horz" wrap="square" lIns="91440" tIns="45720" rIns="91440" bIns="45720" numCol="1" anchor="ctr" anchorCtr="0" compatLnSpc="1">
+            <a:prstTxWarp prst="textNoShape">
+              <a:avLst/>
+            </a:prstTxWarp>
+            <a:spAutoFit/>
+          </a:bodyPr>
+          <a:lstStyle/>
+          <a:p>
+            <a:pPr marL="0" marR="0" lvl="0" indent="0" algn="l" defTabSz="914400" rtl="0" eaLnBrk="0" fontAlgn="base" latinLnBrk="0" hangingPunct="0">
+              <a:lnSpc>
+                <a:spcPct val="100000"/>
+              </a:lnSpc>
+              <a:spcBef>
+                <a:spcPct val="0"/>
+              </a:spcBef>
+              <a:spcAft>
+                <a:spcPct val="0"/>
+              </a:spcAft>
+              <a:buClrTx/>
+              <a:buSzTx/>
+              <a:buFontTx/>
+              <a:buNone/>
+              <a:tabLst/>
+            </a:pPr>
+            <a:r>
+              <a:rPr kumimoji="0" lang="fr-FR" altLang="fr-FR" sz="1000" b="0" i="0" u="none" strike="noStrike" cap="none" normalizeH="0" baseline="0" dirty="0" err="1" smtClean="0">
+                <a:ln>
+                  <a:noFill/>
+                </a:ln>
+                <a:solidFill>
+                  <a:schemeClr val="tx1"/>
+                </a:solidFill>
+                <a:effectLst/>
+                <a:latin typeface="Courier New" panose="02070309020205020404" pitchFamily="49" charset="0"/>
+                <a:cs typeface="Courier New" panose="02070309020205020404" pitchFamily="49" charset="0"/>
+              </a:rPr>
+              <a:t>Wait</a:t>
+            </a:r>
+            <a:r>
+              <a:rPr kumimoji="0" lang="fr-FR" altLang="fr-FR" sz="1000" b="0" i="0" u="none" strike="noStrike" cap="none" normalizeH="0" baseline="0" dirty="0" smtClean="0">
+                <a:ln>
+                  <a:noFill/>
+                </a:ln>
+                <a:solidFill>
+                  <a:schemeClr val="tx1"/>
+                </a:solidFill>
+                <a:effectLst/>
+                <a:latin typeface="Courier New" panose="02070309020205020404" pitchFamily="49" charset="0"/>
+                <a:cs typeface="Courier New" panose="02070309020205020404" pitchFamily="49" charset="0"/>
+              </a:rPr>
+              <a:t> </a:t>
+            </a:r>
+            <a:r>
+              <a:rPr kumimoji="0" lang="fr-FR" altLang="fr-FR" sz="1000" b="0" i="0" u="none" strike="noStrike" cap="none" normalizeH="0" baseline="0" dirty="0" err="1" smtClean="0">
+                <a:ln>
+                  <a:noFill/>
+                </a:ln>
+                <a:solidFill>
+                  <a:schemeClr val="tx1"/>
+                </a:solidFill>
+                <a:effectLst/>
+                <a:latin typeface="Courier New" panose="02070309020205020404" pitchFamily="49" charset="0"/>
+                <a:cs typeface="Courier New" panose="02070309020205020404" pitchFamily="49" charset="0"/>
+              </a:rPr>
+              <a:t>until</a:t>
+            </a:r>
+            <a:r>
+              <a:rPr kumimoji="0" lang="fr-FR" altLang="fr-FR" sz="1000" b="0" i="0" u="none" strike="noStrike" cap="none" normalizeH="0" baseline="0" dirty="0" smtClean="0">
+                <a:ln>
+                  <a:noFill/>
+                </a:ln>
+                <a:solidFill>
+                  <a:schemeClr val="tx1"/>
+                </a:solidFill>
+                <a:effectLst/>
+                <a:latin typeface="Courier New" panose="02070309020205020404" pitchFamily="49" charset="0"/>
+                <a:cs typeface="Courier New" panose="02070309020205020404" pitchFamily="49" charset="0"/>
+              </a:rPr>
+              <a:t> session </a:t>
+            </a:r>
+            <a:r>
+              <a:rPr kumimoji="0" lang="fr-FR" altLang="fr-FR" sz="1000" b="0" i="0" u="none" strike="noStrike" cap="none" normalizeH="0" baseline="0" dirty="0" err="1" smtClean="0">
+                <a:ln>
+                  <a:noFill/>
+                </a:ln>
+                <a:solidFill>
+                  <a:schemeClr val="tx1"/>
+                </a:solidFill>
+                <a:effectLst/>
+                <a:latin typeface="Courier New" panose="02070309020205020404" pitchFamily="49" charset="0"/>
+                <a:cs typeface="Courier New" panose="02070309020205020404" pitchFamily="49" charset="0"/>
+              </a:rPr>
+              <a:t>becomes</a:t>
+            </a:r>
+            <a:r>
+              <a:rPr kumimoji="0" lang="fr-FR" altLang="fr-FR" sz="1000" b="0" i="0" u="none" strike="noStrike" cap="none" normalizeH="0" baseline="0" dirty="0" smtClean="0">
+                <a:ln>
+                  <a:noFill/>
+                </a:ln>
+                <a:solidFill>
+                  <a:schemeClr val="tx1"/>
+                </a:solidFill>
+                <a:effectLst/>
+                <a:latin typeface="Courier New" panose="02070309020205020404" pitchFamily="49" charset="0"/>
+                <a:cs typeface="Courier New" panose="02070309020205020404" pitchFamily="49" charset="0"/>
+              </a:rPr>
+              <a:t> IDLE</a:t>
+            </a:r>
+            <a:endParaRPr kumimoji="0" lang="fr-FR" altLang="fr-FR" sz="1800" b="0" i="0" u="none" strike="noStrike" cap="none" normalizeH="0" baseline="0" dirty="0" smtClean="0">
+              <a:ln>
+                <a:noFill/>
+              </a:ln>
+              <a:solidFill>
+                <a:schemeClr val="tx1"/>
+              </a:solidFill>
+              <a:effectLst/>
+              <a:latin typeface="Arial" panose="020B0604020202020204" pitchFamily="34" charset="0"/>
+            </a:endParaRPr>
+          </a:p>
+        </p:txBody>
+      </p:sp>
+      <p:cxnSp>
+        <p:nvCxnSpPr>
+          <p:cNvPr id="46" name="Connecteur en arc 45"/>
+          <p:cNvCxnSpPr>
+            <a:stCxn id="41" idx="2"/>
+            <a:endCxn id="28" idx="0"/>
+          </p:cNvCxnSpPr>
+          <p:nvPr/>
+        </p:nvCxnSpPr>
+        <p:spPr>
+          <a:xfrm rot="5400000">
+            <a:off x="7742933" y="2132707"/>
+            <a:ext cx="292299" cy="1042987"/>
+          </a:xfrm>
+          <a:prstGeom prst="curvedConnector3">
+            <a:avLst>
+              <a:gd name="adj1" fmla="val 50000"/>
+            </a:avLst>
+          </a:prstGeom>
+          <a:ln>
+            <a:tailEnd type="triangle"/>
+          </a:ln>
+        </p:spPr>
+        <p:style>
+          <a:lnRef idx="1">
+            <a:schemeClr val="accent1"/>
+          </a:lnRef>
+          <a:fillRef idx="0">
+            <a:schemeClr val="accent1"/>
+          </a:fillRef>
+          <a:effectRef idx="0">
+            <a:schemeClr val="accent1"/>
+          </a:effectRef>
+          <a:fontRef idx="minor">
+            <a:schemeClr val="tx1"/>
+          </a:fontRef>
+        </p:style>
+      </p:cxnSp>
+      <p:sp>
+        <p:nvSpPr>
+          <p:cNvPr id="50" name="Rectangle 3"/>
+          <p:cNvSpPr>
+            <a:spLocks noChangeArrowheads="1"/>
+          </p:cNvSpPr>
+          <p:nvPr/>
+        </p:nvSpPr>
+        <p:spPr bwMode="auto">
+          <a:xfrm>
+            <a:off x="5662612" y="2277575"/>
+            <a:ext cx="1181099" cy="246221"/>
+          </a:xfrm>
+          <a:prstGeom prst="rect">
+            <a:avLst/>
+          </a:prstGeom>
+          <a:solidFill>
+            <a:srgbClr val="FF0000"/>
+          </a:solidFill>
+          <a:ln/>
+        </p:spPr>
+        <p:style>
+          <a:lnRef idx="2">
+            <a:schemeClr val="dk1"/>
+          </a:lnRef>
+          <a:fillRef idx="1">
+            <a:schemeClr val="lt1"/>
+          </a:fillRef>
+          <a:effectRef idx="0">
+            <a:schemeClr val="dk1"/>
+          </a:effectRef>
+          <a:fontRef idx="minor">
+            <a:schemeClr val="dk1"/>
+          </a:fontRef>
+        </p:style>
+        <p:txBody>
+          <a:bodyPr vert="horz" wrap="square" lIns="91440" tIns="45720" rIns="91440" bIns="45720" numCol="1" anchor="ctr" anchorCtr="0" compatLnSpc="1">
+            <a:prstTxWarp prst="textNoShape">
+              <a:avLst/>
+            </a:prstTxWarp>
+            <a:spAutoFit/>
+          </a:bodyPr>
+          <a:lstStyle/>
+          <a:p>
+            <a:pPr marL="0" marR="0" lvl="0" indent="0" algn="l" defTabSz="914400" rtl="0" eaLnBrk="0" fontAlgn="base" latinLnBrk="0" hangingPunct="0">
+              <a:lnSpc>
+                <a:spcPct val="100000"/>
+              </a:lnSpc>
+              <a:spcBef>
+                <a:spcPct val="0"/>
+              </a:spcBef>
+              <a:spcAft>
+                <a:spcPct val="0"/>
+              </a:spcAft>
+              <a:buClrTx/>
+              <a:buSzTx/>
+              <a:buFontTx/>
+              <a:buNone/>
+              <a:tabLst/>
+            </a:pPr>
+            <a:r>
+              <a:rPr lang="fr-FR" altLang="fr-FR" sz="1000" dirty="0">
+                <a:solidFill>
+                  <a:schemeClr val="tx1"/>
+                </a:solidFill>
+                <a:latin typeface="Courier New" panose="02070309020205020404" pitchFamily="49" charset="0"/>
+                <a:cs typeface="Courier New" panose="02070309020205020404" pitchFamily="49" charset="0"/>
+              </a:rPr>
+              <a:t>c</a:t>
+            </a:r>
+            <a:r>
+              <a:rPr kumimoji="0" lang="fr-FR" altLang="fr-FR" sz="1000" b="0" i="0" u="none" strike="noStrike" cap="none" normalizeH="0" baseline="0" dirty="0" smtClean="0">
+                <a:ln>
+                  <a:noFill/>
+                </a:ln>
+                <a:solidFill>
+                  <a:schemeClr val="tx1"/>
+                </a:solidFill>
+                <a:effectLst/>
+                <a:latin typeface="Courier New" panose="02070309020205020404" pitchFamily="49" charset="0"/>
+                <a:cs typeface="Courier New" panose="02070309020205020404" pitchFamily="49" charset="0"/>
+              </a:rPr>
+              <a:t>lose session</a:t>
+            </a:r>
+          </a:p>
+        </p:txBody>
+      </p:sp>
+      <p:cxnSp>
+        <p:nvCxnSpPr>
+          <p:cNvPr id="51" name="Connecteur en arc 50"/>
+          <p:cNvCxnSpPr>
+            <a:stCxn id="50" idx="1"/>
+            <a:endCxn id="29" idx="3"/>
+          </p:cNvCxnSpPr>
+          <p:nvPr/>
+        </p:nvCxnSpPr>
+        <p:spPr>
+          <a:xfrm rot="10800000">
+            <a:off x="4900612" y="2365892"/>
+            <a:ext cx="762000" cy="34795"/>
+          </a:xfrm>
+          <a:prstGeom prst="curvedConnector3">
+            <a:avLst>
+              <a:gd name="adj1" fmla="val 50000"/>
+            </a:avLst>
+          </a:prstGeom>
+          <a:ln>
+            <a:tailEnd type="triangle"/>
+          </a:ln>
+        </p:spPr>
+        <p:style>
+          <a:lnRef idx="1">
+            <a:schemeClr val="accent1"/>
+          </a:lnRef>
+          <a:fillRef idx="0">
+            <a:schemeClr val="accent1"/>
+          </a:fillRef>
+          <a:effectRef idx="0">
+            <a:schemeClr val="accent1"/>
+          </a:effectRef>
+          <a:fontRef idx="minor">
+            <a:schemeClr val="tx1"/>
+          </a:fontRef>
+        </p:style>
+      </p:cxnSp>
+      <p:cxnSp>
+        <p:nvCxnSpPr>
+          <p:cNvPr id="54" name="Connecteur en arc 53"/>
+          <p:cNvCxnSpPr>
+            <a:stCxn id="20" idx="3"/>
+            <a:endCxn id="57" idx="1"/>
+          </p:cNvCxnSpPr>
+          <p:nvPr/>
+        </p:nvCxnSpPr>
+        <p:spPr>
+          <a:xfrm>
+            <a:off x="8705849" y="1123950"/>
+            <a:ext cx="1445419" cy="46906"/>
+          </a:xfrm>
+          <a:prstGeom prst="curvedConnector3">
+            <a:avLst>
+              <a:gd name="adj1" fmla="val 50000"/>
+            </a:avLst>
+          </a:prstGeom>
+          <a:ln>
+            <a:tailEnd type="triangle"/>
+          </a:ln>
+        </p:spPr>
+        <p:style>
+          <a:lnRef idx="1">
+            <a:schemeClr val="accent1"/>
+          </a:lnRef>
+          <a:fillRef idx="0">
+            <a:schemeClr val="accent1"/>
+          </a:fillRef>
+          <a:effectRef idx="0">
+            <a:schemeClr val="accent1"/>
+          </a:effectRef>
+          <a:fontRef idx="minor">
+            <a:schemeClr val="tx1"/>
+          </a:fontRef>
+        </p:style>
+      </p:cxnSp>
+      <p:sp>
+        <p:nvSpPr>
+          <p:cNvPr id="57" name="Rectangle 3"/>
+          <p:cNvSpPr>
+            <a:spLocks noChangeArrowheads="1"/>
+          </p:cNvSpPr>
+          <p:nvPr/>
+        </p:nvSpPr>
+        <p:spPr bwMode="auto">
+          <a:xfrm>
+            <a:off x="10151268" y="1047745"/>
+            <a:ext cx="900113" cy="246221"/>
+          </a:xfrm>
+          <a:prstGeom prst="rect">
+            <a:avLst/>
+          </a:prstGeom>
+          <a:solidFill>
+            <a:srgbClr val="92D050"/>
+          </a:solidFill>
+          <a:ln/>
+        </p:spPr>
+        <p:style>
+          <a:lnRef idx="2">
+            <a:schemeClr val="dk1"/>
+          </a:lnRef>
+          <a:fillRef idx="1">
+            <a:schemeClr val="lt1"/>
+          </a:fillRef>
+          <a:effectRef idx="0">
+            <a:schemeClr val="dk1"/>
+          </a:effectRef>
+          <a:fontRef idx="minor">
+            <a:schemeClr val="dk1"/>
+          </a:fontRef>
+        </p:style>
+        <p:txBody>
+          <a:bodyPr vert="horz" wrap="square" lIns="91440" tIns="45720" rIns="91440" bIns="45720" numCol="1" anchor="ctr" anchorCtr="0" compatLnSpc="1">
+            <a:prstTxWarp prst="textNoShape">
+              <a:avLst/>
+            </a:prstTxWarp>
+            <a:spAutoFit/>
+          </a:bodyPr>
+          <a:lstStyle/>
+          <a:p>
+            <a:pPr marL="0" marR="0" lvl="0" indent="0" algn="l" defTabSz="914400" rtl="0" eaLnBrk="0" fontAlgn="base" latinLnBrk="0" hangingPunct="0">
+              <a:lnSpc>
+                <a:spcPct val="100000"/>
+              </a:lnSpc>
+              <a:spcBef>
+                <a:spcPct val="0"/>
+              </a:spcBef>
+              <a:spcAft>
+                <a:spcPct val="0"/>
+              </a:spcAft>
+              <a:buClrTx/>
+              <a:buSzTx/>
+              <a:buFontTx/>
+              <a:buNone/>
+              <a:tabLst/>
+            </a:pPr>
+            <a:r>
+              <a:rPr kumimoji="0" lang="fr-FR" altLang="fr-FR" sz="1000" b="0" i="0" u="none" strike="noStrike" cap="none" normalizeH="0" baseline="0" dirty="0" err="1" smtClean="0">
+                <a:ln>
+                  <a:noFill/>
+                </a:ln>
+                <a:solidFill>
+                  <a:schemeClr val="tx1"/>
+                </a:solidFill>
+                <a:effectLst/>
+                <a:latin typeface="Courier New" panose="02070309020205020404" pitchFamily="49" charset="0"/>
+                <a:cs typeface="Courier New" panose="02070309020205020404" pitchFamily="49" charset="0"/>
+              </a:rPr>
+              <a:t>IdleEvent</a:t>
+            </a:r>
+            <a:endParaRPr kumimoji="0" lang="fr-FR" altLang="fr-FR" sz="1000" b="0" i="0" u="none" strike="noStrike" cap="none" normalizeH="0" baseline="0" dirty="0" smtClean="0">
+              <a:ln>
+                <a:noFill/>
+              </a:ln>
+              <a:solidFill>
+                <a:schemeClr val="tx1"/>
+              </a:solidFill>
+              <a:effectLst/>
+              <a:latin typeface="Courier New" panose="02070309020205020404" pitchFamily="49" charset="0"/>
+              <a:cs typeface="Courier New" panose="02070309020205020404" pitchFamily="49" charset="0"/>
+            </a:endParaRPr>
+          </a:p>
+        </p:txBody>
+      </p:sp>
+      <p:sp>
+        <p:nvSpPr>
+          <p:cNvPr id="58" name="ZoneTexte 57"/>
+          <p:cNvSpPr txBox="1"/>
+          <p:nvPr/>
+        </p:nvSpPr>
+        <p:spPr>
+          <a:xfrm>
+            <a:off x="10391774" y="2114550"/>
+            <a:ext cx="659607" cy="369332"/>
+          </a:xfrm>
+          <a:prstGeom prst="rect">
+            <a:avLst/>
+          </a:prstGeom>
+          <a:noFill/>
+          <a:ln>
+            <a:solidFill>
+              <a:srgbClr val="FF0000"/>
+            </a:solidFill>
+          </a:ln>
+        </p:spPr>
+        <p:txBody>
+          <a:bodyPr wrap="square" rtlCol="0">
+            <a:spAutoFit/>
+          </a:bodyPr>
+          <a:lstStyle/>
+          <a:p>
+            <a:r>
+              <a:rPr lang="fr-FR" dirty="0" smtClean="0"/>
+              <a:t>/</a:t>
+            </a:r>
+            <a:r>
+              <a:rPr lang="fr-FR" dirty="0" err="1" smtClean="0"/>
+              <a:t>Idle</a:t>
+            </a:r>
+            <a:endParaRPr lang="fr-FR" dirty="0"/>
+          </a:p>
+        </p:txBody>
+      </p:sp>
+      <p:cxnSp>
+        <p:nvCxnSpPr>
+          <p:cNvPr id="60" name="Connecteur en arc 59"/>
+          <p:cNvCxnSpPr>
+            <a:stCxn id="57" idx="2"/>
+            <a:endCxn id="58" idx="0"/>
+          </p:cNvCxnSpPr>
+          <p:nvPr/>
+        </p:nvCxnSpPr>
+        <p:spPr>
+          <a:xfrm rot="16200000" flipH="1">
+            <a:off x="10251159" y="1644131"/>
+            <a:ext cx="820584" cy="120253"/>
+          </a:xfrm>
+          <a:prstGeom prst="curvedConnector3">
+            <a:avLst>
+              <a:gd name="adj1" fmla="val 50000"/>
+            </a:avLst>
+          </a:prstGeom>
+          <a:ln>
+            <a:tailEnd type="triangle"/>
+          </a:ln>
+        </p:spPr>
+        <p:style>
+          <a:lnRef idx="1">
+            <a:schemeClr val="accent1"/>
+          </a:lnRef>
+          <a:fillRef idx="0">
+            <a:schemeClr val="accent1"/>
+          </a:fillRef>
+          <a:effectRef idx="0">
+            <a:schemeClr val="accent1"/>
+          </a:effectRef>
+          <a:fontRef idx="minor">
+            <a:schemeClr val="tx1"/>
+          </a:fontRef>
+        </p:style>
+      </p:cxnSp>
+      <p:cxnSp>
+        <p:nvCxnSpPr>
+          <p:cNvPr id="67" name="Connecteur en arc 66"/>
+          <p:cNvCxnSpPr>
+            <a:stCxn id="28" idx="3"/>
+            <a:endCxn id="72" idx="1"/>
+          </p:cNvCxnSpPr>
+          <p:nvPr/>
+        </p:nvCxnSpPr>
+        <p:spPr>
+          <a:xfrm>
+            <a:off x="7715251" y="2985016"/>
+            <a:ext cx="304800" cy="2260"/>
+          </a:xfrm>
+          <a:prstGeom prst="curvedConnector3">
+            <a:avLst>
+              <a:gd name="adj1" fmla="val 50000"/>
+            </a:avLst>
+          </a:prstGeom>
+          <a:ln>
+            <a:tailEnd type="triangle"/>
+          </a:ln>
+        </p:spPr>
+        <p:style>
+          <a:lnRef idx="1">
+            <a:schemeClr val="accent1"/>
+          </a:lnRef>
+          <a:fillRef idx="0">
+            <a:schemeClr val="accent1"/>
+          </a:fillRef>
+          <a:effectRef idx="0">
+            <a:schemeClr val="accent1"/>
+          </a:effectRef>
+          <a:fontRef idx="minor">
+            <a:schemeClr val="tx1"/>
+          </a:fontRef>
+        </p:style>
+      </p:cxnSp>
+      <p:sp>
+        <p:nvSpPr>
+          <p:cNvPr id="72" name="Rectangle 2"/>
+          <p:cNvSpPr>
+            <a:spLocks noChangeArrowheads="1"/>
+          </p:cNvSpPr>
+          <p:nvPr/>
+        </p:nvSpPr>
+        <p:spPr bwMode="auto">
+          <a:xfrm>
+            <a:off x="8020051" y="2864165"/>
+            <a:ext cx="1895474" cy="246221"/>
+          </a:xfrm>
+          <a:prstGeom prst="rect">
+            <a:avLst/>
+          </a:prstGeom>
+          <a:solidFill>
+            <a:schemeClr val="bg1">
+              <a:lumMod val="85000"/>
+            </a:schemeClr>
+          </a:solidFill>
+          <a:ln w="9525">
+            <a:solidFill>
+              <a:schemeClr val="tx1"/>
+            </a:solidFill>
+            <a:miter lim="800000"/>
+            <a:headEnd/>
+            <a:tailEnd/>
+          </a:ln>
+          <a:effectLst/>
+        </p:spPr>
+        <p:txBody>
+          <a:bodyPr vert="horz" wrap="square" lIns="91440" tIns="45720" rIns="91440" bIns="45720" numCol="1" anchor="ctr" anchorCtr="0" compatLnSpc="1">
+            <a:prstTxWarp prst="textNoShape">
+              <a:avLst/>
+            </a:prstTxWarp>
+            <a:spAutoFit/>
+          </a:bodyPr>
+          <a:lstStyle/>
+          <a:p>
+            <a:pPr marL="0" marR="0" lvl="0" indent="0" algn="ctr" defTabSz="914400" rtl="0" eaLnBrk="0" fontAlgn="base" latinLnBrk="0" hangingPunct="0">
+              <a:lnSpc>
+                <a:spcPct val="100000"/>
+              </a:lnSpc>
+              <a:spcBef>
+                <a:spcPct val="0"/>
+              </a:spcBef>
+              <a:spcAft>
+                <a:spcPct val="0"/>
+              </a:spcAft>
+              <a:buClrTx/>
+              <a:buSzTx/>
+              <a:buFontTx/>
+              <a:buNone/>
+              <a:tabLst/>
+            </a:pPr>
+            <a:r>
+              <a:rPr lang="fr-FR" altLang="fr-FR" sz="1000" dirty="0" err="1">
+                <a:solidFill>
+                  <a:srgbClr val="000000"/>
+                </a:solidFill>
+                <a:latin typeface="Courier New" panose="02070309020205020404" pitchFamily="49" charset="0"/>
+                <a:cs typeface="Courier New" panose="02070309020205020404" pitchFamily="49" charset="0"/>
+              </a:rPr>
+              <a:t>w</a:t>
+            </a:r>
+            <a:r>
+              <a:rPr kumimoji="0" lang="fr-FR" altLang="fr-FR" sz="1000" b="0" i="0" u="none" strike="noStrike" cap="none" normalizeH="0" baseline="0" dirty="0" err="1" smtClean="0">
+                <a:ln>
+                  <a:noFill/>
+                </a:ln>
+                <a:solidFill>
+                  <a:srgbClr val="000000"/>
+                </a:solidFill>
+                <a:effectLst/>
+                <a:latin typeface="Courier New" panose="02070309020205020404" pitchFamily="49" charset="0"/>
+                <a:cs typeface="Courier New" panose="02070309020205020404" pitchFamily="49" charset="0"/>
+              </a:rPr>
+              <a:t>ait_session</a:t>
+            </a:r>
+            <a:r>
+              <a:rPr kumimoji="0" lang="fr-FR" altLang="fr-FR" sz="1000" b="0" i="0" u="none" strike="noStrike" cap="none" normalizeH="0" baseline="0" dirty="0" smtClean="0">
+                <a:ln>
+                  <a:noFill/>
+                </a:ln>
+                <a:solidFill>
+                  <a:srgbClr val="000000"/>
+                </a:solidFill>
+                <a:effectLst/>
+                <a:latin typeface="Courier New" panose="02070309020205020404" pitchFamily="49" charset="0"/>
+                <a:cs typeface="Courier New" panose="02070309020205020404" pitchFamily="49" charset="0"/>
+              </a:rPr>
+              <a:t>()</a:t>
+            </a:r>
+            <a:endParaRPr kumimoji="0" lang="fr-FR" altLang="fr-FR" sz="1800" b="0" i="0" u="none" strike="noStrike" cap="none" normalizeH="0" baseline="0" dirty="0" smtClean="0">
+              <a:ln>
+                <a:noFill/>
+              </a:ln>
+              <a:solidFill>
+                <a:schemeClr val="tx1"/>
+              </a:solidFill>
+              <a:effectLst/>
+              <a:latin typeface="Arial" panose="020B0604020202020204" pitchFamily="34" charset="0"/>
+            </a:endParaRPr>
+          </a:p>
+        </p:txBody>
+      </p:sp>
+      <p:cxnSp>
+        <p:nvCxnSpPr>
+          <p:cNvPr id="74" name="Connecteur en arc 73"/>
+          <p:cNvCxnSpPr>
+            <a:stCxn id="72" idx="2"/>
+            <a:endCxn id="77" idx="3"/>
+          </p:cNvCxnSpPr>
+          <p:nvPr/>
+        </p:nvCxnSpPr>
+        <p:spPr>
+          <a:xfrm rot="5400000">
+            <a:off x="8731361" y="3323001"/>
+            <a:ext cx="449042" cy="23812"/>
+          </a:xfrm>
+          <a:prstGeom prst="curvedConnector3">
+            <a:avLst>
+              <a:gd name="adj1" fmla="val 50000"/>
+            </a:avLst>
+          </a:prstGeom>
+          <a:ln>
+            <a:tailEnd type="triangle"/>
+          </a:ln>
+        </p:spPr>
+        <p:style>
+          <a:lnRef idx="1">
+            <a:schemeClr val="accent1"/>
+          </a:lnRef>
+          <a:fillRef idx="0">
+            <a:schemeClr val="accent1"/>
+          </a:fillRef>
+          <a:effectRef idx="0">
+            <a:schemeClr val="accent1"/>
+          </a:effectRef>
+          <a:fontRef idx="minor">
+            <a:schemeClr val="tx1"/>
+          </a:fontRef>
+        </p:style>
+      </p:cxnSp>
+      <p:sp>
+        <p:nvSpPr>
+          <p:cNvPr id="77" name="Rectangle avec coins arrondis en diagonale 76"/>
+          <p:cNvSpPr/>
+          <p:nvPr/>
+        </p:nvSpPr>
+        <p:spPr>
+          <a:xfrm>
+            <a:off x="8367713" y="3559428"/>
+            <a:ext cx="1152525" cy="241817"/>
+          </a:xfrm>
+          <a:prstGeom prst="round2DiagRect">
+            <a:avLst/>
+          </a:prstGeom>
+        </p:spPr>
+        <p:style>
+          <a:lnRef idx="2">
+            <a:schemeClr val="accent1">
+              <a:shade val="50000"/>
+            </a:schemeClr>
+          </a:lnRef>
+          <a:fillRef idx="1">
+            <a:schemeClr val="accent1"/>
+          </a:fillRef>
+          <a:effectRef idx="0">
+            <a:schemeClr val="accent1"/>
+          </a:effectRef>
+          <a:fontRef idx="minor">
+            <a:schemeClr val="lt1"/>
+          </a:fontRef>
+        </p:style>
+        <p:txBody>
+          <a:bodyPr rtlCol="0" anchor="ctr"/>
+          <a:lstStyle/>
+          <a:p>
+            <a:pPr algn="ctr"/>
+            <a:r>
+              <a:rPr lang="fr-FR" sz="1400" dirty="0" smtClean="0"/>
+              <a:t>session.html</a:t>
+            </a:r>
+            <a:endParaRPr lang="fr-FR" sz="1400" dirty="0"/>
+          </a:p>
+        </p:txBody>
+      </p:sp>
+      <p:cxnSp>
+        <p:nvCxnSpPr>
+          <p:cNvPr id="83" name="Connecteur en arc 82"/>
+          <p:cNvCxnSpPr>
+            <a:stCxn id="58" idx="2"/>
+            <a:endCxn id="162" idx="0"/>
+          </p:cNvCxnSpPr>
+          <p:nvPr/>
+        </p:nvCxnSpPr>
+        <p:spPr>
+          <a:xfrm rot="16200000" flipH="1">
+            <a:off x="10284694" y="2920765"/>
+            <a:ext cx="877340" cy="3573"/>
+          </a:xfrm>
+          <a:prstGeom prst="curvedConnector3">
+            <a:avLst>
+              <a:gd name="adj1" fmla="val 50000"/>
+            </a:avLst>
+          </a:prstGeom>
+          <a:ln>
+            <a:tailEnd type="triangle"/>
+          </a:ln>
+        </p:spPr>
+        <p:style>
+          <a:lnRef idx="1">
+            <a:schemeClr val="accent1"/>
+          </a:lnRef>
+          <a:fillRef idx="0">
+            <a:schemeClr val="accent1"/>
+          </a:fillRef>
+          <a:effectRef idx="0">
+            <a:schemeClr val="accent1"/>
+          </a:effectRef>
+          <a:fontRef idx="minor">
+            <a:schemeClr val="tx1"/>
+          </a:fontRef>
+        </p:style>
+      </p:cxnSp>
+      <p:sp>
+        <p:nvSpPr>
+          <p:cNvPr id="87" name="Rectangle 3"/>
+          <p:cNvSpPr>
+            <a:spLocks noChangeArrowheads="1"/>
+          </p:cNvSpPr>
+          <p:nvPr/>
+        </p:nvSpPr>
+        <p:spPr bwMode="auto">
+          <a:xfrm>
+            <a:off x="7353300" y="4319230"/>
+            <a:ext cx="1981200" cy="246221"/>
+          </a:xfrm>
+          <a:prstGeom prst="rect">
+            <a:avLst/>
+          </a:prstGeom>
+          <a:solidFill>
+            <a:srgbClr val="FF0000"/>
+          </a:solidFill>
+          <a:ln/>
+        </p:spPr>
+        <p:style>
+          <a:lnRef idx="2">
+            <a:schemeClr val="dk1"/>
+          </a:lnRef>
+          <a:fillRef idx="1">
+            <a:schemeClr val="lt1"/>
+          </a:fillRef>
+          <a:effectRef idx="0">
+            <a:schemeClr val="dk1"/>
+          </a:effectRef>
+          <a:fontRef idx="minor">
+            <a:schemeClr val="dk1"/>
+          </a:fontRef>
+        </p:style>
+        <p:txBody>
+          <a:bodyPr vert="horz" wrap="square" lIns="91440" tIns="45720" rIns="91440" bIns="45720" numCol="1" anchor="ctr" anchorCtr="0" compatLnSpc="1">
+            <a:prstTxWarp prst="textNoShape">
+              <a:avLst/>
+            </a:prstTxWarp>
+            <a:spAutoFit/>
+          </a:bodyPr>
+          <a:lstStyle/>
+          <a:p>
+            <a:pPr marL="0" marR="0" lvl="0" indent="0" algn="l" defTabSz="914400" rtl="0" eaLnBrk="0" fontAlgn="base" latinLnBrk="0" hangingPunct="0">
+              <a:lnSpc>
+                <a:spcPct val="100000"/>
+              </a:lnSpc>
+              <a:spcBef>
+                <a:spcPct val="0"/>
+              </a:spcBef>
+              <a:spcAft>
+                <a:spcPct val="0"/>
+              </a:spcAft>
+              <a:buClrTx/>
+              <a:buSzTx/>
+              <a:buFontTx/>
+              <a:buNone/>
+              <a:tabLst/>
+            </a:pPr>
+            <a:r>
+              <a:rPr kumimoji="0" lang="fr-FR" altLang="fr-FR" sz="1000" b="0" i="0" u="none" strike="noStrike" cap="none" normalizeH="0" baseline="0" dirty="0" smtClean="0">
+                <a:ln>
+                  <a:noFill/>
+                </a:ln>
+                <a:solidFill>
+                  <a:schemeClr val="tx1"/>
+                </a:solidFill>
+                <a:effectLst/>
+                <a:latin typeface="Courier New" panose="02070309020205020404" pitchFamily="49" charset="0"/>
+                <a:cs typeface="Courier New" panose="02070309020205020404" pitchFamily="49" charset="0"/>
+              </a:rPr>
+              <a:t>Start a </a:t>
+            </a:r>
+            <a:r>
+              <a:rPr kumimoji="0" lang="fr-FR" altLang="fr-FR" sz="1000" b="0" i="0" u="none" strike="noStrike" cap="none" normalizeH="0" baseline="0" dirty="0" err="1" smtClean="0">
+                <a:ln>
+                  <a:noFill/>
+                </a:ln>
+                <a:solidFill>
+                  <a:schemeClr val="tx1"/>
+                </a:solidFill>
+                <a:effectLst/>
+                <a:latin typeface="Courier New" panose="02070309020205020404" pitchFamily="49" charset="0"/>
+                <a:cs typeface="Courier New" panose="02070309020205020404" pitchFamily="49" charset="0"/>
+              </a:rPr>
+              <a:t>Spark</a:t>
+            </a:r>
+            <a:r>
+              <a:rPr kumimoji="0" lang="fr-FR" altLang="fr-FR" sz="1000" b="0" i="0" u="none" strike="noStrike" cap="none" normalizeH="0" baseline="0" dirty="0" smtClean="0">
+                <a:ln>
+                  <a:noFill/>
+                </a:ln>
+                <a:solidFill>
+                  <a:schemeClr val="tx1"/>
+                </a:solidFill>
+                <a:effectLst/>
+                <a:latin typeface="Courier New" panose="02070309020205020404" pitchFamily="49" charset="0"/>
+                <a:cs typeface="Courier New" panose="02070309020205020404" pitchFamily="49" charset="0"/>
+              </a:rPr>
+              <a:t> </a:t>
+            </a:r>
+            <a:r>
+              <a:rPr kumimoji="0" lang="fr-FR" altLang="fr-FR" sz="1000" b="0" i="0" u="none" strike="noStrike" cap="none" normalizeH="0" baseline="0" dirty="0" err="1" smtClean="0">
+                <a:ln>
+                  <a:noFill/>
+                </a:ln>
+                <a:solidFill>
+                  <a:schemeClr val="tx1"/>
+                </a:solidFill>
+                <a:effectLst/>
+                <a:latin typeface="Courier New" panose="02070309020205020404" pitchFamily="49" charset="0"/>
+                <a:cs typeface="Courier New" panose="02070309020205020404" pitchFamily="49" charset="0"/>
+              </a:rPr>
+              <a:t>statement</a:t>
+            </a:r>
+            <a:endParaRPr kumimoji="0" lang="fr-FR" altLang="fr-FR" sz="1800" b="0" i="0" u="none" strike="noStrike" cap="none" normalizeH="0" baseline="0" dirty="0" smtClean="0">
+              <a:ln>
+                <a:noFill/>
+              </a:ln>
+              <a:solidFill>
+                <a:schemeClr val="tx1"/>
+              </a:solidFill>
+              <a:effectLst/>
+              <a:latin typeface="Arial" panose="020B0604020202020204" pitchFamily="34" charset="0"/>
+            </a:endParaRPr>
+          </a:p>
+        </p:txBody>
+      </p:sp>
+      <p:cxnSp>
+        <p:nvCxnSpPr>
+          <p:cNvPr id="88" name="Connecteur en arc 87"/>
+          <p:cNvCxnSpPr>
+            <a:stCxn id="77" idx="1"/>
+            <a:endCxn id="87" idx="0"/>
+          </p:cNvCxnSpPr>
+          <p:nvPr/>
+        </p:nvCxnSpPr>
+        <p:spPr>
+          <a:xfrm rot="5400000">
+            <a:off x="8384946" y="3760199"/>
+            <a:ext cx="517985" cy="600076"/>
+          </a:xfrm>
+          <a:prstGeom prst="curvedConnector3">
+            <a:avLst>
+              <a:gd name="adj1" fmla="val 50000"/>
+            </a:avLst>
+          </a:prstGeom>
+          <a:ln>
+            <a:tailEnd type="triangle"/>
+          </a:ln>
+        </p:spPr>
+        <p:style>
+          <a:lnRef idx="1">
+            <a:schemeClr val="accent1"/>
+          </a:lnRef>
+          <a:fillRef idx="0">
+            <a:schemeClr val="accent1"/>
+          </a:fillRef>
+          <a:effectRef idx="0">
+            <a:schemeClr val="accent1"/>
+          </a:effectRef>
+          <a:fontRef idx="minor">
+            <a:schemeClr val="tx1"/>
+          </a:fontRef>
+        </p:style>
+      </p:cxnSp>
+      <p:cxnSp>
+        <p:nvCxnSpPr>
+          <p:cNvPr id="93" name="Connecteur en arc 92"/>
+          <p:cNvCxnSpPr>
+            <a:stCxn id="29" idx="1"/>
+            <a:endCxn id="9" idx="2"/>
+          </p:cNvCxnSpPr>
+          <p:nvPr/>
+        </p:nvCxnSpPr>
+        <p:spPr>
+          <a:xfrm rot="10800000" flipH="1">
+            <a:off x="4076698" y="1269743"/>
+            <a:ext cx="952501" cy="1096149"/>
+          </a:xfrm>
+          <a:prstGeom prst="curvedConnector3">
+            <a:avLst>
+              <a:gd name="adj1" fmla="val -24000"/>
+            </a:avLst>
+          </a:prstGeom>
+          <a:ln>
+            <a:tailEnd type="triangle"/>
+          </a:ln>
+        </p:spPr>
+        <p:style>
+          <a:lnRef idx="1">
+            <a:schemeClr val="accent1"/>
+          </a:lnRef>
+          <a:fillRef idx="0">
+            <a:schemeClr val="accent1"/>
+          </a:fillRef>
+          <a:effectRef idx="0">
+            <a:schemeClr val="accent1"/>
+          </a:effectRef>
+          <a:fontRef idx="minor">
+            <a:schemeClr val="tx1"/>
+          </a:fontRef>
+        </p:style>
+      </p:cxnSp>
+      <p:cxnSp>
+        <p:nvCxnSpPr>
+          <p:cNvPr id="97" name="Connecteur en arc 96"/>
+          <p:cNvCxnSpPr>
+            <a:stCxn id="77" idx="2"/>
+            <a:endCxn id="50" idx="2"/>
+          </p:cNvCxnSpPr>
+          <p:nvPr/>
+        </p:nvCxnSpPr>
+        <p:spPr>
+          <a:xfrm rot="10800000">
+            <a:off x="6253163" y="2523797"/>
+            <a:ext cx="2114551" cy="1156541"/>
+          </a:xfrm>
+          <a:prstGeom prst="curvedConnector2">
+            <a:avLst/>
+          </a:prstGeom>
+          <a:ln>
+            <a:tailEnd type="triangle"/>
+          </a:ln>
+        </p:spPr>
+        <p:style>
+          <a:lnRef idx="1">
+            <a:schemeClr val="accent1"/>
+          </a:lnRef>
+          <a:fillRef idx="0">
+            <a:schemeClr val="accent1"/>
+          </a:fillRef>
+          <a:effectRef idx="0">
+            <a:schemeClr val="accent1"/>
+          </a:effectRef>
+          <a:fontRef idx="minor">
+            <a:schemeClr val="tx1"/>
+          </a:fontRef>
+        </p:style>
+      </p:cxnSp>
+      <p:sp>
+        <p:nvSpPr>
+          <p:cNvPr id="102" name="ZoneTexte 101"/>
+          <p:cNvSpPr txBox="1"/>
+          <p:nvPr/>
+        </p:nvSpPr>
+        <p:spPr>
+          <a:xfrm>
+            <a:off x="3679030" y="3823218"/>
+            <a:ext cx="1843089" cy="369332"/>
+          </a:xfrm>
+          <a:prstGeom prst="rect">
+            <a:avLst/>
+          </a:prstGeom>
+          <a:noFill/>
+          <a:ln>
+            <a:solidFill>
+              <a:srgbClr val="FF0000"/>
+            </a:solidFill>
+          </a:ln>
+        </p:spPr>
+        <p:txBody>
+          <a:bodyPr wrap="square" rtlCol="0">
+            <a:spAutoFit/>
+          </a:bodyPr>
+          <a:lstStyle/>
+          <a:p>
+            <a:r>
+              <a:rPr lang="fr-FR" dirty="0" smtClean="0"/>
+              <a:t>/</a:t>
+            </a:r>
+            <a:r>
+              <a:rPr lang="fr-FR" dirty="0" err="1" smtClean="0"/>
+              <a:t>open_statement</a:t>
+            </a:r>
+            <a:endParaRPr lang="fr-FR" dirty="0"/>
+          </a:p>
+        </p:txBody>
+      </p:sp>
+      <p:cxnSp>
+        <p:nvCxnSpPr>
+          <p:cNvPr id="103" name="Connecteur en arc 102"/>
+          <p:cNvCxnSpPr>
+            <a:stCxn id="87" idx="1"/>
+            <a:endCxn id="102" idx="3"/>
+          </p:cNvCxnSpPr>
+          <p:nvPr/>
+        </p:nvCxnSpPr>
+        <p:spPr>
+          <a:xfrm rot="10800000">
+            <a:off x="5522120" y="4007885"/>
+            <a:ext cx="1831181" cy="434457"/>
+          </a:xfrm>
+          <a:prstGeom prst="curvedConnector3">
+            <a:avLst>
+              <a:gd name="adj1" fmla="val 50000"/>
+            </a:avLst>
+          </a:prstGeom>
+          <a:ln>
+            <a:tailEnd type="triangle"/>
+          </a:ln>
+        </p:spPr>
+        <p:style>
+          <a:lnRef idx="1">
+            <a:schemeClr val="accent1"/>
+          </a:lnRef>
+          <a:fillRef idx="0">
+            <a:schemeClr val="accent1"/>
+          </a:fillRef>
+          <a:effectRef idx="0">
+            <a:schemeClr val="accent1"/>
+          </a:effectRef>
+          <a:fontRef idx="minor">
+            <a:schemeClr val="tx1"/>
+          </a:fontRef>
+        </p:style>
+      </p:cxnSp>
+      <p:sp>
+        <p:nvSpPr>
+          <p:cNvPr id="106" name="Rectangle 2"/>
+          <p:cNvSpPr>
+            <a:spLocks noChangeArrowheads="1"/>
+          </p:cNvSpPr>
+          <p:nvPr/>
+        </p:nvSpPr>
+        <p:spPr bwMode="auto">
+          <a:xfrm>
+            <a:off x="3938586" y="4680181"/>
+            <a:ext cx="1428751" cy="246221"/>
+          </a:xfrm>
+          <a:prstGeom prst="rect">
+            <a:avLst/>
+          </a:prstGeom>
+          <a:solidFill>
+            <a:schemeClr val="bg1">
+              <a:lumMod val="85000"/>
+            </a:schemeClr>
+          </a:solidFill>
+          <a:ln w="9525">
+            <a:solidFill>
+              <a:schemeClr val="tx1"/>
+            </a:solidFill>
+            <a:miter lim="800000"/>
+            <a:headEnd/>
+            <a:tailEnd/>
+          </a:ln>
+          <a:effectLst/>
+        </p:spPr>
+        <p:txBody>
+          <a:bodyPr vert="horz" wrap="square" lIns="91440" tIns="45720" rIns="91440" bIns="45720" numCol="1" anchor="ctr" anchorCtr="0" compatLnSpc="1">
+            <a:prstTxWarp prst="textNoShape">
+              <a:avLst/>
+            </a:prstTxWarp>
+            <a:spAutoFit/>
+          </a:bodyPr>
+          <a:lstStyle/>
+          <a:p>
+            <a:pPr marL="0" marR="0" lvl="0" indent="0" algn="ctr" defTabSz="914400" rtl="0" eaLnBrk="0" fontAlgn="base" latinLnBrk="0" hangingPunct="0">
+              <a:lnSpc>
+                <a:spcPct val="100000"/>
+              </a:lnSpc>
+              <a:spcBef>
+                <a:spcPct val="0"/>
+              </a:spcBef>
+              <a:spcAft>
+                <a:spcPct val="0"/>
+              </a:spcAft>
+              <a:buClrTx/>
+              <a:buSzTx/>
+              <a:buFontTx/>
+              <a:buNone/>
+              <a:tabLst/>
+            </a:pPr>
+            <a:r>
+              <a:rPr kumimoji="0" lang="fr-FR" altLang="fr-FR" sz="1000" b="0" i="0" u="none" strike="noStrike" cap="none" normalizeH="0" baseline="0" dirty="0" err="1" smtClean="0">
+                <a:ln>
+                  <a:noFill/>
+                </a:ln>
+                <a:solidFill>
+                  <a:srgbClr val="000000"/>
+                </a:solidFill>
+                <a:effectLst/>
+                <a:latin typeface="Courier New" panose="02070309020205020404" pitchFamily="49" charset="0"/>
+                <a:cs typeface="Courier New" panose="02070309020205020404" pitchFamily="49" charset="0"/>
+              </a:rPr>
+              <a:t>Open_statement</a:t>
+            </a:r>
+            <a:r>
+              <a:rPr kumimoji="0" lang="fr-FR" altLang="fr-FR" sz="1000" b="0" i="0" u="none" strike="noStrike" cap="none" normalizeH="0" baseline="0" dirty="0" smtClean="0">
+                <a:ln>
+                  <a:noFill/>
+                </a:ln>
+                <a:solidFill>
+                  <a:srgbClr val="000000"/>
+                </a:solidFill>
+                <a:effectLst/>
+                <a:latin typeface="Courier New" panose="02070309020205020404" pitchFamily="49" charset="0"/>
+                <a:cs typeface="Courier New" panose="02070309020205020404" pitchFamily="49" charset="0"/>
+              </a:rPr>
+              <a:t>()</a:t>
+            </a:r>
+            <a:endParaRPr kumimoji="0" lang="fr-FR" altLang="fr-FR" sz="1800" b="0" i="0" u="none" strike="noStrike" cap="none" normalizeH="0" baseline="0" dirty="0" smtClean="0">
+              <a:ln>
+                <a:noFill/>
+              </a:ln>
+              <a:solidFill>
+                <a:schemeClr val="tx1"/>
+              </a:solidFill>
+              <a:effectLst/>
+              <a:latin typeface="Arial" panose="020B0604020202020204" pitchFamily="34" charset="0"/>
+            </a:endParaRPr>
+          </a:p>
+        </p:txBody>
+      </p:sp>
+      <p:sp>
+        <p:nvSpPr>
+          <p:cNvPr id="107" name="Rectangle 2"/>
+          <p:cNvSpPr>
+            <a:spLocks noChangeArrowheads="1"/>
+          </p:cNvSpPr>
+          <p:nvPr/>
+        </p:nvSpPr>
+        <p:spPr bwMode="auto">
+          <a:xfrm>
+            <a:off x="3967162" y="5072523"/>
+            <a:ext cx="1295399" cy="246221"/>
+          </a:xfrm>
+          <a:prstGeom prst="rect">
+            <a:avLst/>
+          </a:prstGeom>
+          <a:solidFill>
+            <a:schemeClr val="bg1">
+              <a:lumMod val="85000"/>
+            </a:schemeClr>
+          </a:solidFill>
+          <a:ln w="9525">
+            <a:solidFill>
+              <a:schemeClr val="tx1"/>
+            </a:solidFill>
+            <a:miter lim="800000"/>
+            <a:headEnd/>
+            <a:tailEnd/>
+          </a:ln>
+          <a:effectLst/>
+        </p:spPr>
+        <p:txBody>
+          <a:bodyPr vert="horz" wrap="square" lIns="91440" tIns="45720" rIns="91440" bIns="45720" numCol="1" anchor="ctr" anchorCtr="0" compatLnSpc="1">
+            <a:prstTxWarp prst="textNoShape">
+              <a:avLst/>
+            </a:prstTxWarp>
+            <a:spAutoFit/>
+          </a:bodyPr>
+          <a:lstStyle/>
+          <a:p>
+            <a:pPr marL="0" marR="0" lvl="0" indent="0" algn="ctr" defTabSz="914400" rtl="0" eaLnBrk="0" fontAlgn="base" latinLnBrk="0" hangingPunct="0">
+              <a:lnSpc>
+                <a:spcPct val="100000"/>
+              </a:lnSpc>
+              <a:spcBef>
+                <a:spcPct val="0"/>
+              </a:spcBef>
+              <a:spcAft>
+                <a:spcPct val="0"/>
+              </a:spcAft>
+              <a:buClrTx/>
+              <a:buSzTx/>
+              <a:buFontTx/>
+              <a:buNone/>
+              <a:tabLst/>
+            </a:pPr>
+            <a:r>
+              <a:rPr kumimoji="0" lang="fr-FR" altLang="fr-FR" sz="1000" b="0" i="0" u="none" strike="noStrike" cap="none" normalizeH="0" baseline="0" dirty="0" smtClean="0">
+                <a:ln>
+                  <a:noFill/>
+                </a:ln>
+                <a:solidFill>
+                  <a:srgbClr val="000000"/>
+                </a:solidFill>
+                <a:effectLst/>
+                <a:latin typeface="Courier New" panose="02070309020205020404" pitchFamily="49" charset="0"/>
+                <a:cs typeface="Courier New" panose="02070309020205020404" pitchFamily="49" charset="0"/>
+              </a:rPr>
+              <a:t>Start thread</a:t>
+            </a:r>
+            <a:endParaRPr kumimoji="0" lang="fr-FR" altLang="fr-FR" sz="1800" b="0" i="0" u="none" strike="noStrike" cap="none" normalizeH="0" baseline="0" dirty="0" smtClean="0">
+              <a:ln>
+                <a:noFill/>
+              </a:ln>
+              <a:solidFill>
+                <a:schemeClr val="tx1"/>
+              </a:solidFill>
+              <a:effectLst/>
+              <a:latin typeface="Arial" panose="020B0604020202020204" pitchFamily="34" charset="0"/>
+            </a:endParaRPr>
+          </a:p>
+        </p:txBody>
+      </p:sp>
+      <p:sp>
+        <p:nvSpPr>
+          <p:cNvPr id="108" name="Rectangle avec coins arrondis en diagonale 107"/>
+          <p:cNvSpPr/>
+          <p:nvPr/>
+        </p:nvSpPr>
+        <p:spPr>
+          <a:xfrm>
+            <a:off x="3790950" y="5758933"/>
+            <a:ext cx="1809750" cy="241817"/>
+          </a:xfrm>
+          <a:prstGeom prst="round2DiagRect">
+            <a:avLst/>
+          </a:prstGeom>
+        </p:spPr>
+        <p:style>
+          <a:lnRef idx="2">
+            <a:schemeClr val="accent1">
+              <a:shade val="50000"/>
+            </a:schemeClr>
+          </a:lnRef>
+          <a:fillRef idx="1">
+            <a:schemeClr val="accent1"/>
+          </a:fillRef>
+          <a:effectRef idx="0">
+            <a:schemeClr val="accent1"/>
+          </a:effectRef>
+          <a:fontRef idx="minor">
+            <a:schemeClr val="lt1"/>
+          </a:fontRef>
+        </p:style>
+        <p:txBody>
+          <a:bodyPr rtlCol="0" anchor="ctr"/>
+          <a:lstStyle/>
+          <a:p>
+            <a:pPr algn="ctr"/>
+            <a:r>
+              <a:rPr lang="fr-FR" sz="1400" dirty="0" smtClean="0"/>
+              <a:t>Wait_statement.html</a:t>
+            </a:r>
+            <a:endParaRPr lang="fr-FR" sz="1400" dirty="0"/>
+          </a:p>
+        </p:txBody>
+      </p:sp>
+      <p:sp>
+        <p:nvSpPr>
+          <p:cNvPr id="112" name="Rectangle 3"/>
+          <p:cNvSpPr>
+            <a:spLocks noChangeArrowheads="1"/>
+          </p:cNvSpPr>
+          <p:nvPr/>
+        </p:nvSpPr>
+        <p:spPr bwMode="auto">
+          <a:xfrm>
+            <a:off x="3052763" y="6273998"/>
+            <a:ext cx="3324226" cy="246221"/>
+          </a:xfrm>
+          <a:prstGeom prst="rect">
+            <a:avLst/>
+          </a:prstGeom>
+          <a:solidFill>
+            <a:srgbClr val="FF0000"/>
+          </a:solidFill>
+          <a:ln/>
+        </p:spPr>
+        <p:style>
+          <a:lnRef idx="2">
+            <a:schemeClr val="dk1"/>
+          </a:lnRef>
+          <a:fillRef idx="1">
+            <a:schemeClr val="lt1"/>
+          </a:fillRef>
+          <a:effectRef idx="0">
+            <a:schemeClr val="dk1"/>
+          </a:effectRef>
+          <a:fontRef idx="minor">
+            <a:schemeClr val="dk1"/>
+          </a:fontRef>
+        </p:style>
+        <p:txBody>
+          <a:bodyPr vert="horz" wrap="square" lIns="91440" tIns="45720" rIns="91440" bIns="45720" numCol="1" anchor="ctr" anchorCtr="0" compatLnSpc="1">
+            <a:prstTxWarp prst="textNoShape">
+              <a:avLst/>
+            </a:prstTxWarp>
+            <a:spAutoFit/>
+          </a:bodyPr>
+          <a:lstStyle/>
+          <a:p>
+            <a:pPr lvl="0" eaLnBrk="0" fontAlgn="base" hangingPunct="0">
+              <a:spcBef>
+                <a:spcPct val="0"/>
+              </a:spcBef>
+              <a:spcAft>
+                <a:spcPct val="0"/>
+              </a:spcAft>
+            </a:pPr>
+            <a:r>
+              <a:rPr lang="fr-FR" altLang="fr-FR" sz="1000" dirty="0" err="1">
+                <a:solidFill>
+                  <a:srgbClr val="000000"/>
+                </a:solidFill>
+                <a:latin typeface="Courier New" panose="02070309020205020404" pitchFamily="49" charset="0"/>
+                <a:cs typeface="Courier New" panose="02070309020205020404" pitchFamily="49" charset="0"/>
+              </a:rPr>
+              <a:t>Wait</a:t>
+            </a:r>
+            <a:r>
+              <a:rPr lang="fr-FR" altLang="fr-FR" sz="1000" dirty="0">
+                <a:solidFill>
+                  <a:srgbClr val="000000"/>
+                </a:solidFill>
+                <a:latin typeface="Courier New" panose="02070309020205020404" pitchFamily="49" charset="0"/>
+                <a:cs typeface="Courier New" panose="02070309020205020404" pitchFamily="49" charset="0"/>
+              </a:rPr>
+              <a:t> </a:t>
+            </a:r>
+            <a:r>
+              <a:rPr lang="fr-FR" altLang="fr-FR" sz="1000" dirty="0" err="1">
+                <a:solidFill>
+                  <a:srgbClr val="000000"/>
+                </a:solidFill>
+                <a:latin typeface="Courier New" panose="02070309020205020404" pitchFamily="49" charset="0"/>
+                <a:cs typeface="Courier New" panose="02070309020205020404" pitchFamily="49" charset="0"/>
+              </a:rPr>
+              <a:t>until</a:t>
+            </a:r>
+            <a:r>
+              <a:rPr lang="fr-FR" altLang="fr-FR" sz="1000" dirty="0">
+                <a:solidFill>
+                  <a:srgbClr val="000000"/>
+                </a:solidFill>
+                <a:latin typeface="Courier New" panose="02070309020205020404" pitchFamily="49" charset="0"/>
+                <a:cs typeface="Courier New" panose="02070309020205020404" pitchFamily="49" charset="0"/>
+              </a:rPr>
+              <a:t> </a:t>
+            </a:r>
+            <a:r>
+              <a:rPr lang="fr-FR" altLang="fr-FR" sz="1000" dirty="0" err="1">
+                <a:solidFill>
+                  <a:srgbClr val="000000"/>
+                </a:solidFill>
+                <a:latin typeface="Courier New" panose="02070309020205020404" pitchFamily="49" charset="0"/>
+                <a:cs typeface="Courier New" panose="02070309020205020404" pitchFamily="49" charset="0"/>
+              </a:rPr>
+              <a:t>Spark</a:t>
+            </a:r>
+            <a:r>
+              <a:rPr lang="fr-FR" altLang="fr-FR" sz="1000" dirty="0">
+                <a:solidFill>
+                  <a:srgbClr val="000000"/>
+                </a:solidFill>
+                <a:latin typeface="Courier New" panose="02070309020205020404" pitchFamily="49" charset="0"/>
+                <a:cs typeface="Courier New" panose="02070309020205020404" pitchFamily="49" charset="0"/>
+              </a:rPr>
+              <a:t> </a:t>
+            </a:r>
+            <a:r>
+              <a:rPr lang="fr-FR" altLang="fr-FR" sz="1000" dirty="0" err="1">
+                <a:solidFill>
+                  <a:srgbClr val="000000"/>
+                </a:solidFill>
+                <a:latin typeface="Courier New" panose="02070309020205020404" pitchFamily="49" charset="0"/>
+                <a:cs typeface="Courier New" panose="02070309020205020404" pitchFamily="49" charset="0"/>
+              </a:rPr>
+              <a:t>statement</a:t>
+            </a:r>
+            <a:r>
+              <a:rPr lang="fr-FR" altLang="fr-FR" sz="1000" dirty="0">
+                <a:solidFill>
+                  <a:srgbClr val="000000"/>
+                </a:solidFill>
+                <a:latin typeface="Courier New" panose="02070309020205020404" pitchFamily="49" charset="0"/>
+                <a:cs typeface="Courier New" panose="02070309020205020404" pitchFamily="49" charset="0"/>
+              </a:rPr>
+              <a:t> </a:t>
+            </a:r>
+            <a:r>
+              <a:rPr lang="fr-FR" altLang="fr-FR" sz="1000" dirty="0" err="1">
+                <a:solidFill>
+                  <a:srgbClr val="000000"/>
+                </a:solidFill>
+                <a:latin typeface="Courier New" panose="02070309020205020404" pitchFamily="49" charset="0"/>
+                <a:cs typeface="Courier New" panose="02070309020205020404" pitchFamily="49" charset="0"/>
+              </a:rPr>
+              <a:t>is</a:t>
+            </a:r>
+            <a:r>
+              <a:rPr lang="fr-FR" altLang="fr-FR" sz="1000" dirty="0">
+                <a:solidFill>
+                  <a:srgbClr val="000000"/>
+                </a:solidFill>
+                <a:latin typeface="Courier New" panose="02070309020205020404" pitchFamily="49" charset="0"/>
+                <a:cs typeface="Courier New" panose="02070309020205020404" pitchFamily="49" charset="0"/>
+              </a:rPr>
+              <a:t> </a:t>
+            </a:r>
+            <a:r>
+              <a:rPr lang="fr-FR" altLang="fr-FR" sz="1000" dirty="0" err="1">
+                <a:solidFill>
+                  <a:srgbClr val="000000"/>
+                </a:solidFill>
+                <a:latin typeface="Courier New" panose="02070309020205020404" pitchFamily="49" charset="0"/>
+                <a:cs typeface="Courier New" panose="02070309020205020404" pitchFamily="49" charset="0"/>
+              </a:rPr>
+              <a:t>available</a:t>
+            </a:r>
+            <a:endParaRPr kumimoji="0" lang="fr-FR" altLang="fr-FR" sz="1800" b="0" i="0" u="none" strike="noStrike" cap="none" normalizeH="0" baseline="0" dirty="0" smtClean="0">
+              <a:ln>
+                <a:noFill/>
+              </a:ln>
+              <a:solidFill>
+                <a:schemeClr val="tx1"/>
+              </a:solidFill>
+              <a:effectLst/>
+              <a:latin typeface="Arial" panose="020B0604020202020204" pitchFamily="34" charset="0"/>
+            </a:endParaRPr>
+          </a:p>
+        </p:txBody>
+      </p:sp>
+      <p:cxnSp>
+        <p:nvCxnSpPr>
+          <p:cNvPr id="116" name="Connecteur en arc 115"/>
+          <p:cNvCxnSpPr>
+            <a:stCxn id="102" idx="2"/>
+            <a:endCxn id="106" idx="0"/>
+          </p:cNvCxnSpPr>
+          <p:nvPr/>
+        </p:nvCxnSpPr>
+        <p:spPr>
+          <a:xfrm rot="16200000" flipH="1">
+            <a:off x="4382953" y="4410171"/>
+            <a:ext cx="487631" cy="52387"/>
+          </a:xfrm>
+          <a:prstGeom prst="curvedConnector3">
+            <a:avLst>
+              <a:gd name="adj1" fmla="val 50000"/>
+            </a:avLst>
+          </a:prstGeom>
+          <a:ln>
+            <a:tailEnd type="triangle"/>
+          </a:ln>
+        </p:spPr>
+        <p:style>
+          <a:lnRef idx="1">
+            <a:schemeClr val="accent1"/>
+          </a:lnRef>
+          <a:fillRef idx="0">
+            <a:schemeClr val="accent1"/>
+          </a:fillRef>
+          <a:effectRef idx="0">
+            <a:schemeClr val="accent1"/>
+          </a:effectRef>
+          <a:fontRef idx="minor">
+            <a:schemeClr val="tx1"/>
+          </a:fontRef>
+        </p:style>
+      </p:cxnSp>
+      <p:cxnSp>
+        <p:nvCxnSpPr>
+          <p:cNvPr id="119" name="Connecteur en arc 118"/>
+          <p:cNvCxnSpPr>
+            <a:stCxn id="106" idx="2"/>
+            <a:endCxn id="107" idx="0"/>
+          </p:cNvCxnSpPr>
+          <p:nvPr/>
+        </p:nvCxnSpPr>
+        <p:spPr>
+          <a:xfrm rot="5400000">
+            <a:off x="4560852" y="4980412"/>
+            <a:ext cx="146121" cy="38100"/>
+          </a:xfrm>
+          <a:prstGeom prst="curvedConnector3">
+            <a:avLst>
+              <a:gd name="adj1" fmla="val 50000"/>
+            </a:avLst>
+          </a:prstGeom>
+          <a:ln>
+            <a:tailEnd type="triangle"/>
+          </a:ln>
+        </p:spPr>
+        <p:style>
+          <a:lnRef idx="1">
+            <a:schemeClr val="accent1"/>
+          </a:lnRef>
+          <a:fillRef idx="0">
+            <a:schemeClr val="accent1"/>
+          </a:fillRef>
+          <a:effectRef idx="0">
+            <a:schemeClr val="accent1"/>
+          </a:effectRef>
+          <a:fontRef idx="minor">
+            <a:schemeClr val="tx1"/>
+          </a:fontRef>
+        </p:style>
+      </p:cxnSp>
+      <p:cxnSp>
+        <p:nvCxnSpPr>
+          <p:cNvPr id="122" name="Connecteur en arc 121"/>
+          <p:cNvCxnSpPr>
+            <a:stCxn id="107" idx="2"/>
+            <a:endCxn id="108" idx="3"/>
+          </p:cNvCxnSpPr>
+          <p:nvPr/>
+        </p:nvCxnSpPr>
+        <p:spPr>
+          <a:xfrm rot="16200000" flipH="1">
+            <a:off x="4435249" y="5498356"/>
+            <a:ext cx="440189" cy="80963"/>
+          </a:xfrm>
+          <a:prstGeom prst="curvedConnector3">
+            <a:avLst>
+              <a:gd name="adj1" fmla="val 50000"/>
+            </a:avLst>
+          </a:prstGeom>
+          <a:ln>
+            <a:tailEnd type="triangle"/>
+          </a:ln>
+        </p:spPr>
+        <p:style>
+          <a:lnRef idx="1">
+            <a:schemeClr val="accent1"/>
+          </a:lnRef>
+          <a:fillRef idx="0">
+            <a:schemeClr val="accent1"/>
+          </a:fillRef>
+          <a:effectRef idx="0">
+            <a:schemeClr val="accent1"/>
+          </a:effectRef>
+          <a:fontRef idx="minor">
+            <a:schemeClr val="tx1"/>
+          </a:fontRef>
+        </p:style>
+      </p:cxnSp>
+      <p:sp>
+        <p:nvSpPr>
+          <p:cNvPr id="126" name="Rectangle 3"/>
+          <p:cNvSpPr>
+            <a:spLocks noChangeArrowheads="1"/>
+          </p:cNvSpPr>
+          <p:nvPr/>
+        </p:nvSpPr>
+        <p:spPr bwMode="auto">
+          <a:xfrm>
+            <a:off x="6531768" y="4962520"/>
+            <a:ext cx="1259682" cy="246221"/>
+          </a:xfrm>
+          <a:prstGeom prst="rect">
+            <a:avLst/>
+          </a:prstGeom>
+          <a:solidFill>
+            <a:srgbClr val="92D050"/>
+          </a:solidFill>
+          <a:ln/>
+        </p:spPr>
+        <p:style>
+          <a:lnRef idx="2">
+            <a:schemeClr val="dk1"/>
+          </a:lnRef>
+          <a:fillRef idx="1">
+            <a:schemeClr val="lt1"/>
+          </a:fillRef>
+          <a:effectRef idx="0">
+            <a:schemeClr val="dk1"/>
+          </a:effectRef>
+          <a:fontRef idx="minor">
+            <a:schemeClr val="dk1"/>
+          </a:fontRef>
+        </p:style>
+        <p:txBody>
+          <a:bodyPr vert="horz" wrap="square" lIns="91440" tIns="45720" rIns="91440" bIns="45720" numCol="1" anchor="ctr" anchorCtr="0" compatLnSpc="1">
+            <a:prstTxWarp prst="textNoShape">
+              <a:avLst/>
+            </a:prstTxWarp>
+            <a:spAutoFit/>
+          </a:bodyPr>
+          <a:lstStyle/>
+          <a:p>
+            <a:pPr marL="0" marR="0" lvl="0" indent="0" algn="l" defTabSz="914400" rtl="0" eaLnBrk="0" fontAlgn="base" latinLnBrk="0" hangingPunct="0">
+              <a:lnSpc>
+                <a:spcPct val="100000"/>
+              </a:lnSpc>
+              <a:spcBef>
+                <a:spcPct val="0"/>
+              </a:spcBef>
+              <a:spcAft>
+                <a:spcPct val="0"/>
+              </a:spcAft>
+              <a:buClrTx/>
+              <a:buSzTx/>
+              <a:buFontTx/>
+              <a:buNone/>
+              <a:tabLst/>
+            </a:pPr>
+            <a:r>
+              <a:rPr kumimoji="0" lang="fr-FR" altLang="fr-FR" sz="1000" b="0" i="0" u="none" strike="noStrike" cap="none" normalizeH="0" baseline="0" dirty="0" err="1" smtClean="0">
+                <a:ln>
+                  <a:noFill/>
+                </a:ln>
+                <a:solidFill>
+                  <a:schemeClr val="tx1"/>
+                </a:solidFill>
+                <a:effectLst/>
+                <a:latin typeface="Courier New" panose="02070309020205020404" pitchFamily="49" charset="0"/>
+                <a:cs typeface="Courier New" panose="02070309020205020404" pitchFamily="49" charset="0"/>
+              </a:rPr>
+              <a:t>AvailableEvent</a:t>
+            </a:r>
+            <a:endParaRPr kumimoji="0" lang="fr-FR" altLang="fr-FR" sz="1000" b="0" i="0" u="none" strike="noStrike" cap="none" normalizeH="0" baseline="0" dirty="0" smtClean="0">
+              <a:ln>
+                <a:noFill/>
+              </a:ln>
+              <a:solidFill>
+                <a:schemeClr val="tx1"/>
+              </a:solidFill>
+              <a:effectLst/>
+              <a:latin typeface="Courier New" panose="02070309020205020404" pitchFamily="49" charset="0"/>
+              <a:cs typeface="Courier New" panose="02070309020205020404" pitchFamily="49" charset="0"/>
+            </a:endParaRPr>
+          </a:p>
+        </p:txBody>
+      </p:sp>
+      <p:cxnSp>
+        <p:nvCxnSpPr>
+          <p:cNvPr id="127" name="Connecteur en arc 126"/>
+          <p:cNvCxnSpPr>
+            <a:stCxn id="107" idx="3"/>
+            <a:endCxn id="126" idx="1"/>
+          </p:cNvCxnSpPr>
+          <p:nvPr/>
+        </p:nvCxnSpPr>
+        <p:spPr>
+          <a:xfrm flipV="1">
+            <a:off x="5262561" y="5085631"/>
+            <a:ext cx="1269207" cy="110003"/>
+          </a:xfrm>
+          <a:prstGeom prst="curvedConnector3">
+            <a:avLst>
+              <a:gd name="adj1" fmla="val 50000"/>
+            </a:avLst>
+          </a:prstGeom>
+          <a:ln>
+            <a:tailEnd type="triangle"/>
+          </a:ln>
+        </p:spPr>
+        <p:style>
+          <a:lnRef idx="1">
+            <a:schemeClr val="accent1"/>
+          </a:lnRef>
+          <a:fillRef idx="0">
+            <a:schemeClr val="accent1"/>
+          </a:fillRef>
+          <a:effectRef idx="0">
+            <a:schemeClr val="accent1"/>
+          </a:effectRef>
+          <a:fontRef idx="minor">
+            <a:schemeClr val="tx1"/>
+          </a:fontRef>
+        </p:style>
+      </p:cxnSp>
+      <p:cxnSp>
+        <p:nvCxnSpPr>
+          <p:cNvPr id="130" name="Connecteur en arc 129"/>
+          <p:cNvCxnSpPr>
+            <a:stCxn id="108" idx="1"/>
+            <a:endCxn id="112" idx="0"/>
+          </p:cNvCxnSpPr>
+          <p:nvPr/>
+        </p:nvCxnSpPr>
+        <p:spPr>
+          <a:xfrm rot="16200000" flipH="1">
+            <a:off x="4568726" y="6127848"/>
+            <a:ext cx="273248" cy="19051"/>
+          </a:xfrm>
+          <a:prstGeom prst="curvedConnector3">
+            <a:avLst>
+              <a:gd name="adj1" fmla="val 50000"/>
+            </a:avLst>
+          </a:prstGeom>
+          <a:ln>
+            <a:tailEnd type="triangle"/>
+          </a:ln>
+        </p:spPr>
+        <p:style>
+          <a:lnRef idx="1">
+            <a:schemeClr val="accent1"/>
+          </a:lnRef>
+          <a:fillRef idx="0">
+            <a:schemeClr val="accent1"/>
+          </a:fillRef>
+          <a:effectRef idx="0">
+            <a:schemeClr val="accent1"/>
+          </a:effectRef>
+          <a:fontRef idx="minor">
+            <a:schemeClr val="tx1"/>
+          </a:fontRef>
+        </p:style>
+      </p:cxnSp>
+      <p:sp>
+        <p:nvSpPr>
+          <p:cNvPr id="135" name="ZoneTexte 134"/>
+          <p:cNvSpPr txBox="1"/>
+          <p:nvPr/>
+        </p:nvSpPr>
+        <p:spPr>
+          <a:xfrm>
+            <a:off x="6686549" y="5619750"/>
+            <a:ext cx="1104901" cy="369332"/>
+          </a:xfrm>
+          <a:prstGeom prst="rect">
+            <a:avLst/>
+          </a:prstGeom>
+          <a:noFill/>
+          <a:ln>
+            <a:solidFill>
+              <a:srgbClr val="FF0000"/>
+            </a:solidFill>
+          </a:ln>
+        </p:spPr>
+        <p:txBody>
+          <a:bodyPr wrap="square" rtlCol="0">
+            <a:spAutoFit/>
+          </a:bodyPr>
+          <a:lstStyle/>
+          <a:p>
+            <a:r>
+              <a:rPr lang="fr-FR" dirty="0" smtClean="0"/>
+              <a:t>/</a:t>
+            </a:r>
+            <a:r>
+              <a:rPr lang="fr-FR" dirty="0" err="1" smtClean="0"/>
+              <a:t>available</a:t>
+            </a:r>
+            <a:endParaRPr lang="fr-FR" dirty="0"/>
+          </a:p>
+        </p:txBody>
+      </p:sp>
+      <p:cxnSp>
+        <p:nvCxnSpPr>
+          <p:cNvPr id="136" name="Connecteur en arc 135"/>
+          <p:cNvCxnSpPr/>
+          <p:nvPr/>
+        </p:nvCxnSpPr>
+        <p:spPr>
+          <a:xfrm rot="16200000" flipH="1">
+            <a:off x="6844781" y="5192194"/>
+            <a:ext cx="725334" cy="91678"/>
+          </a:xfrm>
+          <a:prstGeom prst="curvedConnector3">
+            <a:avLst>
+              <a:gd name="adj1" fmla="val 50000"/>
+            </a:avLst>
+          </a:prstGeom>
+          <a:ln>
+            <a:tailEnd type="triangle"/>
+          </a:ln>
+        </p:spPr>
+        <p:style>
+          <a:lnRef idx="1">
+            <a:schemeClr val="accent1"/>
+          </a:lnRef>
+          <a:fillRef idx="0">
+            <a:schemeClr val="accent1"/>
+          </a:fillRef>
+          <a:effectRef idx="0">
+            <a:schemeClr val="accent1"/>
+          </a:effectRef>
+          <a:fontRef idx="minor">
+            <a:schemeClr val="tx1"/>
+          </a:fontRef>
+        </p:style>
+      </p:cxnSp>
+      <p:sp>
+        <p:nvSpPr>
+          <p:cNvPr id="139" name="Rectangle 2"/>
+          <p:cNvSpPr>
+            <a:spLocks noChangeArrowheads="1"/>
+          </p:cNvSpPr>
+          <p:nvPr/>
+        </p:nvSpPr>
+        <p:spPr bwMode="auto">
+          <a:xfrm>
+            <a:off x="8305799" y="5637697"/>
+            <a:ext cx="1162051" cy="246221"/>
+          </a:xfrm>
+          <a:prstGeom prst="rect">
+            <a:avLst/>
+          </a:prstGeom>
+          <a:solidFill>
+            <a:schemeClr val="bg1">
+              <a:lumMod val="85000"/>
+            </a:schemeClr>
+          </a:solidFill>
+          <a:ln w="9525">
+            <a:solidFill>
+              <a:schemeClr val="tx1"/>
+            </a:solidFill>
+            <a:miter lim="800000"/>
+            <a:headEnd/>
+            <a:tailEnd/>
+          </a:ln>
+          <a:effectLst/>
+        </p:spPr>
+        <p:txBody>
+          <a:bodyPr vert="horz" wrap="square" lIns="91440" tIns="45720" rIns="91440" bIns="45720" numCol="1" anchor="ctr" anchorCtr="0" compatLnSpc="1">
+            <a:prstTxWarp prst="textNoShape">
+              <a:avLst/>
+            </a:prstTxWarp>
+            <a:spAutoFit/>
+          </a:bodyPr>
+          <a:lstStyle/>
+          <a:p>
+            <a:pPr marL="0" marR="0" lvl="0" indent="0" algn="ctr" defTabSz="914400" rtl="0" eaLnBrk="0" fontAlgn="base" latinLnBrk="0" hangingPunct="0">
+              <a:lnSpc>
+                <a:spcPct val="100000"/>
+              </a:lnSpc>
+              <a:spcBef>
+                <a:spcPct val="0"/>
+              </a:spcBef>
+              <a:spcAft>
+                <a:spcPct val="0"/>
+              </a:spcAft>
+              <a:buClrTx/>
+              <a:buSzTx/>
+              <a:buFontTx/>
+              <a:buNone/>
+              <a:tabLst/>
+            </a:pPr>
+            <a:r>
+              <a:rPr kumimoji="0" lang="fr-FR" altLang="fr-FR" sz="1000" b="0" i="0" u="none" strike="noStrike" cap="none" normalizeH="0" baseline="0" dirty="0" err="1" smtClean="0">
+                <a:ln>
+                  <a:noFill/>
+                </a:ln>
+                <a:solidFill>
+                  <a:srgbClr val="000000"/>
+                </a:solidFill>
+                <a:effectLst/>
+                <a:latin typeface="Courier New" panose="02070309020205020404" pitchFamily="49" charset="0"/>
+                <a:cs typeface="Courier New" panose="02070309020205020404" pitchFamily="49" charset="0"/>
+              </a:rPr>
+              <a:t>available</a:t>
+            </a:r>
+            <a:r>
+              <a:rPr kumimoji="0" lang="fr-FR" altLang="fr-FR" sz="1000" b="0" i="0" u="none" strike="noStrike" cap="none" normalizeH="0" baseline="0" dirty="0" smtClean="0">
+                <a:ln>
+                  <a:noFill/>
+                </a:ln>
+                <a:solidFill>
+                  <a:srgbClr val="000000"/>
+                </a:solidFill>
+                <a:effectLst/>
+                <a:latin typeface="Courier New" panose="02070309020205020404" pitchFamily="49" charset="0"/>
+                <a:cs typeface="Courier New" panose="02070309020205020404" pitchFamily="49" charset="0"/>
+              </a:rPr>
+              <a:t>()</a:t>
+            </a:r>
+            <a:endParaRPr kumimoji="0" lang="fr-FR" altLang="fr-FR" sz="1800" b="0" i="0" u="none" strike="noStrike" cap="none" normalizeH="0" baseline="0" dirty="0" smtClean="0">
+              <a:ln>
+                <a:noFill/>
+              </a:ln>
+              <a:solidFill>
+                <a:schemeClr val="tx1"/>
+              </a:solidFill>
+              <a:effectLst/>
+              <a:latin typeface="Arial" panose="020B0604020202020204" pitchFamily="34" charset="0"/>
+            </a:endParaRPr>
+          </a:p>
+        </p:txBody>
+      </p:sp>
+      <p:cxnSp>
+        <p:nvCxnSpPr>
+          <p:cNvPr id="141" name="Connecteur en arc 140"/>
+          <p:cNvCxnSpPr>
+            <a:stCxn id="135" idx="3"/>
+            <a:endCxn id="139" idx="1"/>
+          </p:cNvCxnSpPr>
+          <p:nvPr/>
+        </p:nvCxnSpPr>
+        <p:spPr>
+          <a:xfrm flipV="1">
+            <a:off x="7791450" y="5760808"/>
+            <a:ext cx="514349" cy="43608"/>
+          </a:xfrm>
+          <a:prstGeom prst="curvedConnector3">
+            <a:avLst>
+              <a:gd name="adj1" fmla="val 50000"/>
+            </a:avLst>
+          </a:prstGeom>
+          <a:ln>
+            <a:tailEnd type="triangle"/>
+          </a:ln>
+        </p:spPr>
+        <p:style>
+          <a:lnRef idx="1">
+            <a:schemeClr val="accent1"/>
+          </a:lnRef>
+          <a:fillRef idx="0">
+            <a:schemeClr val="accent1"/>
+          </a:fillRef>
+          <a:effectRef idx="0">
+            <a:schemeClr val="accent1"/>
+          </a:effectRef>
+          <a:fontRef idx="minor">
+            <a:schemeClr val="tx1"/>
+          </a:fontRef>
+        </p:style>
+      </p:cxnSp>
+      <p:sp>
+        <p:nvSpPr>
+          <p:cNvPr id="144" name="Rectangle avec coins arrondis en diagonale 143"/>
+          <p:cNvSpPr/>
+          <p:nvPr/>
+        </p:nvSpPr>
+        <p:spPr>
+          <a:xfrm>
+            <a:off x="9948863" y="5625583"/>
+            <a:ext cx="1366837" cy="241817"/>
+          </a:xfrm>
+          <a:prstGeom prst="round2DiagRect">
+            <a:avLst/>
+          </a:prstGeom>
+        </p:spPr>
+        <p:style>
+          <a:lnRef idx="2">
+            <a:schemeClr val="accent1">
+              <a:shade val="50000"/>
+            </a:schemeClr>
+          </a:lnRef>
+          <a:fillRef idx="1">
+            <a:schemeClr val="accent1"/>
+          </a:fillRef>
+          <a:effectRef idx="0">
+            <a:schemeClr val="accent1"/>
+          </a:effectRef>
+          <a:fontRef idx="minor">
+            <a:schemeClr val="lt1"/>
+          </a:fontRef>
+        </p:style>
+        <p:txBody>
+          <a:bodyPr rtlCol="0" anchor="ctr"/>
+          <a:lstStyle/>
+          <a:p>
+            <a:pPr algn="ctr"/>
+            <a:r>
+              <a:rPr lang="fr-FR" sz="1400" dirty="0" smtClean="0"/>
+              <a:t>statement.html</a:t>
+            </a:r>
+            <a:endParaRPr lang="fr-FR" sz="1400" dirty="0"/>
+          </a:p>
+        </p:txBody>
+      </p:sp>
+      <p:cxnSp>
+        <p:nvCxnSpPr>
+          <p:cNvPr id="145" name="Connecteur en arc 144"/>
+          <p:cNvCxnSpPr>
+            <a:stCxn id="139" idx="3"/>
+            <a:endCxn id="144" idx="2"/>
+          </p:cNvCxnSpPr>
+          <p:nvPr/>
+        </p:nvCxnSpPr>
+        <p:spPr>
+          <a:xfrm flipV="1">
+            <a:off x="9467850" y="5746492"/>
+            <a:ext cx="481013" cy="14316"/>
+          </a:xfrm>
+          <a:prstGeom prst="curvedConnector3">
+            <a:avLst>
+              <a:gd name="adj1" fmla="val 50000"/>
+            </a:avLst>
+          </a:prstGeom>
+          <a:ln>
+            <a:tailEnd type="triangle"/>
+          </a:ln>
+        </p:spPr>
+        <p:style>
+          <a:lnRef idx="1">
+            <a:schemeClr val="accent1"/>
+          </a:lnRef>
+          <a:fillRef idx="0">
+            <a:schemeClr val="accent1"/>
+          </a:fillRef>
+          <a:effectRef idx="0">
+            <a:schemeClr val="accent1"/>
+          </a:effectRef>
+          <a:fontRef idx="minor">
+            <a:schemeClr val="tx1"/>
+          </a:fontRef>
+        </p:style>
+      </p:cxnSp>
+      <p:cxnSp>
+        <p:nvCxnSpPr>
+          <p:cNvPr id="148" name="Connecteur en arc 147"/>
+          <p:cNvCxnSpPr>
+            <a:stCxn id="144" idx="3"/>
+            <a:endCxn id="87" idx="3"/>
+          </p:cNvCxnSpPr>
+          <p:nvPr/>
+        </p:nvCxnSpPr>
+        <p:spPr>
+          <a:xfrm rot="16200000" flipV="1">
+            <a:off x="9391770" y="4385071"/>
+            <a:ext cx="1183242" cy="1297782"/>
+          </a:xfrm>
+          <a:prstGeom prst="curvedConnector2">
+            <a:avLst/>
+          </a:prstGeom>
+          <a:ln>
+            <a:tailEnd type="triangle"/>
+          </a:ln>
+        </p:spPr>
+        <p:style>
+          <a:lnRef idx="1">
+            <a:schemeClr val="accent1"/>
+          </a:lnRef>
+          <a:fillRef idx="0">
+            <a:schemeClr val="accent1"/>
+          </a:fillRef>
+          <a:effectRef idx="0">
+            <a:schemeClr val="accent1"/>
+          </a:effectRef>
+          <a:fontRef idx="minor">
+            <a:schemeClr val="tx1"/>
+          </a:fontRef>
+        </p:style>
+      </p:cxnSp>
+      <p:cxnSp>
+        <p:nvCxnSpPr>
+          <p:cNvPr id="151" name="Connecteur en arc 150"/>
+          <p:cNvCxnSpPr>
+            <a:stCxn id="112" idx="1"/>
+            <a:endCxn id="102" idx="1"/>
+          </p:cNvCxnSpPr>
+          <p:nvPr/>
+        </p:nvCxnSpPr>
+        <p:spPr>
+          <a:xfrm rot="10800000" flipH="1">
+            <a:off x="3052762" y="4007885"/>
+            <a:ext cx="626267" cy="2389225"/>
+          </a:xfrm>
+          <a:prstGeom prst="curvedConnector3">
+            <a:avLst>
+              <a:gd name="adj1" fmla="val -36502"/>
+            </a:avLst>
+          </a:prstGeom>
+          <a:ln>
+            <a:tailEnd type="triangle"/>
+          </a:ln>
+        </p:spPr>
+        <p:style>
+          <a:lnRef idx="1">
+            <a:schemeClr val="accent1"/>
+          </a:lnRef>
+          <a:fillRef idx="0">
+            <a:schemeClr val="accent1"/>
+          </a:fillRef>
+          <a:effectRef idx="0">
+            <a:schemeClr val="accent1"/>
+          </a:effectRef>
+          <a:fontRef idx="minor">
+            <a:schemeClr val="tx1"/>
+          </a:fontRef>
+        </p:style>
+      </p:cxnSp>
+      <p:sp>
+        <p:nvSpPr>
+          <p:cNvPr id="162" name="Rectangle 2"/>
+          <p:cNvSpPr>
+            <a:spLocks noChangeArrowheads="1"/>
+          </p:cNvSpPr>
+          <p:nvPr/>
+        </p:nvSpPr>
+        <p:spPr bwMode="auto">
+          <a:xfrm>
+            <a:off x="10382251" y="3361222"/>
+            <a:ext cx="685799" cy="246221"/>
+          </a:xfrm>
+          <a:prstGeom prst="rect">
+            <a:avLst/>
+          </a:prstGeom>
+          <a:solidFill>
+            <a:schemeClr val="bg1">
+              <a:lumMod val="85000"/>
+            </a:schemeClr>
+          </a:solidFill>
+          <a:ln w="9525">
+            <a:solidFill>
+              <a:schemeClr val="tx1"/>
+            </a:solidFill>
+            <a:miter lim="800000"/>
+            <a:headEnd/>
+            <a:tailEnd/>
+          </a:ln>
+          <a:effectLst/>
+        </p:spPr>
+        <p:txBody>
+          <a:bodyPr vert="horz" wrap="square" lIns="91440" tIns="45720" rIns="91440" bIns="45720" numCol="1" anchor="ctr" anchorCtr="0" compatLnSpc="1">
+            <a:prstTxWarp prst="textNoShape">
+              <a:avLst/>
+            </a:prstTxWarp>
+            <a:spAutoFit/>
+          </a:bodyPr>
+          <a:lstStyle/>
+          <a:p>
+            <a:pPr marL="0" marR="0" lvl="0" indent="0" algn="ctr" defTabSz="914400" rtl="0" eaLnBrk="0" fontAlgn="base" latinLnBrk="0" hangingPunct="0">
+              <a:lnSpc>
+                <a:spcPct val="100000"/>
+              </a:lnSpc>
+              <a:spcBef>
+                <a:spcPct val="0"/>
+              </a:spcBef>
+              <a:spcAft>
+                <a:spcPct val="0"/>
+              </a:spcAft>
+              <a:buClrTx/>
+              <a:buSzTx/>
+              <a:buFontTx/>
+              <a:buNone/>
+              <a:tabLst/>
+            </a:pPr>
+            <a:r>
+              <a:rPr kumimoji="0" lang="fr-FR" altLang="fr-FR" sz="1000" b="0" i="0" u="none" strike="noStrike" cap="none" normalizeH="0" baseline="0" dirty="0" err="1" smtClean="0">
+                <a:ln>
+                  <a:noFill/>
+                </a:ln>
+                <a:solidFill>
+                  <a:srgbClr val="000000"/>
+                </a:solidFill>
+                <a:effectLst/>
+                <a:latin typeface="Courier New" panose="02070309020205020404" pitchFamily="49" charset="0"/>
+                <a:cs typeface="Courier New" panose="02070309020205020404" pitchFamily="49" charset="0"/>
+              </a:rPr>
+              <a:t>idle</a:t>
+            </a:r>
+            <a:r>
+              <a:rPr kumimoji="0" lang="fr-FR" altLang="fr-FR" sz="1000" b="0" i="0" u="none" strike="noStrike" cap="none" normalizeH="0" baseline="0" dirty="0" smtClean="0">
+                <a:ln>
+                  <a:noFill/>
+                </a:ln>
+                <a:solidFill>
+                  <a:srgbClr val="000000"/>
+                </a:solidFill>
+                <a:effectLst/>
+                <a:latin typeface="Courier New" panose="02070309020205020404" pitchFamily="49" charset="0"/>
+                <a:cs typeface="Courier New" panose="02070309020205020404" pitchFamily="49" charset="0"/>
+              </a:rPr>
+              <a:t>()</a:t>
+            </a:r>
+            <a:endParaRPr kumimoji="0" lang="fr-FR" altLang="fr-FR" sz="1800" b="0" i="0" u="none" strike="noStrike" cap="none" normalizeH="0" baseline="0" dirty="0" smtClean="0">
+              <a:ln>
+                <a:noFill/>
+              </a:ln>
+              <a:solidFill>
+                <a:schemeClr val="tx1"/>
+              </a:solidFill>
+              <a:effectLst/>
+              <a:latin typeface="Arial" panose="020B0604020202020204" pitchFamily="34" charset="0"/>
+            </a:endParaRPr>
+          </a:p>
+        </p:txBody>
+      </p:sp>
+      <p:cxnSp>
+        <p:nvCxnSpPr>
+          <p:cNvPr id="166" name="Connecteur en arc 165"/>
+          <p:cNvCxnSpPr>
+            <a:stCxn id="162" idx="1"/>
+            <a:endCxn id="77" idx="0"/>
+          </p:cNvCxnSpPr>
+          <p:nvPr/>
+        </p:nvCxnSpPr>
+        <p:spPr>
+          <a:xfrm rot="10800000" flipV="1">
+            <a:off x="9520239" y="3484333"/>
+            <a:ext cx="862013" cy="196004"/>
+          </a:xfrm>
+          <a:prstGeom prst="curvedConnector3">
+            <a:avLst>
+              <a:gd name="adj1" fmla="val 50000"/>
+            </a:avLst>
+          </a:prstGeom>
+          <a:ln>
+            <a:tailEnd type="triangle"/>
+          </a:ln>
+        </p:spPr>
+        <p:style>
+          <a:lnRef idx="1">
+            <a:schemeClr val="accent1"/>
+          </a:lnRef>
+          <a:fillRef idx="0">
+            <a:schemeClr val="accent1"/>
+          </a:fillRef>
+          <a:effectRef idx="0">
+            <a:schemeClr val="accent1"/>
+          </a:effectRef>
+          <a:fontRef idx="minor">
+            <a:schemeClr val="tx1"/>
+          </a:fontRef>
+        </p:style>
+      </p:cxnSp>
+      <p:grpSp>
+        <p:nvGrpSpPr>
+          <p:cNvPr id="194" name="Groupe 193"/>
+          <p:cNvGrpSpPr/>
+          <p:nvPr/>
+        </p:nvGrpSpPr>
+        <p:grpSpPr>
+          <a:xfrm>
+            <a:off x="159544" y="98941"/>
+            <a:ext cx="1473994" cy="2106125"/>
+            <a:chOff x="9770268" y="114300"/>
+            <a:chExt cx="1473994" cy="2106125"/>
+          </a:xfrm>
+        </p:grpSpPr>
+        <p:sp>
+          <p:nvSpPr>
+            <p:cNvPr id="193" name="Rectangle 192"/>
+            <p:cNvSpPr/>
+            <p:nvPr/>
+          </p:nvSpPr>
+          <p:spPr>
+            <a:xfrm>
+              <a:off x="9770268" y="114300"/>
+              <a:ext cx="1473994" cy="2106125"/>
+            </a:xfrm>
+            <a:prstGeom prst="rect">
+              <a:avLst/>
+            </a:prstGeom>
+            <a:solidFill>
+              <a:schemeClr val="accent1">
+                <a:lumMod val="20000"/>
+                <a:lumOff val="80000"/>
+              </a:schemeClr>
+            </a:solidFill>
+          </p:spPr>
+          <p:style>
+            <a:lnRef idx="2">
+              <a:schemeClr val="accent1">
+                <a:shade val="50000"/>
+              </a:schemeClr>
+            </a:lnRef>
+            <a:fillRef idx="1">
+              <a:schemeClr val="accent1"/>
+            </a:fillRef>
+            <a:effectRef idx="0">
+              <a:schemeClr val="accent1"/>
+            </a:effectRef>
+            <a:fontRef idx="minor">
+              <a:schemeClr val="lt1"/>
+            </a:fontRef>
+          </p:style>
+          <p:txBody>
+            <a:bodyPr rtlCol="0" anchor="ctr"/>
+            <a:lstStyle/>
+            <a:p>
+              <a:pPr algn="ctr"/>
+              <a:endParaRPr lang="fr-FR"/>
+            </a:p>
+          </p:txBody>
+        </p:sp>
+        <p:sp>
+          <p:nvSpPr>
+            <p:cNvPr id="181" name="ZoneTexte 180"/>
+            <p:cNvSpPr txBox="1"/>
+            <p:nvPr/>
+          </p:nvSpPr>
+          <p:spPr>
+            <a:xfrm>
+              <a:off x="9956005" y="221932"/>
+              <a:ext cx="635795" cy="369332"/>
+            </a:xfrm>
+            <a:prstGeom prst="rect">
+              <a:avLst/>
+            </a:prstGeom>
+            <a:solidFill>
+              <a:schemeClr val="bg1"/>
+            </a:solidFill>
+            <a:ln>
+              <a:solidFill>
+                <a:srgbClr val="FF0000"/>
+              </a:solidFill>
+            </a:ln>
+          </p:spPr>
+          <p:txBody>
+            <a:bodyPr wrap="square" rtlCol="0">
+              <a:spAutoFit/>
+            </a:bodyPr>
+            <a:lstStyle/>
+            <a:p>
+              <a:r>
+                <a:rPr lang="fr-FR" dirty="0" err="1" smtClean="0"/>
+                <a:t>path</a:t>
+              </a:r>
+              <a:endParaRPr lang="fr-FR" dirty="0"/>
+            </a:p>
+          </p:txBody>
+        </p:sp>
+        <p:sp>
+          <p:nvSpPr>
+            <p:cNvPr id="182" name="Rectangle 2"/>
+            <p:cNvSpPr>
+              <a:spLocks noChangeArrowheads="1"/>
+            </p:cNvSpPr>
+            <p:nvPr/>
+          </p:nvSpPr>
+          <p:spPr bwMode="auto">
+            <a:xfrm>
+              <a:off x="9956006" y="695324"/>
+              <a:ext cx="1019178" cy="246221"/>
+            </a:xfrm>
+            <a:prstGeom prst="rect">
+              <a:avLst/>
+            </a:prstGeom>
+            <a:solidFill>
+              <a:schemeClr val="bg1">
+                <a:lumMod val="85000"/>
+              </a:schemeClr>
+            </a:solidFill>
+            <a:ln w="9525">
+              <a:solidFill>
+                <a:schemeClr val="tx1"/>
+              </a:solidFill>
+              <a:miter lim="800000"/>
+              <a:headEnd/>
+              <a:tailEnd/>
+            </a:ln>
+            <a:effectLst/>
+          </p:spPr>
+          <p:txBody>
+            <a:bodyPr vert="horz" wrap="square" lIns="91440" tIns="45720" rIns="91440" bIns="45720" numCol="1" anchor="ctr" anchorCtr="0" compatLnSpc="1">
+              <a:prstTxWarp prst="textNoShape">
+                <a:avLst/>
+              </a:prstTxWarp>
+              <a:spAutoFit/>
+            </a:bodyPr>
+            <a:lstStyle/>
+            <a:p>
+              <a:pPr marL="0" marR="0" lvl="0" indent="0" algn="ctr" defTabSz="914400" rtl="0" eaLnBrk="0" fontAlgn="base" latinLnBrk="0" hangingPunct="0">
+                <a:lnSpc>
+                  <a:spcPct val="100000"/>
+                </a:lnSpc>
+                <a:spcBef>
+                  <a:spcPct val="0"/>
+                </a:spcBef>
+                <a:spcAft>
+                  <a:spcPct val="0"/>
+                </a:spcAft>
+                <a:buClrTx/>
+                <a:buSzTx/>
+                <a:buFontTx/>
+                <a:buNone/>
+                <a:tabLst/>
+              </a:pPr>
+              <a:r>
+                <a:rPr lang="fr-FR" altLang="fr-FR" sz="1000" dirty="0" err="1" smtClean="0">
+                  <a:solidFill>
+                    <a:srgbClr val="000000"/>
+                  </a:solidFill>
+                  <a:latin typeface="Courier New" panose="02070309020205020404" pitchFamily="49" charset="0"/>
+                  <a:cs typeface="Courier New" panose="02070309020205020404" pitchFamily="49" charset="0"/>
+                </a:rPr>
+                <a:t>function</a:t>
+              </a:r>
+              <a:r>
+                <a:rPr kumimoji="0" lang="fr-FR" altLang="fr-FR" sz="1000" b="0" i="0" u="none" strike="noStrike" cap="none" normalizeH="0" baseline="0" dirty="0" smtClean="0">
+                  <a:ln>
+                    <a:noFill/>
+                  </a:ln>
+                  <a:solidFill>
+                    <a:srgbClr val="000000"/>
+                  </a:solidFill>
+                  <a:effectLst/>
+                  <a:latin typeface="Courier New" panose="02070309020205020404" pitchFamily="49" charset="0"/>
+                  <a:cs typeface="Courier New" panose="02070309020205020404" pitchFamily="49" charset="0"/>
+                </a:rPr>
+                <a:t>()</a:t>
+              </a:r>
+              <a:endParaRPr kumimoji="0" lang="fr-FR" altLang="fr-FR" sz="1800" b="0" i="0" u="none" strike="noStrike" cap="none" normalizeH="0" baseline="0" dirty="0" smtClean="0">
+                <a:ln>
+                  <a:noFill/>
+                </a:ln>
+                <a:solidFill>
+                  <a:schemeClr val="tx1"/>
+                </a:solidFill>
+                <a:effectLst/>
+                <a:latin typeface="Arial" panose="020B0604020202020204" pitchFamily="34" charset="0"/>
+              </a:endParaRPr>
+            </a:p>
+          </p:txBody>
+        </p:sp>
+        <p:sp>
+          <p:nvSpPr>
+            <p:cNvPr id="183" name="Rectangle 3"/>
+            <p:cNvSpPr>
+              <a:spLocks noChangeArrowheads="1"/>
+            </p:cNvSpPr>
+            <p:nvPr/>
+          </p:nvSpPr>
+          <p:spPr bwMode="auto">
+            <a:xfrm>
+              <a:off x="9956005" y="1042268"/>
+              <a:ext cx="635795" cy="246221"/>
+            </a:xfrm>
+            <a:prstGeom prst="rect">
+              <a:avLst/>
+            </a:prstGeom>
+            <a:solidFill>
+              <a:srgbClr val="92D050"/>
+            </a:solidFill>
+            <a:ln/>
+          </p:spPr>
+          <p:style>
+            <a:lnRef idx="2">
+              <a:schemeClr val="dk1"/>
+            </a:lnRef>
+            <a:fillRef idx="1">
+              <a:schemeClr val="lt1"/>
+            </a:fillRef>
+            <a:effectRef idx="0">
+              <a:schemeClr val="dk1"/>
+            </a:effectRef>
+            <a:fontRef idx="minor">
+              <a:schemeClr val="dk1"/>
+            </a:fontRef>
+          </p:style>
+          <p:txBody>
+            <a:bodyPr vert="horz" wrap="square" lIns="91440" tIns="45720" rIns="91440" bIns="45720" numCol="1" anchor="ctr" anchorCtr="0" compatLnSpc="1">
+              <a:prstTxWarp prst="textNoShape">
+                <a:avLst/>
+              </a:prstTxWarp>
+              <a:spAutoFit/>
+            </a:bodyPr>
+            <a:lstStyle/>
+            <a:p>
+              <a:pPr marL="0" marR="0" lvl="0" indent="0" algn="l" defTabSz="914400" rtl="0" eaLnBrk="0" fontAlgn="base" latinLnBrk="0" hangingPunct="0">
+                <a:lnSpc>
+                  <a:spcPct val="100000"/>
+                </a:lnSpc>
+                <a:spcBef>
+                  <a:spcPct val="0"/>
+                </a:spcBef>
+                <a:spcAft>
+                  <a:spcPct val="0"/>
+                </a:spcAft>
+                <a:buClrTx/>
+                <a:buSzTx/>
+                <a:buFontTx/>
+                <a:buNone/>
+                <a:tabLst/>
+              </a:pPr>
+              <a:r>
+                <a:rPr kumimoji="0" lang="fr-FR" altLang="fr-FR" sz="1000" b="0" i="0" u="none" strike="noStrike" cap="none" normalizeH="0" baseline="0" dirty="0" smtClean="0">
+                  <a:ln>
+                    <a:noFill/>
+                  </a:ln>
+                  <a:solidFill>
+                    <a:schemeClr val="tx1"/>
+                  </a:solidFill>
+                  <a:effectLst/>
+                  <a:latin typeface="Courier New" panose="02070309020205020404" pitchFamily="49" charset="0"/>
+                  <a:cs typeface="Courier New" panose="02070309020205020404" pitchFamily="49" charset="0"/>
+                </a:rPr>
+                <a:t>Event</a:t>
+              </a:r>
+            </a:p>
+          </p:txBody>
+        </p:sp>
+        <p:sp>
+          <p:nvSpPr>
+            <p:cNvPr id="184" name="Rectangle 3"/>
+            <p:cNvSpPr>
+              <a:spLocks noChangeArrowheads="1"/>
+            </p:cNvSpPr>
+            <p:nvPr/>
+          </p:nvSpPr>
+          <p:spPr bwMode="auto">
+            <a:xfrm>
+              <a:off x="9958386" y="1406809"/>
+              <a:ext cx="1100139" cy="246221"/>
+            </a:xfrm>
+            <a:prstGeom prst="rect">
+              <a:avLst/>
+            </a:prstGeom>
+            <a:solidFill>
+              <a:srgbClr val="FF0000"/>
+            </a:solidFill>
+            <a:ln/>
+          </p:spPr>
+          <p:style>
+            <a:lnRef idx="2">
+              <a:schemeClr val="dk1"/>
+            </a:lnRef>
+            <a:fillRef idx="1">
+              <a:schemeClr val="lt1"/>
+            </a:fillRef>
+            <a:effectRef idx="0">
+              <a:schemeClr val="dk1"/>
+            </a:effectRef>
+            <a:fontRef idx="minor">
+              <a:schemeClr val="dk1"/>
+            </a:fontRef>
+          </p:style>
+          <p:txBody>
+            <a:bodyPr vert="horz" wrap="square" lIns="91440" tIns="45720" rIns="91440" bIns="45720" numCol="1" anchor="ctr" anchorCtr="0" compatLnSpc="1">
+              <a:prstTxWarp prst="textNoShape">
+                <a:avLst/>
+              </a:prstTxWarp>
+              <a:spAutoFit/>
+            </a:bodyPr>
+            <a:lstStyle/>
+            <a:p>
+              <a:pPr marL="0" marR="0" lvl="0" indent="0" algn="l" defTabSz="914400" rtl="0" eaLnBrk="0" fontAlgn="base" latinLnBrk="0" hangingPunct="0">
+                <a:lnSpc>
+                  <a:spcPct val="100000"/>
+                </a:lnSpc>
+                <a:spcBef>
+                  <a:spcPct val="0"/>
+                </a:spcBef>
+                <a:spcAft>
+                  <a:spcPct val="0"/>
+                </a:spcAft>
+                <a:buClrTx/>
+                <a:buSzTx/>
+                <a:buFontTx/>
+                <a:buNone/>
+                <a:tabLst/>
+              </a:pPr>
+              <a:r>
+                <a:rPr kumimoji="0" lang="fr-FR" altLang="fr-FR" sz="1000" b="0" i="0" u="none" strike="noStrike" cap="none" normalizeH="0" baseline="0" dirty="0" smtClean="0">
+                  <a:ln>
+                    <a:noFill/>
+                  </a:ln>
+                  <a:solidFill>
+                    <a:schemeClr val="tx1"/>
+                  </a:solidFill>
+                  <a:effectLst/>
+                  <a:latin typeface="Courier New" panose="02070309020205020404" pitchFamily="49" charset="0"/>
+                  <a:cs typeface="Courier New" panose="02070309020205020404" pitchFamily="49" charset="0"/>
+                </a:rPr>
+                <a:t>User action</a:t>
+              </a:r>
+              <a:endParaRPr kumimoji="0" lang="fr-FR" altLang="fr-FR" sz="1800" b="0" i="0" u="none" strike="noStrike" cap="none" normalizeH="0" baseline="0" dirty="0" smtClean="0">
+                <a:ln>
+                  <a:noFill/>
+                </a:ln>
+                <a:solidFill>
+                  <a:schemeClr val="tx1"/>
+                </a:solidFill>
+                <a:effectLst/>
+                <a:latin typeface="Arial" panose="020B0604020202020204" pitchFamily="34" charset="0"/>
+              </a:endParaRPr>
+            </a:p>
+          </p:txBody>
+        </p:sp>
+        <p:sp>
+          <p:nvSpPr>
+            <p:cNvPr id="185" name="Rectangle avec coins arrondis en diagonale 184"/>
+            <p:cNvSpPr/>
+            <p:nvPr/>
+          </p:nvSpPr>
+          <p:spPr>
+            <a:xfrm>
+              <a:off x="9927432" y="1784014"/>
+              <a:ext cx="1076326" cy="241817"/>
+            </a:xfrm>
+            <a:prstGeom prst="round2DiagRect">
+              <a:avLst/>
+            </a:prstGeom>
+          </p:spPr>
+          <p:style>
+            <a:lnRef idx="2">
+              <a:schemeClr val="accent1">
+                <a:shade val="50000"/>
+              </a:schemeClr>
+            </a:lnRef>
+            <a:fillRef idx="1">
+              <a:schemeClr val="accent1"/>
+            </a:fillRef>
+            <a:effectRef idx="0">
+              <a:schemeClr val="accent1"/>
+            </a:effectRef>
+            <a:fontRef idx="minor">
+              <a:schemeClr val="lt1"/>
+            </a:fontRef>
+          </p:style>
+          <p:txBody>
+            <a:bodyPr rtlCol="0" anchor="ctr"/>
+            <a:lstStyle/>
+            <a:p>
+              <a:pPr algn="ctr"/>
+              <a:r>
+                <a:rPr lang="fr-FR" sz="1400" dirty="0" err="1" smtClean="0"/>
+                <a:t>template</a:t>
+              </a:r>
+              <a:endParaRPr lang="fr-FR" sz="1400" dirty="0"/>
+            </a:p>
+          </p:txBody>
+        </p:sp>
+      </p:grpSp>
+      <p:sp>
+        <p:nvSpPr>
+          <p:cNvPr id="196" name="Rectangle 195"/>
+          <p:cNvSpPr/>
+          <p:nvPr/>
+        </p:nvSpPr>
+        <p:spPr>
+          <a:xfrm>
+            <a:off x="6938960" y="1603878"/>
+            <a:ext cx="3090863" cy="1677189"/>
+          </a:xfrm>
+          <a:prstGeom prst="rect">
+            <a:avLst/>
+          </a:prstGeom>
+          <a:solidFill>
+            <a:srgbClr val="F2F2F2">
+              <a:alpha val="65882"/>
+            </a:srgbClr>
+          </a:solidFill>
+          <a:ln>
+            <a:noFill/>
+          </a:ln>
+        </p:spPr>
+        <p:style>
+          <a:lnRef idx="2">
+            <a:schemeClr val="accent1">
+              <a:shade val="50000"/>
+            </a:schemeClr>
+          </a:lnRef>
+          <a:fillRef idx="1">
+            <a:schemeClr val="accent1"/>
+          </a:fillRef>
+          <a:effectRef idx="0">
+            <a:schemeClr val="accent1"/>
+          </a:effectRef>
+          <a:fontRef idx="minor">
+            <a:schemeClr val="lt1"/>
+          </a:fontRef>
+        </p:style>
+        <p:txBody>
+          <a:bodyPr rtlCol="0" anchor="ctr"/>
+          <a:lstStyle/>
+          <a:p>
+            <a:pPr algn="ctr"/>
+            <a:endParaRPr lang="fr-FR"/>
+          </a:p>
+        </p:txBody>
+      </p:sp>
+      <p:sp>
+        <p:nvSpPr>
+          <p:cNvPr id="197" name="Rectangle 196"/>
+          <p:cNvSpPr/>
+          <p:nvPr/>
+        </p:nvSpPr>
+        <p:spPr>
+          <a:xfrm>
+            <a:off x="2695576" y="5600700"/>
+            <a:ext cx="3800472" cy="1087794"/>
+          </a:xfrm>
+          <a:prstGeom prst="rect">
+            <a:avLst/>
+          </a:prstGeom>
+          <a:solidFill>
+            <a:srgbClr val="F2F2F2">
+              <a:alpha val="65882"/>
+            </a:srgbClr>
+          </a:solidFill>
+          <a:ln>
+            <a:noFill/>
+          </a:ln>
+        </p:spPr>
+        <p:style>
+          <a:lnRef idx="2">
+            <a:schemeClr val="accent1">
+              <a:shade val="50000"/>
+            </a:schemeClr>
+          </a:lnRef>
+          <a:fillRef idx="1">
+            <a:schemeClr val="accent1"/>
+          </a:fillRef>
+          <a:effectRef idx="0">
+            <a:schemeClr val="accent1"/>
+          </a:effectRef>
+          <a:fontRef idx="minor">
+            <a:schemeClr val="lt1"/>
+          </a:fontRef>
+        </p:style>
+        <p:txBody>
+          <a:bodyPr rtlCol="0" anchor="ctr"/>
+          <a:lstStyle/>
+          <a:p>
+            <a:pPr algn="ctr"/>
+            <a:endParaRPr lang="fr-FR"/>
+          </a:p>
+        </p:txBody>
+      </p:sp>
+    </p:spTree>
+    <p:extLst>
+      <p:ext uri="{BB962C8B-B14F-4D97-AF65-F5344CB8AC3E}">
+        <p14:creationId xmlns:p14="http://schemas.microsoft.com/office/powerpoint/2010/main" val="2366413189"/>
       </p:ext>
     </p:extLst>
   </p:cSld>

</xml_diff>

<commit_message>
Various R&D in the direction of the global & external management. Cut management of external user & orgs vs internal spark + broker engine
Study html design (menus... Jupyter aspect)
</commit_message>
<xml_diff>
--- a/doc/Design.pptx
+++ b/doc/Design.pptx
@@ -5656,7 +5656,7 @@
         </p:nvSpPr>
         <p:spPr>
           <a:xfrm>
-            <a:off x="2514600" y="171450"/>
+            <a:off x="2152650" y="171450"/>
             <a:ext cx="255384" cy="369332"/>
           </a:xfrm>
           <a:prstGeom prst="rect">
@@ -5693,7 +5693,7 @@
         </p:nvSpPr>
         <p:spPr bwMode="auto">
           <a:xfrm>
-            <a:off x="3743326" y="400764"/>
+            <a:off x="2971801" y="238839"/>
             <a:ext cx="1895474" cy="246221"/>
           </a:xfrm>
           <a:prstGeom prst="rect">
@@ -5791,8 +5791,8 @@
         </p:nvCxnSpPr>
         <p:spPr>
           <a:xfrm>
-            <a:off x="2769984" y="356116"/>
-            <a:ext cx="973342" cy="167759"/>
+            <a:off x="2408034" y="356116"/>
+            <a:ext cx="563767" cy="5834"/>
           </a:xfrm>
           <a:prstGeom prst="curvedConnector3">
             <a:avLst/>
@@ -5824,7 +5824,7 @@
         </p:nvSpPr>
         <p:spPr>
           <a:xfrm>
-            <a:off x="5029200" y="1148833"/>
+            <a:off x="3390900" y="1139308"/>
             <a:ext cx="1076326" cy="241817"/>
           </a:xfrm>
           <a:prstGeom prst="round2DiagRect">
@@ -5875,8 +5875,8 @@
         </p:nvCxnSpPr>
         <p:spPr>
           <a:xfrm rot="16200000" flipH="1">
-            <a:off x="4878289" y="459759"/>
-            <a:ext cx="501848" cy="876300"/>
+            <a:off x="3597176" y="807421"/>
+            <a:ext cx="654248" cy="9525"/>
           </a:xfrm>
           <a:prstGeom prst="curvedConnector3">
             <a:avLst>
@@ -6014,14 +6014,14 @@
           <p:cNvPr id="14" name="Connecteur en arc 13"/>
           <p:cNvCxnSpPr>
             <a:stCxn id="9" idx="0"/>
-            <a:endCxn id="13" idx="1"/>
+            <a:endCxn id="199" idx="1"/>
           </p:cNvCxnSpPr>
           <p:nvPr/>
         </p:nvCxnSpPr>
         <p:spPr>
           <a:xfrm flipV="1">
-            <a:off x="6105526" y="771525"/>
-            <a:ext cx="1285874" cy="498217"/>
+            <a:off x="4467226" y="1014773"/>
+            <a:ext cx="642935" cy="245444"/>
           </a:xfrm>
           <a:prstGeom prst="curvedConnector3">
             <a:avLst>
@@ -7365,13 +7365,13 @@
           <p:nvPr/>
         </p:nvCxnSpPr>
         <p:spPr>
-          <a:xfrm rot="10800000" flipH="1">
-            <a:off x="4076698" y="1269743"/>
-            <a:ext cx="952501" cy="1096149"/>
+          <a:xfrm rot="10800000">
+            <a:off x="3390901" y="1260217"/>
+            <a:ext cx="685799" cy="1105674"/>
           </a:xfrm>
           <a:prstGeom prst="curvedConnector3">
             <a:avLst>
-              <a:gd name="adj1" fmla="val -24000"/>
+              <a:gd name="adj1" fmla="val 133333"/>
             </a:avLst>
           </a:prstGeom>
           <a:ln>
@@ -9178,6 +9178,200 @@
           </a:p>
         </p:txBody>
       </p:sp>
+      <p:sp>
+        <p:nvSpPr>
+          <p:cNvPr id="199" name="Rectangle 3"/>
+          <p:cNvSpPr>
+            <a:spLocks noChangeArrowheads="1"/>
+          </p:cNvSpPr>
+          <p:nvPr/>
+        </p:nvSpPr>
+        <p:spPr bwMode="auto">
+          <a:xfrm>
+            <a:off x="5110161" y="891662"/>
+            <a:ext cx="1338264" cy="246221"/>
+          </a:xfrm>
+          <a:prstGeom prst="rect">
+            <a:avLst/>
+          </a:prstGeom>
+          <a:solidFill>
+            <a:srgbClr val="FF0000"/>
+          </a:solidFill>
+          <a:ln/>
+        </p:spPr>
+        <p:style>
+          <a:lnRef idx="2">
+            <a:schemeClr val="dk1"/>
+          </a:lnRef>
+          <a:fillRef idx="1">
+            <a:schemeClr val="lt1"/>
+          </a:fillRef>
+          <a:effectRef idx="0">
+            <a:schemeClr val="dk1"/>
+          </a:effectRef>
+          <a:fontRef idx="minor">
+            <a:schemeClr val="dk1"/>
+          </a:fontRef>
+        </p:style>
+        <p:txBody>
+          <a:bodyPr vert="horz" wrap="square" lIns="91440" tIns="45720" rIns="91440" bIns="45720" numCol="1" anchor="ctr" anchorCtr="0" compatLnSpc="1">
+            <a:prstTxWarp prst="textNoShape">
+              <a:avLst/>
+            </a:prstTxWarp>
+            <a:spAutoFit/>
+          </a:bodyPr>
+          <a:lstStyle/>
+          <a:p>
+            <a:pPr marL="0" marR="0" lvl="0" indent="0" algn="l" defTabSz="914400" rtl="0" eaLnBrk="0" fontAlgn="base" latinLnBrk="0" hangingPunct="0">
+              <a:lnSpc>
+                <a:spcPct val="100000"/>
+              </a:lnSpc>
+              <a:spcBef>
+                <a:spcPct val="0"/>
+              </a:spcBef>
+              <a:spcAft>
+                <a:spcPct val="0"/>
+              </a:spcAft>
+              <a:buClrTx/>
+              <a:buSzTx/>
+              <a:buFontTx/>
+              <a:buNone/>
+              <a:tabLst/>
+            </a:pPr>
+            <a:r>
+              <a:rPr kumimoji="0" lang="fr-FR" altLang="fr-FR" sz="1000" b="0" i="0" u="none" strike="noStrike" cap="none" normalizeH="0" baseline="0" dirty="0" smtClean="0">
+                <a:ln>
+                  <a:noFill/>
+                </a:ln>
+                <a:solidFill>
+                  <a:schemeClr val="tx1"/>
+                </a:solidFill>
+                <a:effectLst/>
+                <a:latin typeface="Courier New" panose="02070309020205020404" pitchFamily="49" charset="0"/>
+                <a:cs typeface="Courier New" panose="02070309020205020404" pitchFamily="49" charset="0"/>
+              </a:rPr>
+              <a:t>Open a session</a:t>
+            </a:r>
+            <a:endParaRPr kumimoji="0" lang="fr-FR" altLang="fr-FR" sz="1800" b="0" i="0" u="none" strike="noStrike" cap="none" normalizeH="0" baseline="0" dirty="0" smtClean="0">
+              <a:ln>
+                <a:noFill/>
+              </a:ln>
+              <a:solidFill>
+                <a:schemeClr val="tx1"/>
+              </a:solidFill>
+              <a:effectLst/>
+              <a:latin typeface="Arial" panose="020B0604020202020204" pitchFamily="34" charset="0"/>
+            </a:endParaRPr>
+          </a:p>
+        </p:txBody>
+      </p:sp>
+      <p:cxnSp>
+        <p:nvCxnSpPr>
+          <p:cNvPr id="201" name="Connecteur en arc 200"/>
+          <p:cNvCxnSpPr>
+            <a:stCxn id="199" idx="0"/>
+            <a:endCxn id="204" idx="1"/>
+          </p:cNvCxnSpPr>
+          <p:nvPr/>
+        </p:nvCxnSpPr>
+        <p:spPr>
+          <a:xfrm rot="5400000" flipH="1" flipV="1">
+            <a:off x="5763397" y="309030"/>
+            <a:ext cx="598528" cy="566737"/>
+          </a:xfrm>
+          <a:prstGeom prst="curvedConnector2">
+            <a:avLst/>
+          </a:prstGeom>
+          <a:ln>
+            <a:tailEnd type="triangle"/>
+          </a:ln>
+        </p:spPr>
+        <p:style>
+          <a:lnRef idx="1">
+            <a:schemeClr val="accent1"/>
+          </a:lnRef>
+          <a:fillRef idx="0">
+            <a:schemeClr val="accent1"/>
+          </a:fillRef>
+          <a:effectRef idx="0">
+            <a:schemeClr val="accent1"/>
+          </a:effectRef>
+          <a:fontRef idx="minor">
+            <a:schemeClr val="tx1"/>
+          </a:fontRef>
+        </p:style>
+      </p:cxnSp>
+      <p:sp>
+        <p:nvSpPr>
+          <p:cNvPr id="204" name="ZoneTexte 203"/>
+          <p:cNvSpPr txBox="1"/>
+          <p:nvPr/>
+        </p:nvSpPr>
+        <p:spPr>
+          <a:xfrm>
+            <a:off x="6346030" y="108468"/>
+            <a:ext cx="969171" cy="369332"/>
+          </a:xfrm>
+          <a:prstGeom prst="rect">
+            <a:avLst/>
+          </a:prstGeom>
+          <a:noFill/>
+          <a:ln>
+            <a:solidFill>
+              <a:srgbClr val="FF0000"/>
+            </a:solidFill>
+          </a:ln>
+        </p:spPr>
+        <p:txBody>
+          <a:bodyPr wrap="square" rtlCol="0">
+            <a:spAutoFit/>
+          </a:bodyPr>
+          <a:lstStyle/>
+          <a:p>
+            <a:r>
+              <a:rPr lang="fr-FR" dirty="0" smtClean="0"/>
+              <a:t>/open</a:t>
+            </a:r>
+            <a:endParaRPr lang="fr-FR" dirty="0"/>
+          </a:p>
+        </p:txBody>
+      </p:sp>
+      <p:cxnSp>
+        <p:nvCxnSpPr>
+          <p:cNvPr id="206" name="Connecteur en arc 205"/>
+          <p:cNvCxnSpPr>
+            <a:stCxn id="204" idx="3"/>
+            <a:endCxn id="13" idx="0"/>
+          </p:cNvCxnSpPr>
+          <p:nvPr/>
+        </p:nvCxnSpPr>
+        <p:spPr>
+          <a:xfrm>
+            <a:off x="7315201" y="293134"/>
+            <a:ext cx="723899" cy="355280"/>
+          </a:xfrm>
+          <a:prstGeom prst="curvedConnector2">
+            <a:avLst/>
+          </a:prstGeom>
+          <a:ln>
+            <a:tailEnd type="triangle"/>
+          </a:ln>
+        </p:spPr>
+        <p:style>
+          <a:lnRef idx="1">
+            <a:schemeClr val="accent1"/>
+          </a:lnRef>
+          <a:fillRef idx="0">
+            <a:schemeClr val="accent1"/>
+          </a:fillRef>
+          <a:effectRef idx="0">
+            <a:schemeClr val="accent1"/>
+          </a:effectRef>
+          <a:fontRef idx="minor">
+            <a:schemeClr val="tx1"/>
+          </a:fontRef>
+        </p:style>
+      </p:cxnSp>
     </p:spTree>
     <p:extLst>
       <p:ext uri="{BB962C8B-B14F-4D97-AF65-F5344CB8AC3E}">

</xml_diff>